<commit_message>
2023 07 09 lib 2
</commit_message>
<xml_diff>
--- a/inf-learn/section6/연습/인프런_코딩_section6.pptx
+++ b/inf-learn/section6/연습/인프런_코딩_section6.pptx
@@ -10,10 +10,12 @@
     <p:sldId id="263" r:id="rId4"/>
     <p:sldId id="258" r:id="rId5"/>
     <p:sldId id="264" r:id="rId6"/>
-    <p:sldId id="259" r:id="rId7"/>
-    <p:sldId id="260" r:id="rId8"/>
-    <p:sldId id="261" r:id="rId9"/>
-    <p:sldId id="262" r:id="rId10"/>
+    <p:sldId id="265" r:id="rId7"/>
+    <p:sldId id="266" r:id="rId8"/>
+    <p:sldId id="259" r:id="rId9"/>
+    <p:sldId id="260" r:id="rId10"/>
+    <p:sldId id="261" r:id="rId11"/>
+    <p:sldId id="262" r:id="rId12"/>
   </p:sldIdLst>
   <p:sldSz cx="12192000" cy="6858000"/>
   <p:notesSz cx="6858000" cy="9144000"/>
@@ -4575,10 +4577,114 @@
           </a:p>
         </p:txBody>
       </p:sp>
+      <p:sp>
+        <p:nvSpPr>
+          <p:cNvPr id="27" name="TextBox 26">
+            <a:extLst>
+              <a:ext uri="{FF2B5EF4-FFF2-40B4-BE49-F238E27FC236}">
+                <a16:creationId xmlns:a16="http://schemas.microsoft.com/office/drawing/2014/main" id="{0F94A864-71CE-4B6C-9CB6-4BFE59EA3BEB}"/>
+              </a:ext>
+            </a:extLst>
+          </p:cNvPr>
+          <p:cNvSpPr txBox="1"/>
+          <p:nvPr/>
+        </p:nvSpPr>
+        <p:spPr>
+          <a:xfrm>
+            <a:off x="0" y="0"/>
+            <a:ext cx="2811924" cy="369332"/>
+          </a:xfrm>
+          <a:prstGeom prst="rect">
+            <a:avLst/>
+          </a:prstGeom>
+          <a:noFill/>
+        </p:spPr>
+        <p:txBody>
+          <a:bodyPr wrap="none" rtlCol="0">
+            <a:spAutoFit/>
+          </a:bodyPr>
+          <a:lstStyle/>
+          <a:p>
+            <a:r>
+              <a:rPr lang="en-US" altLang="ko-KR" dirty="0"/>
+              <a:t>03. </a:t>
+            </a:r>
+            <a:r>
+              <a:rPr lang="ko-KR" altLang="en-US" dirty="0"/>
+              <a:t>부분집합 구하기</a:t>
+            </a:r>
+            <a:r>
+              <a:rPr lang="en-US" altLang="ko-KR" dirty="0"/>
+              <a:t>(DFS)</a:t>
+            </a:r>
+            <a:endParaRPr lang="ko-KR" altLang="en-US" dirty="0"/>
+          </a:p>
+        </p:txBody>
+      </p:sp>
     </p:spTree>
     <p:extLst>
       <p:ext uri="{BB962C8B-B14F-4D97-AF65-F5344CB8AC3E}">
         <p14:creationId xmlns:p14="http://schemas.microsoft.com/office/powerpoint/2010/main" val="3280367667"/>
+      </p:ext>
+    </p:extLst>
+  </p:cSld>
+  <p:clrMapOvr>
+    <a:masterClrMapping/>
+  </p:clrMapOvr>
+</p:sld>
+</file>
+
+<file path=ppt/slides/slide10.xml><?xml version="1.0" encoding="utf-8"?>
+<p:sld xmlns:a="http://schemas.openxmlformats.org/drawingml/2006/main" xmlns:r="http://schemas.openxmlformats.org/officeDocument/2006/relationships" xmlns:p="http://schemas.openxmlformats.org/presentationml/2006/main">
+  <p:cSld>
+    <p:spTree>
+      <p:nvGrpSpPr>
+        <p:cNvPr id="1" name=""/>
+        <p:cNvGrpSpPr/>
+        <p:nvPr/>
+      </p:nvGrpSpPr>
+      <p:grpSpPr>
+        <a:xfrm>
+          <a:off x="0" y="0"/>
+          <a:ext cx="0" cy="0"/>
+          <a:chOff x="0" y="0"/>
+          <a:chExt cx="0" cy="0"/>
+        </a:xfrm>
+      </p:grpSpPr>
+    </p:spTree>
+    <p:extLst>
+      <p:ext uri="{BB962C8B-B14F-4D97-AF65-F5344CB8AC3E}">
+        <p14:creationId xmlns:p14="http://schemas.microsoft.com/office/powerpoint/2010/main" val="3249580640"/>
+      </p:ext>
+    </p:extLst>
+  </p:cSld>
+  <p:clrMapOvr>
+    <a:masterClrMapping/>
+  </p:clrMapOvr>
+</p:sld>
+</file>
+
+<file path=ppt/slides/slide11.xml><?xml version="1.0" encoding="utf-8"?>
+<p:sld xmlns:a="http://schemas.openxmlformats.org/drawingml/2006/main" xmlns:r="http://schemas.openxmlformats.org/officeDocument/2006/relationships" xmlns:p="http://schemas.openxmlformats.org/presentationml/2006/main">
+  <p:cSld>
+    <p:spTree>
+      <p:nvGrpSpPr>
+        <p:cNvPr id="1" name=""/>
+        <p:cNvGrpSpPr/>
+        <p:nvPr/>
+      </p:nvGrpSpPr>
+      <p:grpSpPr>
+        <a:xfrm>
+          <a:off x="0" y="0"/>
+          <a:ext cx="0" cy="0"/>
+          <a:chOff x="0" y="0"/>
+          <a:chExt cx="0" cy="0"/>
+        </a:xfrm>
+      </p:grpSpPr>
+    </p:spTree>
+    <p:extLst>
+      <p:ext uri="{BB962C8B-B14F-4D97-AF65-F5344CB8AC3E}">
+        <p14:creationId xmlns:p14="http://schemas.microsoft.com/office/powerpoint/2010/main" val="3468511111"/>
       </p:ext>
     </p:extLst>
   </p:cSld>
@@ -5985,6 +6091,45 @@
           </a:p>
         </p:txBody>
       </p:sp>
+      <p:sp>
+        <p:nvSpPr>
+          <p:cNvPr id="29" name="TextBox 28">
+            <a:extLst>
+              <a:ext uri="{FF2B5EF4-FFF2-40B4-BE49-F238E27FC236}">
+                <a16:creationId xmlns:a16="http://schemas.microsoft.com/office/drawing/2014/main" id="{CC56E22A-E1A0-4789-85AE-D5DDBC484162}"/>
+              </a:ext>
+            </a:extLst>
+          </p:cNvPr>
+          <p:cNvSpPr txBox="1"/>
+          <p:nvPr/>
+        </p:nvSpPr>
+        <p:spPr>
+          <a:xfrm>
+            <a:off x="0" y="0"/>
+            <a:ext cx="2581156" cy="369332"/>
+          </a:xfrm>
+          <a:prstGeom prst="rect">
+            <a:avLst/>
+          </a:prstGeom>
+          <a:noFill/>
+        </p:spPr>
+        <p:txBody>
+          <a:bodyPr wrap="none" rtlCol="0">
+            <a:spAutoFit/>
+          </a:bodyPr>
+          <a:lstStyle/>
+          <a:p>
+            <a:r>
+              <a:rPr lang="en-US" altLang="ko-KR" dirty="0"/>
+              <a:t>04. </a:t>
+            </a:r>
+            <a:r>
+              <a:rPr lang="ko-KR" altLang="en-US" dirty="0"/>
+              <a:t>합이 같은 부분집합</a:t>
+            </a:r>
+          </a:p>
+        </p:txBody>
+      </p:sp>
     </p:spTree>
     <p:extLst>
       <p:ext uri="{BB962C8B-B14F-4D97-AF65-F5344CB8AC3E}">
@@ -7171,6 +7316,49 @@
           </a:p>
         </p:txBody>
       </p:sp>
+      <p:sp>
+        <p:nvSpPr>
+          <p:cNvPr id="27" name="TextBox 26">
+            <a:extLst>
+              <a:ext uri="{FF2B5EF4-FFF2-40B4-BE49-F238E27FC236}">
+                <a16:creationId xmlns:a16="http://schemas.microsoft.com/office/drawing/2014/main" id="{4787050D-8E8A-4B2B-9C97-B4B9D864C73A}"/>
+              </a:ext>
+            </a:extLst>
+          </p:cNvPr>
+          <p:cNvSpPr txBox="1"/>
+          <p:nvPr/>
+        </p:nvSpPr>
+        <p:spPr>
+          <a:xfrm>
+            <a:off x="0" y="0"/>
+            <a:ext cx="2268570" cy="369332"/>
+          </a:xfrm>
+          <a:prstGeom prst="rect">
+            <a:avLst/>
+          </a:prstGeom>
+          <a:noFill/>
+        </p:spPr>
+        <p:txBody>
+          <a:bodyPr wrap="none" rtlCol="0">
+            <a:spAutoFit/>
+          </a:bodyPr>
+          <a:lstStyle/>
+          <a:p>
+            <a:r>
+              <a:rPr lang="en-US" altLang="ko-KR" dirty="0"/>
+              <a:t>06. </a:t>
+            </a:r>
+            <a:r>
+              <a:rPr lang="ko-KR" altLang="en-US" dirty="0" err="1"/>
+              <a:t>중복순열</a:t>
+            </a:r>
+            <a:r>
+              <a:rPr lang="ko-KR" altLang="en-US" dirty="0"/>
+              <a:t> 구하기</a:t>
+            </a:r>
+          </a:p>
+        </p:txBody>
+      </p:sp>
     </p:spTree>
     <p:extLst>
       <p:ext uri="{BB962C8B-B14F-4D97-AF65-F5344CB8AC3E}">
@@ -8385,6 +8573,45 @@
           </a:p>
         </p:txBody>
       </p:sp>
+      <p:sp>
+        <p:nvSpPr>
+          <p:cNvPr id="37" name="TextBox 36">
+            <a:extLst>
+              <a:ext uri="{FF2B5EF4-FFF2-40B4-BE49-F238E27FC236}">
+                <a16:creationId xmlns:a16="http://schemas.microsoft.com/office/drawing/2014/main" id="{C4B7060F-7B59-468F-894F-CAF2D88BCD7F}"/>
+              </a:ext>
+            </a:extLst>
+          </p:cNvPr>
+          <p:cNvSpPr txBox="1"/>
+          <p:nvPr/>
+        </p:nvSpPr>
+        <p:spPr>
+          <a:xfrm>
+            <a:off x="0" y="0"/>
+            <a:ext cx="1576072" cy="369332"/>
+          </a:xfrm>
+          <a:prstGeom prst="rect">
+            <a:avLst/>
+          </a:prstGeom>
+          <a:noFill/>
+        </p:spPr>
+        <p:txBody>
+          <a:bodyPr wrap="none" rtlCol="0">
+            <a:spAutoFit/>
+          </a:bodyPr>
+          <a:lstStyle/>
+          <a:p>
+            <a:r>
+              <a:rPr lang="en-US" altLang="ko-KR" dirty="0"/>
+              <a:t>07. </a:t>
+            </a:r>
+            <a:r>
+              <a:rPr lang="ko-KR" altLang="en-US" dirty="0"/>
+              <a:t>동전 교환</a:t>
+            </a:r>
+          </a:p>
+        </p:txBody>
+      </p:sp>
     </p:spTree>
     <p:extLst>
       <p:ext uri="{BB962C8B-B14F-4D97-AF65-F5344CB8AC3E}">
@@ -8415,10 +8642,2029 @@
           <a:chExt cx="0" cy="0"/>
         </a:xfrm>
       </p:grpSpPr>
+      <p:sp>
+        <p:nvSpPr>
+          <p:cNvPr id="2" name="직사각형 1">
+            <a:extLst>
+              <a:ext uri="{FF2B5EF4-FFF2-40B4-BE49-F238E27FC236}">
+                <a16:creationId xmlns:a16="http://schemas.microsoft.com/office/drawing/2014/main" id="{B83F85A3-9E91-4882-B739-D1C48BC1D8C5}"/>
+              </a:ext>
+            </a:extLst>
+          </p:cNvPr>
+          <p:cNvSpPr/>
+          <p:nvPr/>
+        </p:nvSpPr>
+        <p:spPr>
+          <a:xfrm>
+            <a:off x="889192" y="555260"/>
+            <a:ext cx="6632294" cy="5018291"/>
+          </a:xfrm>
+          <a:prstGeom prst="rect">
+            <a:avLst/>
+          </a:prstGeom>
+          <a:solidFill>
+            <a:schemeClr val="bg1">
+              <a:lumMod val="95000"/>
+            </a:schemeClr>
+          </a:solidFill>
+          <a:ln>
+            <a:noFill/>
+          </a:ln>
+        </p:spPr>
+        <p:style>
+          <a:lnRef idx="2">
+            <a:schemeClr val="accent1">
+              <a:shade val="50000"/>
+            </a:schemeClr>
+          </a:lnRef>
+          <a:fillRef idx="1">
+            <a:schemeClr val="accent1"/>
+          </a:fillRef>
+          <a:effectRef idx="0">
+            <a:schemeClr val="accent1"/>
+          </a:effectRef>
+          <a:fontRef idx="minor">
+            <a:schemeClr val="lt1"/>
+          </a:fontRef>
+        </p:style>
+        <p:txBody>
+          <a:bodyPr rtlCol="0" anchor="ctr"/>
+          <a:lstStyle/>
+          <a:p>
+            <a:pPr algn="ctr"/>
+            <a:endParaRPr lang="ko-KR" altLang="en-US" dirty="0"/>
+          </a:p>
+        </p:txBody>
+      </p:sp>
+      <p:sp>
+        <p:nvSpPr>
+          <p:cNvPr id="3" name="직사각형 2">
+            <a:extLst>
+              <a:ext uri="{FF2B5EF4-FFF2-40B4-BE49-F238E27FC236}">
+                <a16:creationId xmlns:a16="http://schemas.microsoft.com/office/drawing/2014/main" id="{B6704C18-118C-4019-810A-2778308666CA}"/>
+              </a:ext>
+            </a:extLst>
+          </p:cNvPr>
+          <p:cNvSpPr/>
+          <p:nvPr/>
+        </p:nvSpPr>
+        <p:spPr>
+          <a:xfrm>
+            <a:off x="4338319" y="695325"/>
+            <a:ext cx="1077168" cy="428625"/>
+          </a:xfrm>
+          <a:prstGeom prst="rect">
+            <a:avLst/>
+          </a:prstGeom>
+        </p:spPr>
+        <p:style>
+          <a:lnRef idx="2">
+            <a:schemeClr val="accent1">
+              <a:shade val="50000"/>
+            </a:schemeClr>
+          </a:lnRef>
+          <a:fillRef idx="1">
+            <a:schemeClr val="accent1"/>
+          </a:fillRef>
+          <a:effectRef idx="0">
+            <a:schemeClr val="accent1"/>
+          </a:effectRef>
+          <a:fontRef idx="minor">
+            <a:schemeClr val="lt1"/>
+          </a:fontRef>
+        </p:style>
+        <p:txBody>
+          <a:bodyPr rtlCol="0" anchor="ctr"/>
+          <a:lstStyle/>
+          <a:p>
+            <a:pPr algn="ctr"/>
+            <a:r>
+              <a:rPr lang="en-US" altLang="ko-KR" dirty="0"/>
+              <a:t>D(0)</a:t>
+            </a:r>
+            <a:endParaRPr lang="ko-KR" altLang="en-US" dirty="0"/>
+          </a:p>
+        </p:txBody>
+      </p:sp>
+      <p:sp>
+        <p:nvSpPr>
+          <p:cNvPr id="4" name="직사각형 3">
+            <a:extLst>
+              <a:ext uri="{FF2B5EF4-FFF2-40B4-BE49-F238E27FC236}">
+                <a16:creationId xmlns:a16="http://schemas.microsoft.com/office/drawing/2014/main" id="{4AF036C7-C91B-42E7-BEBA-062AF6525865}"/>
+              </a:ext>
+            </a:extLst>
+          </p:cNvPr>
+          <p:cNvSpPr/>
+          <p:nvPr/>
+        </p:nvSpPr>
+        <p:spPr>
+          <a:xfrm>
+            <a:off x="3194796" y="1712419"/>
+            <a:ext cx="1077168" cy="428625"/>
+          </a:xfrm>
+          <a:prstGeom prst="rect">
+            <a:avLst/>
+          </a:prstGeom>
+        </p:spPr>
+        <p:style>
+          <a:lnRef idx="2">
+            <a:schemeClr val="accent1">
+              <a:shade val="50000"/>
+            </a:schemeClr>
+          </a:lnRef>
+          <a:fillRef idx="1">
+            <a:schemeClr val="accent1"/>
+          </a:fillRef>
+          <a:effectRef idx="0">
+            <a:schemeClr val="accent1"/>
+          </a:effectRef>
+          <a:fontRef idx="minor">
+            <a:schemeClr val="lt1"/>
+          </a:fontRef>
+        </p:style>
+        <p:txBody>
+          <a:bodyPr rtlCol="0" anchor="ctr"/>
+          <a:lstStyle/>
+          <a:p>
+            <a:pPr algn="ctr"/>
+            <a:r>
+              <a:rPr lang="en-US" altLang="ko-KR" dirty="0"/>
+              <a:t>D(1)</a:t>
+            </a:r>
+            <a:endParaRPr lang="ko-KR" altLang="en-US" dirty="0"/>
+          </a:p>
+        </p:txBody>
+      </p:sp>
+      <p:cxnSp>
+        <p:nvCxnSpPr>
+          <p:cNvPr id="6" name="직선 화살표 연결선 5">
+            <a:extLst>
+              <a:ext uri="{FF2B5EF4-FFF2-40B4-BE49-F238E27FC236}">
+                <a16:creationId xmlns:a16="http://schemas.microsoft.com/office/drawing/2014/main" id="{30C1BADB-DB0D-47BE-B9FB-6199B74B307F}"/>
+              </a:ext>
+            </a:extLst>
+          </p:cNvPr>
+          <p:cNvCxnSpPr>
+            <a:cxnSpLocks/>
+            <a:stCxn id="3" idx="2"/>
+            <a:endCxn id="4" idx="0"/>
+          </p:cNvCxnSpPr>
+          <p:nvPr/>
+        </p:nvCxnSpPr>
+        <p:spPr>
+          <a:xfrm flipH="1">
+            <a:off x="3733380" y="1123950"/>
+            <a:ext cx="1143523" cy="588469"/>
+          </a:xfrm>
+          <a:prstGeom prst="straightConnector1">
+            <a:avLst/>
+          </a:prstGeom>
+          <a:ln w="15875">
+            <a:tailEnd type="triangle" w="lg" len="med"/>
+          </a:ln>
+        </p:spPr>
+        <p:style>
+          <a:lnRef idx="1">
+            <a:schemeClr val="accent1"/>
+          </a:lnRef>
+          <a:fillRef idx="0">
+            <a:schemeClr val="accent1"/>
+          </a:fillRef>
+          <a:effectRef idx="0">
+            <a:schemeClr val="accent1"/>
+          </a:effectRef>
+          <a:fontRef idx="minor">
+            <a:schemeClr val="tx1"/>
+          </a:fontRef>
+        </p:style>
+      </p:cxnSp>
+      <p:cxnSp>
+        <p:nvCxnSpPr>
+          <p:cNvPr id="7" name="직선 화살표 연결선 6">
+            <a:extLst>
+              <a:ext uri="{FF2B5EF4-FFF2-40B4-BE49-F238E27FC236}">
+                <a16:creationId xmlns:a16="http://schemas.microsoft.com/office/drawing/2014/main" id="{2EC7DCED-9934-4A84-9311-58C02E841717}"/>
+              </a:ext>
+            </a:extLst>
+          </p:cNvPr>
+          <p:cNvCxnSpPr>
+            <a:cxnSpLocks/>
+            <a:stCxn id="3" idx="2"/>
+            <a:endCxn id="35" idx="0"/>
+          </p:cNvCxnSpPr>
+          <p:nvPr/>
+        </p:nvCxnSpPr>
+        <p:spPr>
+          <a:xfrm>
+            <a:off x="4876903" y="1123950"/>
+            <a:ext cx="1159703" cy="600073"/>
+          </a:xfrm>
+          <a:prstGeom prst="straightConnector1">
+            <a:avLst/>
+          </a:prstGeom>
+          <a:ln w="15875">
+            <a:solidFill>
+              <a:srgbClr val="FF0000"/>
+            </a:solidFill>
+            <a:tailEnd type="triangle" w="lg" len="med"/>
+          </a:ln>
+        </p:spPr>
+        <p:style>
+          <a:lnRef idx="1">
+            <a:schemeClr val="accent1"/>
+          </a:lnRef>
+          <a:fillRef idx="0">
+            <a:schemeClr val="accent1"/>
+          </a:fillRef>
+          <a:effectRef idx="0">
+            <a:schemeClr val="accent1"/>
+          </a:effectRef>
+          <a:fontRef idx="minor">
+            <a:schemeClr val="tx1"/>
+          </a:fontRef>
+        </p:style>
+      </p:cxnSp>
+      <p:sp>
+        <p:nvSpPr>
+          <p:cNvPr id="9" name="직사각형 8">
+            <a:extLst>
+              <a:ext uri="{FF2B5EF4-FFF2-40B4-BE49-F238E27FC236}">
+                <a16:creationId xmlns:a16="http://schemas.microsoft.com/office/drawing/2014/main" id="{DD180A9A-7472-4FB0-A853-A331827F00FF}"/>
+              </a:ext>
+            </a:extLst>
+          </p:cNvPr>
+          <p:cNvSpPr/>
+          <p:nvPr/>
+        </p:nvSpPr>
+        <p:spPr>
+          <a:xfrm>
+            <a:off x="2324823" y="3169413"/>
+            <a:ext cx="1077168" cy="428625"/>
+          </a:xfrm>
+          <a:prstGeom prst="rect">
+            <a:avLst/>
+          </a:prstGeom>
+        </p:spPr>
+        <p:style>
+          <a:lnRef idx="2">
+            <a:schemeClr val="accent1">
+              <a:shade val="50000"/>
+            </a:schemeClr>
+          </a:lnRef>
+          <a:fillRef idx="1">
+            <a:schemeClr val="accent1"/>
+          </a:fillRef>
+          <a:effectRef idx="0">
+            <a:schemeClr val="accent1"/>
+          </a:effectRef>
+          <a:fontRef idx="minor">
+            <a:schemeClr val="lt1"/>
+          </a:fontRef>
+        </p:style>
+        <p:txBody>
+          <a:bodyPr rtlCol="0" anchor="ctr"/>
+          <a:lstStyle/>
+          <a:p>
+            <a:pPr algn="ctr"/>
+            <a:r>
+              <a:rPr lang="en-US" altLang="ko-KR" dirty="0"/>
+              <a:t>D(2)</a:t>
+            </a:r>
+            <a:endParaRPr lang="ko-KR" altLang="en-US" dirty="0"/>
+          </a:p>
+        </p:txBody>
+      </p:sp>
+      <p:cxnSp>
+        <p:nvCxnSpPr>
+          <p:cNvPr id="11" name="직선 화살표 연결선 10">
+            <a:extLst>
+              <a:ext uri="{FF2B5EF4-FFF2-40B4-BE49-F238E27FC236}">
+                <a16:creationId xmlns:a16="http://schemas.microsoft.com/office/drawing/2014/main" id="{ADDD9212-727B-4DA5-9B8D-774AEF2C5EDB}"/>
+              </a:ext>
+            </a:extLst>
+          </p:cNvPr>
+          <p:cNvCxnSpPr>
+            <a:cxnSpLocks/>
+            <a:stCxn id="4" idx="2"/>
+            <a:endCxn id="9" idx="0"/>
+          </p:cNvCxnSpPr>
+          <p:nvPr/>
+        </p:nvCxnSpPr>
+        <p:spPr>
+          <a:xfrm flipH="1">
+            <a:off x="2863407" y="2141044"/>
+            <a:ext cx="869973" cy="1028369"/>
+          </a:xfrm>
+          <a:prstGeom prst="straightConnector1">
+            <a:avLst/>
+          </a:prstGeom>
+          <a:ln w="15875">
+            <a:tailEnd type="triangle" w="lg" len="med"/>
+          </a:ln>
+        </p:spPr>
+        <p:style>
+          <a:lnRef idx="1">
+            <a:schemeClr val="accent1"/>
+          </a:lnRef>
+          <a:fillRef idx="0">
+            <a:schemeClr val="accent1"/>
+          </a:fillRef>
+          <a:effectRef idx="0">
+            <a:schemeClr val="accent1"/>
+          </a:effectRef>
+          <a:fontRef idx="minor">
+            <a:schemeClr val="tx1"/>
+          </a:fontRef>
+        </p:style>
+      </p:cxnSp>
+      <p:cxnSp>
+        <p:nvCxnSpPr>
+          <p:cNvPr id="12" name="직선 화살표 연결선 11">
+            <a:extLst>
+              <a:ext uri="{FF2B5EF4-FFF2-40B4-BE49-F238E27FC236}">
+                <a16:creationId xmlns:a16="http://schemas.microsoft.com/office/drawing/2014/main" id="{34085AAB-DBDF-43AD-B2D5-5A9708CF2C6A}"/>
+              </a:ext>
+            </a:extLst>
+          </p:cNvPr>
+          <p:cNvCxnSpPr>
+            <a:cxnSpLocks/>
+            <a:stCxn id="4" idx="2"/>
+          </p:cNvCxnSpPr>
+          <p:nvPr/>
+        </p:nvCxnSpPr>
+        <p:spPr>
+          <a:xfrm>
+            <a:off x="3733380" y="2141044"/>
+            <a:ext cx="689306" cy="1028368"/>
+          </a:xfrm>
+          <a:prstGeom prst="straightConnector1">
+            <a:avLst/>
+          </a:prstGeom>
+          <a:ln w="15875">
+            <a:solidFill>
+              <a:srgbClr val="FF0000"/>
+            </a:solidFill>
+            <a:tailEnd type="triangle" w="lg" len="med"/>
+          </a:ln>
+        </p:spPr>
+        <p:style>
+          <a:lnRef idx="1">
+            <a:schemeClr val="accent1"/>
+          </a:lnRef>
+          <a:fillRef idx="0">
+            <a:schemeClr val="accent1"/>
+          </a:fillRef>
+          <a:effectRef idx="0">
+            <a:schemeClr val="accent1"/>
+          </a:effectRef>
+          <a:fontRef idx="minor">
+            <a:schemeClr val="tx1"/>
+          </a:fontRef>
+        </p:style>
+      </p:cxnSp>
+      <p:sp>
+        <p:nvSpPr>
+          <p:cNvPr id="13" name="TextBox 12">
+            <a:extLst>
+              <a:ext uri="{FF2B5EF4-FFF2-40B4-BE49-F238E27FC236}">
+                <a16:creationId xmlns:a16="http://schemas.microsoft.com/office/drawing/2014/main" id="{4292A6DB-E07E-48C6-A267-BC1B1B7882E3}"/>
+              </a:ext>
+            </a:extLst>
+          </p:cNvPr>
+          <p:cNvSpPr txBox="1"/>
+          <p:nvPr/>
+        </p:nvSpPr>
+        <p:spPr>
+          <a:xfrm>
+            <a:off x="3745758" y="1249027"/>
+            <a:ext cx="2199641" cy="369332"/>
+          </a:xfrm>
+          <a:prstGeom prst="rect">
+            <a:avLst/>
+          </a:prstGeom>
+          <a:noFill/>
+        </p:spPr>
+        <p:txBody>
+          <a:bodyPr wrap="none" rtlCol="0">
+            <a:spAutoFit/>
+          </a:bodyPr>
+          <a:lstStyle/>
+          <a:p>
+            <a:r>
+              <a:rPr lang="en-US" altLang="ko-KR" dirty="0">
+                <a:solidFill>
+                  <a:srgbClr val="0000FF"/>
+                </a:solidFill>
+              </a:rPr>
+              <a:t>1          2          3</a:t>
+            </a:r>
+            <a:endParaRPr lang="ko-KR" altLang="en-US" dirty="0">
+              <a:solidFill>
+                <a:srgbClr val="FF0000"/>
+              </a:solidFill>
+            </a:endParaRPr>
+          </a:p>
+        </p:txBody>
+      </p:sp>
+      <p:sp>
+        <p:nvSpPr>
+          <p:cNvPr id="25" name="TextBox 24">
+            <a:extLst>
+              <a:ext uri="{FF2B5EF4-FFF2-40B4-BE49-F238E27FC236}">
+                <a16:creationId xmlns:a16="http://schemas.microsoft.com/office/drawing/2014/main" id="{68653746-A6D1-419F-9988-FB3D79AA3613}"/>
+              </a:ext>
+            </a:extLst>
+          </p:cNvPr>
+          <p:cNvSpPr txBox="1"/>
+          <p:nvPr/>
+        </p:nvSpPr>
+        <p:spPr>
+          <a:xfrm>
+            <a:off x="3681405" y="4411964"/>
+            <a:ext cx="4804520" cy="2308324"/>
+          </a:xfrm>
+          <a:prstGeom prst="rect">
+            <a:avLst/>
+          </a:prstGeom>
+          <a:noFill/>
+        </p:spPr>
+        <p:txBody>
+          <a:bodyPr wrap="none" rtlCol="0">
+            <a:spAutoFit/>
+          </a:bodyPr>
+          <a:lstStyle/>
+          <a:p>
+            <a:r>
+              <a:rPr lang="en-US" altLang="ko-KR" sz="1600" dirty="0"/>
+              <a:t>res </a:t>
+            </a:r>
+            <a:r>
+              <a:rPr lang="ko-KR" altLang="en-US" sz="1600" dirty="0"/>
+              <a:t>에 횟수 만큼 배열 만들고</a:t>
+            </a:r>
+            <a:r>
+              <a:rPr lang="en-US" altLang="ko-KR" sz="1600" dirty="0"/>
+              <a:t>, </a:t>
+            </a:r>
+          </a:p>
+          <a:p>
+            <a:r>
+              <a:rPr lang="ko-KR" altLang="en-US" sz="1600" dirty="0"/>
+              <a:t>뻗었을 때 그 값을 넣어 줌</a:t>
+            </a:r>
+            <a:endParaRPr lang="en-US" altLang="ko-KR" sz="1600" dirty="0"/>
+          </a:p>
+          <a:p>
+            <a:endParaRPr lang="en-US" altLang="ko-KR" sz="1600" dirty="0"/>
+          </a:p>
+          <a:p>
+            <a:r>
+              <a:rPr lang="en-US" altLang="ko-KR" sz="1600" dirty="0"/>
+              <a:t>D(2) </a:t>
+            </a:r>
+            <a:r>
+              <a:rPr lang="ko-KR" altLang="en-US" sz="1600" dirty="0"/>
+              <a:t>에서는 출력하고 </a:t>
+            </a:r>
+            <a:r>
+              <a:rPr lang="en-US" altLang="ko-KR" sz="1600" dirty="0"/>
+              <a:t>stop</a:t>
+            </a:r>
+          </a:p>
+          <a:p>
+            <a:endParaRPr lang="en-US" altLang="ko-KR" sz="1600" dirty="0"/>
+          </a:p>
+          <a:p>
+            <a:r>
+              <a:rPr lang="ko-KR" altLang="en-US" sz="1600" dirty="0"/>
+              <a:t>중복을 허용하지 않으므로 </a:t>
+            </a:r>
+            <a:r>
+              <a:rPr lang="en-US" altLang="ko-KR" sz="1600" dirty="0" err="1"/>
+              <a:t>ch</a:t>
+            </a:r>
+            <a:r>
+              <a:rPr lang="en-US" altLang="ko-KR" sz="1600" dirty="0"/>
+              <a:t> </a:t>
+            </a:r>
+            <a:r>
+              <a:rPr lang="ko-KR" altLang="en-US" sz="1600" dirty="0"/>
+              <a:t>에 체크되어 있으면 </a:t>
+            </a:r>
+            <a:endParaRPr lang="en-US" altLang="ko-KR" sz="1600" dirty="0"/>
+          </a:p>
+          <a:p>
+            <a:r>
+              <a:rPr lang="ko-KR" altLang="en-US" sz="1600" dirty="0"/>
+              <a:t>가지 않는다</a:t>
+            </a:r>
+            <a:endParaRPr lang="en-US" altLang="ko-KR" sz="1600" dirty="0"/>
+          </a:p>
+          <a:p>
+            <a:endParaRPr lang="en-US" altLang="ko-KR" sz="1600" dirty="0"/>
+          </a:p>
+          <a:p>
+            <a:r>
+              <a:rPr lang="ko-KR" altLang="en-US" sz="1600" dirty="0"/>
+              <a:t>왔다 갈 때는 다시 </a:t>
+            </a:r>
+            <a:r>
+              <a:rPr lang="en-US" altLang="ko-KR" sz="1600" dirty="0"/>
+              <a:t>0 </a:t>
+            </a:r>
+            <a:r>
+              <a:rPr lang="ko-KR" altLang="en-US" sz="1600" dirty="0"/>
+              <a:t>으로 </a:t>
+            </a:r>
+            <a:r>
+              <a:rPr lang="ko-KR" altLang="en-US" sz="1600" dirty="0" err="1"/>
+              <a:t>셋팅한다</a:t>
+            </a:r>
+            <a:r>
+              <a:rPr lang="ko-KR" altLang="en-US" sz="1600" dirty="0"/>
+              <a:t> </a:t>
+            </a:r>
+          </a:p>
+        </p:txBody>
+      </p:sp>
+      <p:sp>
+        <p:nvSpPr>
+          <p:cNvPr id="26" name="TextBox 25">
+            <a:extLst>
+              <a:ext uri="{FF2B5EF4-FFF2-40B4-BE49-F238E27FC236}">
+                <a16:creationId xmlns:a16="http://schemas.microsoft.com/office/drawing/2014/main" id="{17A744BC-6B4F-4099-80B4-2F0FCC53C1C7}"/>
+              </a:ext>
+            </a:extLst>
+          </p:cNvPr>
+          <p:cNvSpPr txBox="1"/>
+          <p:nvPr/>
+        </p:nvSpPr>
+        <p:spPr>
+          <a:xfrm>
+            <a:off x="3905031" y="3093270"/>
+            <a:ext cx="800219" cy="523220"/>
+          </a:xfrm>
+          <a:prstGeom prst="rect">
+            <a:avLst/>
+          </a:prstGeom>
+          <a:noFill/>
+        </p:spPr>
+        <p:txBody>
+          <a:bodyPr wrap="none" rtlCol="0">
+            <a:spAutoFit/>
+          </a:bodyPr>
+          <a:lstStyle/>
+          <a:p>
+            <a:r>
+              <a:rPr lang="en-US" altLang="ko-KR" sz="2800" dirty="0"/>
+              <a:t>. . . </a:t>
+            </a:r>
+            <a:endParaRPr lang="ko-KR" altLang="en-US" sz="2800" dirty="0"/>
+          </a:p>
+        </p:txBody>
+      </p:sp>
+      <p:sp>
+        <p:nvSpPr>
+          <p:cNvPr id="31" name="TextBox 30">
+            <a:extLst>
+              <a:ext uri="{FF2B5EF4-FFF2-40B4-BE49-F238E27FC236}">
+                <a16:creationId xmlns:a16="http://schemas.microsoft.com/office/drawing/2014/main" id="{F37B00DD-DB93-42E5-B14D-4592C54A248B}"/>
+              </a:ext>
+            </a:extLst>
+          </p:cNvPr>
+          <p:cNvSpPr txBox="1"/>
+          <p:nvPr/>
+        </p:nvSpPr>
+        <p:spPr>
+          <a:xfrm>
+            <a:off x="889192" y="678139"/>
+            <a:ext cx="705642" cy="523220"/>
+          </a:xfrm>
+          <a:prstGeom prst="rect">
+            <a:avLst/>
+          </a:prstGeom>
+          <a:noFill/>
+        </p:spPr>
+        <p:txBody>
+          <a:bodyPr wrap="none" rtlCol="0">
+            <a:spAutoFit/>
+          </a:bodyPr>
+          <a:lstStyle/>
+          <a:p>
+            <a:r>
+              <a:rPr lang="ko-KR" altLang="en-US" sz="1400" dirty="0"/>
+              <a:t>구슬 </a:t>
+            </a:r>
+            <a:r>
+              <a:rPr lang="en-US" altLang="ko-KR" sz="1400" dirty="0"/>
+              <a:t>3</a:t>
+            </a:r>
+          </a:p>
+          <a:p>
+            <a:r>
+              <a:rPr lang="ko-KR" altLang="en-US" sz="1400" dirty="0"/>
+              <a:t>횟수 </a:t>
+            </a:r>
+            <a:r>
+              <a:rPr lang="en-US" altLang="ko-KR" sz="1400" dirty="0"/>
+              <a:t>2</a:t>
+            </a:r>
+            <a:endParaRPr lang="ko-KR" altLang="en-US" sz="1400" dirty="0"/>
+          </a:p>
+        </p:txBody>
+      </p:sp>
+      <p:cxnSp>
+        <p:nvCxnSpPr>
+          <p:cNvPr id="29" name="직선 화살표 연결선 28">
+            <a:extLst>
+              <a:ext uri="{FF2B5EF4-FFF2-40B4-BE49-F238E27FC236}">
+                <a16:creationId xmlns:a16="http://schemas.microsoft.com/office/drawing/2014/main" id="{9C7C0AFE-2305-4D89-9313-83FF9F9C84DB}"/>
+              </a:ext>
+            </a:extLst>
+          </p:cNvPr>
+          <p:cNvCxnSpPr>
+            <a:cxnSpLocks/>
+            <a:stCxn id="3" idx="2"/>
+            <a:endCxn id="34" idx="0"/>
+          </p:cNvCxnSpPr>
+          <p:nvPr/>
+        </p:nvCxnSpPr>
+        <p:spPr>
+          <a:xfrm>
+            <a:off x="4876903" y="1123950"/>
+            <a:ext cx="0" cy="600074"/>
+          </a:xfrm>
+          <a:prstGeom prst="straightConnector1">
+            <a:avLst/>
+          </a:prstGeom>
+          <a:ln w="15875">
+            <a:solidFill>
+              <a:srgbClr val="FF0000"/>
+            </a:solidFill>
+            <a:tailEnd type="triangle" w="lg" len="med"/>
+          </a:ln>
+        </p:spPr>
+        <p:style>
+          <a:lnRef idx="1">
+            <a:schemeClr val="accent1"/>
+          </a:lnRef>
+          <a:fillRef idx="0">
+            <a:schemeClr val="accent1"/>
+          </a:fillRef>
+          <a:effectRef idx="0">
+            <a:schemeClr val="accent1"/>
+          </a:effectRef>
+          <a:fontRef idx="minor">
+            <a:schemeClr val="tx1"/>
+          </a:fontRef>
+        </p:style>
+      </p:cxnSp>
+      <p:sp>
+        <p:nvSpPr>
+          <p:cNvPr id="34" name="직사각형 33">
+            <a:extLst>
+              <a:ext uri="{FF2B5EF4-FFF2-40B4-BE49-F238E27FC236}">
+                <a16:creationId xmlns:a16="http://schemas.microsoft.com/office/drawing/2014/main" id="{ABECE2D1-7B0A-490B-83F1-B281DD342FB9}"/>
+              </a:ext>
+            </a:extLst>
+          </p:cNvPr>
+          <p:cNvSpPr/>
+          <p:nvPr/>
+        </p:nvSpPr>
+        <p:spPr>
+          <a:xfrm>
+            <a:off x="4338319" y="1724024"/>
+            <a:ext cx="1077168" cy="428625"/>
+          </a:xfrm>
+          <a:prstGeom prst="rect">
+            <a:avLst/>
+          </a:prstGeom>
+        </p:spPr>
+        <p:style>
+          <a:lnRef idx="2">
+            <a:schemeClr val="accent1">
+              <a:shade val="50000"/>
+            </a:schemeClr>
+          </a:lnRef>
+          <a:fillRef idx="1">
+            <a:schemeClr val="accent1"/>
+          </a:fillRef>
+          <a:effectRef idx="0">
+            <a:schemeClr val="accent1"/>
+          </a:effectRef>
+          <a:fontRef idx="minor">
+            <a:schemeClr val="lt1"/>
+          </a:fontRef>
+        </p:style>
+        <p:txBody>
+          <a:bodyPr rtlCol="0" anchor="ctr"/>
+          <a:lstStyle/>
+          <a:p>
+            <a:pPr algn="ctr"/>
+            <a:r>
+              <a:rPr lang="en-US" altLang="ko-KR" dirty="0"/>
+              <a:t>D(1)</a:t>
+            </a:r>
+            <a:endParaRPr lang="ko-KR" altLang="en-US" dirty="0"/>
+          </a:p>
+        </p:txBody>
+      </p:sp>
+      <p:sp>
+        <p:nvSpPr>
+          <p:cNvPr id="35" name="직사각형 34">
+            <a:extLst>
+              <a:ext uri="{FF2B5EF4-FFF2-40B4-BE49-F238E27FC236}">
+                <a16:creationId xmlns:a16="http://schemas.microsoft.com/office/drawing/2014/main" id="{C56F9B67-E6B6-444D-B011-398A88629926}"/>
+              </a:ext>
+            </a:extLst>
+          </p:cNvPr>
+          <p:cNvSpPr/>
+          <p:nvPr/>
+        </p:nvSpPr>
+        <p:spPr>
+          <a:xfrm>
+            <a:off x="5498022" y="1724023"/>
+            <a:ext cx="1077168" cy="428625"/>
+          </a:xfrm>
+          <a:prstGeom prst="rect">
+            <a:avLst/>
+          </a:prstGeom>
+        </p:spPr>
+        <p:style>
+          <a:lnRef idx="2">
+            <a:schemeClr val="accent1">
+              <a:shade val="50000"/>
+            </a:schemeClr>
+          </a:lnRef>
+          <a:fillRef idx="1">
+            <a:schemeClr val="accent1"/>
+          </a:fillRef>
+          <a:effectRef idx="0">
+            <a:schemeClr val="accent1"/>
+          </a:effectRef>
+          <a:fontRef idx="minor">
+            <a:schemeClr val="lt1"/>
+          </a:fontRef>
+        </p:style>
+        <p:txBody>
+          <a:bodyPr rtlCol="0" anchor="ctr"/>
+          <a:lstStyle/>
+          <a:p>
+            <a:pPr algn="ctr"/>
+            <a:r>
+              <a:rPr lang="en-US" altLang="ko-KR" dirty="0"/>
+              <a:t>D(1)</a:t>
+            </a:r>
+            <a:endParaRPr lang="ko-KR" altLang="en-US" dirty="0"/>
+          </a:p>
+        </p:txBody>
+      </p:sp>
+      <p:cxnSp>
+        <p:nvCxnSpPr>
+          <p:cNvPr id="41" name="직선 화살표 연결선 40">
+            <a:extLst>
+              <a:ext uri="{FF2B5EF4-FFF2-40B4-BE49-F238E27FC236}">
+                <a16:creationId xmlns:a16="http://schemas.microsoft.com/office/drawing/2014/main" id="{AEBA5115-3C84-4776-88CD-354F073D6878}"/>
+              </a:ext>
+            </a:extLst>
+          </p:cNvPr>
+          <p:cNvCxnSpPr>
+            <a:cxnSpLocks/>
+            <a:stCxn id="4" idx="2"/>
+          </p:cNvCxnSpPr>
+          <p:nvPr/>
+        </p:nvCxnSpPr>
+        <p:spPr>
+          <a:xfrm>
+            <a:off x="3733380" y="2141044"/>
+            <a:ext cx="12378" cy="1028368"/>
+          </a:xfrm>
+          <a:prstGeom prst="straightConnector1">
+            <a:avLst/>
+          </a:prstGeom>
+          <a:ln w="15875">
+            <a:solidFill>
+              <a:srgbClr val="FF0000"/>
+            </a:solidFill>
+            <a:tailEnd type="triangle" w="lg" len="med"/>
+          </a:ln>
+        </p:spPr>
+        <p:style>
+          <a:lnRef idx="1">
+            <a:schemeClr val="accent1"/>
+          </a:lnRef>
+          <a:fillRef idx="0">
+            <a:schemeClr val="accent1"/>
+          </a:fillRef>
+          <a:effectRef idx="0">
+            <a:schemeClr val="accent1"/>
+          </a:effectRef>
+          <a:fontRef idx="minor">
+            <a:schemeClr val="tx1"/>
+          </a:fontRef>
+        </p:style>
+      </p:cxnSp>
+      <p:sp>
+        <p:nvSpPr>
+          <p:cNvPr id="49" name="&quot;허용 안 됨&quot; 기호 48">
+            <a:extLst>
+              <a:ext uri="{FF2B5EF4-FFF2-40B4-BE49-F238E27FC236}">
+                <a16:creationId xmlns:a16="http://schemas.microsoft.com/office/drawing/2014/main" id="{72F35C74-A8C6-43BC-9C75-43E52989A741}"/>
+              </a:ext>
+            </a:extLst>
+          </p:cNvPr>
+          <p:cNvSpPr/>
+          <p:nvPr/>
+        </p:nvSpPr>
+        <p:spPr>
+          <a:xfrm>
+            <a:off x="3060152" y="2774966"/>
+            <a:ext cx="313952" cy="318304"/>
+          </a:xfrm>
+          <a:prstGeom prst="noSmoking">
+            <a:avLst/>
+          </a:prstGeom>
+          <a:solidFill>
+            <a:srgbClr val="FF0000"/>
+          </a:solidFill>
+          <a:ln>
+            <a:solidFill>
+              <a:srgbClr val="FF0000"/>
+            </a:solidFill>
+          </a:ln>
+        </p:spPr>
+        <p:style>
+          <a:lnRef idx="2">
+            <a:schemeClr val="accent1">
+              <a:shade val="50000"/>
+            </a:schemeClr>
+          </a:lnRef>
+          <a:fillRef idx="1">
+            <a:schemeClr val="accent1"/>
+          </a:fillRef>
+          <a:effectRef idx="0">
+            <a:schemeClr val="accent1"/>
+          </a:effectRef>
+          <a:fontRef idx="minor">
+            <a:schemeClr val="lt1"/>
+          </a:fontRef>
+        </p:style>
+        <p:txBody>
+          <a:bodyPr rtlCol="0" anchor="ctr"/>
+          <a:lstStyle/>
+          <a:p>
+            <a:pPr algn="ctr"/>
+            <a:endParaRPr lang="ko-KR" altLang="en-US">
+              <a:solidFill>
+                <a:schemeClr val="tx1"/>
+              </a:solidFill>
+            </a:endParaRPr>
+          </a:p>
+        </p:txBody>
+      </p:sp>
+      <p:sp>
+        <p:nvSpPr>
+          <p:cNvPr id="50" name="TextBox 49">
+            <a:extLst>
+              <a:ext uri="{FF2B5EF4-FFF2-40B4-BE49-F238E27FC236}">
+                <a16:creationId xmlns:a16="http://schemas.microsoft.com/office/drawing/2014/main" id="{FF12CCA2-E776-4FFC-8D0C-028AC773ED69}"/>
+              </a:ext>
+            </a:extLst>
+          </p:cNvPr>
+          <p:cNvSpPr txBox="1"/>
+          <p:nvPr/>
+        </p:nvSpPr>
+        <p:spPr>
+          <a:xfrm>
+            <a:off x="2895996" y="2524744"/>
+            <a:ext cx="1545616" cy="369332"/>
+          </a:xfrm>
+          <a:prstGeom prst="rect">
+            <a:avLst/>
+          </a:prstGeom>
+          <a:noFill/>
+        </p:spPr>
+        <p:txBody>
+          <a:bodyPr wrap="none" rtlCol="0">
+            <a:spAutoFit/>
+          </a:bodyPr>
+          <a:lstStyle/>
+          <a:p>
+            <a:r>
+              <a:rPr lang="en-US" altLang="ko-KR" dirty="0">
+                <a:solidFill>
+                  <a:srgbClr val="0000FF"/>
+                </a:solidFill>
+              </a:rPr>
+              <a:t>1      2      3</a:t>
+            </a:r>
+            <a:endParaRPr lang="ko-KR" altLang="en-US" dirty="0">
+              <a:solidFill>
+                <a:srgbClr val="FF0000"/>
+              </a:solidFill>
+            </a:endParaRPr>
+          </a:p>
+        </p:txBody>
+      </p:sp>
+      <p:graphicFrame>
+        <p:nvGraphicFramePr>
+          <p:cNvPr id="51" name="표 50">
+            <a:extLst>
+              <a:ext uri="{FF2B5EF4-FFF2-40B4-BE49-F238E27FC236}">
+                <a16:creationId xmlns:a16="http://schemas.microsoft.com/office/drawing/2014/main" id="{1EBFCB8B-9D5C-4F53-91D8-F933803E2482}"/>
+              </a:ext>
+            </a:extLst>
+          </p:cNvPr>
+          <p:cNvGraphicFramePr>
+            <a:graphicFrameLocks noGrp="1"/>
+          </p:cNvGraphicFramePr>
+          <p:nvPr>
+            <p:extLst>
+              <p:ext uri="{D42A27DB-BD31-4B8C-83A1-F6EECF244321}">
+                <p14:modId xmlns:p14="http://schemas.microsoft.com/office/powerpoint/2010/main" val="1632902044"/>
+              </p:ext>
+            </p:extLst>
+          </p:nvPr>
+        </p:nvGraphicFramePr>
+        <p:xfrm>
+          <a:off x="1727328" y="1849460"/>
+          <a:ext cx="665772" cy="370840"/>
+        </p:xfrm>
+        <a:graphic>
+          <a:graphicData uri="http://schemas.openxmlformats.org/drawingml/2006/table">
+            <a:tbl>
+              <a:tblPr firstRow="1" bandRow="1">
+                <a:tableStyleId>{5C22544A-7EE6-4342-B048-85BDC9FD1C3A}</a:tableStyleId>
+              </a:tblPr>
+              <a:tblGrid>
+                <a:gridCol w="313055">
+                  <a:extLst>
+                    <a:ext uri="{9D8B030D-6E8A-4147-A177-3AD203B41FA5}">
+                      <a16:colId xmlns:a16="http://schemas.microsoft.com/office/drawing/2014/main" val="662917937"/>
+                    </a:ext>
+                  </a:extLst>
+                </a:gridCol>
+                <a:gridCol w="352717">
+                  <a:extLst>
+                    <a:ext uri="{9D8B030D-6E8A-4147-A177-3AD203B41FA5}">
+                      <a16:colId xmlns:a16="http://schemas.microsoft.com/office/drawing/2014/main" val="3082420159"/>
+                    </a:ext>
+                  </a:extLst>
+                </a:gridCol>
+              </a:tblGrid>
+              <a:tr h="370840">
+                <a:tc>
+                  <a:txBody>
+                    <a:bodyPr/>
+                    <a:lstStyle/>
+                    <a:p>
+                      <a:pPr latinLnBrk="1"/>
+                      <a:r>
+                        <a:rPr lang="en-US" altLang="ko-KR" sz="1100" dirty="0"/>
+                        <a:t>1</a:t>
+                      </a:r>
+                      <a:endParaRPr lang="ko-KR" altLang="en-US" sz="1100" dirty="0"/>
+                    </a:p>
+                  </a:txBody>
+                  <a:tcPr anchor="ctr"/>
+                </a:tc>
+                <a:tc>
+                  <a:txBody>
+                    <a:bodyPr/>
+                    <a:lstStyle/>
+                    <a:p>
+                      <a:pPr latinLnBrk="1"/>
+                      <a:r>
+                        <a:rPr lang="en-US" altLang="ko-KR" sz="1100" dirty="0"/>
+                        <a:t>1</a:t>
+                      </a:r>
+                      <a:endParaRPr lang="ko-KR" altLang="en-US" sz="1100" dirty="0"/>
+                    </a:p>
+                  </a:txBody>
+                  <a:tcPr anchor="ctr"/>
+                </a:tc>
+                <a:extLst>
+                  <a:ext uri="{0D108BD9-81ED-4DB2-BD59-A6C34878D82A}">
+                    <a16:rowId xmlns:a16="http://schemas.microsoft.com/office/drawing/2014/main" val="547838226"/>
+                  </a:ext>
+                </a:extLst>
+              </a:tr>
+            </a:tbl>
+          </a:graphicData>
+        </a:graphic>
+      </p:graphicFrame>
+      <p:sp>
+        <p:nvSpPr>
+          <p:cNvPr id="52" name="TextBox 51">
+            <a:extLst>
+              <a:ext uri="{FF2B5EF4-FFF2-40B4-BE49-F238E27FC236}">
+                <a16:creationId xmlns:a16="http://schemas.microsoft.com/office/drawing/2014/main" id="{08A227A7-7B93-4738-A395-F5AFC593C574}"/>
+              </a:ext>
+            </a:extLst>
+          </p:cNvPr>
+          <p:cNvSpPr txBox="1"/>
+          <p:nvPr/>
+        </p:nvSpPr>
+        <p:spPr>
+          <a:xfrm>
+            <a:off x="1418462" y="1346541"/>
+            <a:ext cx="1664879" cy="523220"/>
+          </a:xfrm>
+          <a:prstGeom prst="rect">
+            <a:avLst/>
+          </a:prstGeom>
+          <a:noFill/>
+        </p:spPr>
+        <p:txBody>
+          <a:bodyPr wrap="none" rtlCol="0">
+            <a:spAutoFit/>
+          </a:bodyPr>
+          <a:lstStyle/>
+          <a:p>
+            <a:r>
+              <a:rPr lang="en-US" altLang="ko-KR" sz="1400" dirty="0"/>
+              <a:t>1</a:t>
+            </a:r>
+            <a:r>
+              <a:rPr lang="ko-KR" altLang="en-US" sz="1400" dirty="0" err="1"/>
+              <a:t>일때</a:t>
+            </a:r>
+            <a:endParaRPr lang="en-US" altLang="ko-KR" sz="1400" dirty="0"/>
+          </a:p>
+          <a:p>
+            <a:r>
+              <a:rPr lang="en-US" altLang="ko-KR" sz="1400" dirty="0"/>
+              <a:t>res</a:t>
+            </a:r>
+            <a:r>
+              <a:rPr lang="ko-KR" altLang="en-US" sz="1400" dirty="0"/>
+              <a:t> </a:t>
+            </a:r>
+            <a:r>
+              <a:rPr lang="en-US" altLang="ko-KR" sz="1400" dirty="0"/>
+              <a:t>0    1   (index)</a:t>
+            </a:r>
+            <a:endParaRPr lang="ko-KR" altLang="en-US" sz="1400" dirty="0"/>
+          </a:p>
+        </p:txBody>
+      </p:sp>
+      <p:graphicFrame>
+        <p:nvGraphicFramePr>
+          <p:cNvPr id="53" name="표 52">
+            <a:extLst>
+              <a:ext uri="{FF2B5EF4-FFF2-40B4-BE49-F238E27FC236}">
+                <a16:creationId xmlns:a16="http://schemas.microsoft.com/office/drawing/2014/main" id="{CEA02818-DB38-485F-9BAF-282CAB297124}"/>
+              </a:ext>
+            </a:extLst>
+          </p:cNvPr>
+          <p:cNvGraphicFramePr>
+            <a:graphicFrameLocks noGrp="1"/>
+          </p:cNvGraphicFramePr>
+          <p:nvPr>
+            <p:extLst>
+              <p:ext uri="{D42A27DB-BD31-4B8C-83A1-F6EECF244321}">
+                <p14:modId xmlns:p14="http://schemas.microsoft.com/office/powerpoint/2010/main" val="3075429290"/>
+              </p:ext>
+            </p:extLst>
+          </p:nvPr>
+        </p:nvGraphicFramePr>
+        <p:xfrm>
+          <a:off x="4909751" y="3363097"/>
+          <a:ext cx="665772" cy="370840"/>
+        </p:xfrm>
+        <a:graphic>
+          <a:graphicData uri="http://schemas.openxmlformats.org/drawingml/2006/table">
+            <a:tbl>
+              <a:tblPr firstRow="1" bandRow="1">
+                <a:tableStyleId>{5C22544A-7EE6-4342-B048-85BDC9FD1C3A}</a:tableStyleId>
+              </a:tblPr>
+              <a:tblGrid>
+                <a:gridCol w="313055">
+                  <a:extLst>
+                    <a:ext uri="{9D8B030D-6E8A-4147-A177-3AD203B41FA5}">
+                      <a16:colId xmlns:a16="http://schemas.microsoft.com/office/drawing/2014/main" val="662917937"/>
+                    </a:ext>
+                  </a:extLst>
+                </a:gridCol>
+                <a:gridCol w="352717">
+                  <a:extLst>
+                    <a:ext uri="{9D8B030D-6E8A-4147-A177-3AD203B41FA5}">
+                      <a16:colId xmlns:a16="http://schemas.microsoft.com/office/drawing/2014/main" val="3082420159"/>
+                    </a:ext>
+                  </a:extLst>
+                </a:gridCol>
+              </a:tblGrid>
+              <a:tr h="370840">
+                <a:tc>
+                  <a:txBody>
+                    <a:bodyPr/>
+                    <a:lstStyle/>
+                    <a:p>
+                      <a:pPr latinLnBrk="1"/>
+                      <a:r>
+                        <a:rPr lang="en-US" altLang="ko-KR" sz="1100" dirty="0"/>
+                        <a:t>1</a:t>
+                      </a:r>
+                      <a:endParaRPr lang="ko-KR" altLang="en-US" sz="1100" dirty="0"/>
+                    </a:p>
+                  </a:txBody>
+                  <a:tcPr anchor="ctr"/>
+                </a:tc>
+                <a:tc>
+                  <a:txBody>
+                    <a:bodyPr/>
+                    <a:lstStyle/>
+                    <a:p>
+                      <a:pPr latinLnBrk="1"/>
+                      <a:r>
+                        <a:rPr lang="en-US" altLang="ko-KR" sz="1100" dirty="0"/>
+                        <a:t>3</a:t>
+                      </a:r>
+                      <a:endParaRPr lang="ko-KR" altLang="en-US" sz="1100" dirty="0"/>
+                    </a:p>
+                  </a:txBody>
+                  <a:tcPr anchor="ctr"/>
+                </a:tc>
+                <a:extLst>
+                  <a:ext uri="{0D108BD9-81ED-4DB2-BD59-A6C34878D82A}">
+                    <a16:rowId xmlns:a16="http://schemas.microsoft.com/office/drawing/2014/main" val="547838226"/>
+                  </a:ext>
+                </a:extLst>
+              </a:tr>
+            </a:tbl>
+          </a:graphicData>
+        </a:graphic>
+      </p:graphicFrame>
+      <p:sp>
+        <p:nvSpPr>
+          <p:cNvPr id="54" name="TextBox 53">
+            <a:extLst>
+              <a:ext uri="{FF2B5EF4-FFF2-40B4-BE49-F238E27FC236}">
+                <a16:creationId xmlns:a16="http://schemas.microsoft.com/office/drawing/2014/main" id="{5E4DCEAF-9FFF-4AFA-9B65-3C209C048EF5}"/>
+              </a:ext>
+            </a:extLst>
+          </p:cNvPr>
+          <p:cNvSpPr txBox="1"/>
+          <p:nvPr/>
+        </p:nvSpPr>
+        <p:spPr>
+          <a:xfrm>
+            <a:off x="4600885" y="2860178"/>
+            <a:ext cx="1664879" cy="523220"/>
+          </a:xfrm>
+          <a:prstGeom prst="rect">
+            <a:avLst/>
+          </a:prstGeom>
+          <a:noFill/>
+        </p:spPr>
+        <p:txBody>
+          <a:bodyPr wrap="none" rtlCol="0">
+            <a:spAutoFit/>
+          </a:bodyPr>
+          <a:lstStyle/>
+          <a:p>
+            <a:r>
+              <a:rPr lang="en-US" altLang="ko-KR" sz="1400" dirty="0"/>
+              <a:t>3</a:t>
+            </a:r>
+            <a:r>
+              <a:rPr lang="ko-KR" altLang="en-US" sz="1400" dirty="0" err="1"/>
+              <a:t>일때</a:t>
+            </a:r>
+            <a:endParaRPr lang="en-US" altLang="ko-KR" sz="1400" dirty="0"/>
+          </a:p>
+          <a:p>
+            <a:r>
+              <a:rPr lang="en-US" altLang="ko-KR" sz="1400" dirty="0"/>
+              <a:t>res</a:t>
+            </a:r>
+            <a:r>
+              <a:rPr lang="ko-KR" altLang="en-US" sz="1400" dirty="0"/>
+              <a:t> </a:t>
+            </a:r>
+            <a:r>
+              <a:rPr lang="en-US" altLang="ko-KR" sz="1400" dirty="0"/>
+              <a:t>0    1   (index)</a:t>
+            </a:r>
+            <a:endParaRPr lang="ko-KR" altLang="en-US" sz="1400" dirty="0"/>
+          </a:p>
+        </p:txBody>
+      </p:sp>
+      <p:graphicFrame>
+        <p:nvGraphicFramePr>
+          <p:cNvPr id="24" name="표 23">
+            <a:extLst>
+              <a:ext uri="{FF2B5EF4-FFF2-40B4-BE49-F238E27FC236}">
+                <a16:creationId xmlns:a16="http://schemas.microsoft.com/office/drawing/2014/main" id="{273F3AB9-4372-42A7-8DB5-570F32CA2A99}"/>
+              </a:ext>
+            </a:extLst>
+          </p:cNvPr>
+          <p:cNvGraphicFramePr>
+            <a:graphicFrameLocks noGrp="1"/>
+          </p:cNvGraphicFramePr>
+          <p:nvPr>
+            <p:extLst>
+              <p:ext uri="{D42A27DB-BD31-4B8C-83A1-F6EECF244321}">
+                <p14:modId xmlns:p14="http://schemas.microsoft.com/office/powerpoint/2010/main" val="3506714015"/>
+              </p:ext>
+            </p:extLst>
+          </p:nvPr>
+        </p:nvGraphicFramePr>
+        <p:xfrm>
+          <a:off x="1300561" y="2577945"/>
+          <a:ext cx="1167029" cy="370840"/>
+        </p:xfrm>
+        <a:graphic>
+          <a:graphicData uri="http://schemas.openxmlformats.org/drawingml/2006/table">
+            <a:tbl>
+              <a:tblPr firstRow="1" bandRow="1">
+                <a:tableStyleId>{5C22544A-7EE6-4342-B048-85BDC9FD1C3A}</a:tableStyleId>
+              </a:tblPr>
+              <a:tblGrid>
+                <a:gridCol w="270083">
+                  <a:extLst>
+                    <a:ext uri="{9D8B030D-6E8A-4147-A177-3AD203B41FA5}">
+                      <a16:colId xmlns:a16="http://schemas.microsoft.com/office/drawing/2014/main" val="662917937"/>
+                    </a:ext>
+                  </a:extLst>
+                </a:gridCol>
+                <a:gridCol w="298982">
+                  <a:extLst>
+                    <a:ext uri="{9D8B030D-6E8A-4147-A177-3AD203B41FA5}">
+                      <a16:colId xmlns:a16="http://schemas.microsoft.com/office/drawing/2014/main" val="3082420159"/>
+                    </a:ext>
+                  </a:extLst>
+                </a:gridCol>
+                <a:gridCol w="298982">
+                  <a:extLst>
+                    <a:ext uri="{9D8B030D-6E8A-4147-A177-3AD203B41FA5}">
+                      <a16:colId xmlns:a16="http://schemas.microsoft.com/office/drawing/2014/main" val="48093722"/>
+                    </a:ext>
+                  </a:extLst>
+                </a:gridCol>
+                <a:gridCol w="298982">
+                  <a:extLst>
+                    <a:ext uri="{9D8B030D-6E8A-4147-A177-3AD203B41FA5}">
+                      <a16:colId xmlns:a16="http://schemas.microsoft.com/office/drawing/2014/main" val="2055081397"/>
+                    </a:ext>
+                  </a:extLst>
+                </a:gridCol>
+              </a:tblGrid>
+              <a:tr h="370840">
+                <a:tc>
+                  <a:txBody>
+                    <a:bodyPr/>
+                    <a:lstStyle/>
+                    <a:p>
+                      <a:pPr latinLnBrk="1"/>
+                      <a:r>
+                        <a:rPr lang="en-US" altLang="ko-KR" sz="1100" dirty="0">
+                          <a:solidFill>
+                            <a:schemeClr val="tx1"/>
+                          </a:solidFill>
+                        </a:rPr>
+                        <a:t>0</a:t>
+                      </a:r>
+                      <a:endParaRPr lang="ko-KR" altLang="en-US" sz="1100" dirty="0">
+                        <a:solidFill>
+                          <a:schemeClr val="tx1"/>
+                        </a:solidFill>
+                      </a:endParaRPr>
+                    </a:p>
+                  </a:txBody>
+                  <a:tcPr anchor="ctr">
+                    <a:solidFill>
+                      <a:srgbClr val="FFC000"/>
+                    </a:solidFill>
+                  </a:tcPr>
+                </a:tc>
+                <a:tc>
+                  <a:txBody>
+                    <a:bodyPr/>
+                    <a:lstStyle/>
+                    <a:p>
+                      <a:pPr latinLnBrk="1"/>
+                      <a:r>
+                        <a:rPr lang="en-US" altLang="ko-KR" sz="1100" dirty="0">
+                          <a:solidFill>
+                            <a:schemeClr val="tx1"/>
+                          </a:solidFill>
+                        </a:rPr>
+                        <a:t>1</a:t>
+                      </a:r>
+                      <a:endParaRPr lang="ko-KR" altLang="en-US" sz="1100" dirty="0">
+                        <a:solidFill>
+                          <a:schemeClr val="tx1"/>
+                        </a:solidFill>
+                      </a:endParaRPr>
+                    </a:p>
+                  </a:txBody>
+                  <a:tcPr anchor="ctr">
+                    <a:solidFill>
+                      <a:srgbClr val="FFC000"/>
+                    </a:solidFill>
+                  </a:tcPr>
+                </a:tc>
+                <a:tc>
+                  <a:txBody>
+                    <a:bodyPr/>
+                    <a:lstStyle/>
+                    <a:p>
+                      <a:pPr latinLnBrk="1"/>
+                      <a:r>
+                        <a:rPr lang="en-US" altLang="ko-KR" sz="1100" dirty="0">
+                          <a:solidFill>
+                            <a:schemeClr val="tx1"/>
+                          </a:solidFill>
+                        </a:rPr>
+                        <a:t>0</a:t>
+                      </a:r>
+                      <a:endParaRPr lang="ko-KR" altLang="en-US" sz="1100" dirty="0">
+                        <a:solidFill>
+                          <a:schemeClr val="tx1"/>
+                        </a:solidFill>
+                      </a:endParaRPr>
+                    </a:p>
+                  </a:txBody>
+                  <a:tcPr anchor="ctr">
+                    <a:solidFill>
+                      <a:srgbClr val="FFC000"/>
+                    </a:solidFill>
+                  </a:tcPr>
+                </a:tc>
+                <a:tc>
+                  <a:txBody>
+                    <a:bodyPr/>
+                    <a:lstStyle/>
+                    <a:p>
+                      <a:pPr latinLnBrk="1"/>
+                      <a:r>
+                        <a:rPr lang="en-US" altLang="ko-KR" sz="1100" dirty="0">
+                          <a:solidFill>
+                            <a:schemeClr val="tx1"/>
+                          </a:solidFill>
+                        </a:rPr>
+                        <a:t>0</a:t>
+                      </a:r>
+                      <a:endParaRPr lang="ko-KR" altLang="en-US" sz="1100" dirty="0">
+                        <a:solidFill>
+                          <a:schemeClr val="tx1"/>
+                        </a:solidFill>
+                      </a:endParaRPr>
+                    </a:p>
+                  </a:txBody>
+                  <a:tcPr anchor="ctr">
+                    <a:solidFill>
+                      <a:srgbClr val="FFC000"/>
+                    </a:solidFill>
+                  </a:tcPr>
+                </a:tc>
+                <a:extLst>
+                  <a:ext uri="{0D108BD9-81ED-4DB2-BD59-A6C34878D82A}">
+                    <a16:rowId xmlns:a16="http://schemas.microsoft.com/office/drawing/2014/main" val="547838226"/>
+                  </a:ext>
+                </a:extLst>
+              </a:tr>
+            </a:tbl>
+          </a:graphicData>
+        </a:graphic>
+      </p:graphicFrame>
+      <p:sp>
+        <p:nvSpPr>
+          <p:cNvPr id="27" name="TextBox 26">
+            <a:extLst>
+              <a:ext uri="{FF2B5EF4-FFF2-40B4-BE49-F238E27FC236}">
+                <a16:creationId xmlns:a16="http://schemas.microsoft.com/office/drawing/2014/main" id="{C5573532-62FE-4D35-BD6A-B4752B42824D}"/>
+              </a:ext>
+            </a:extLst>
+          </p:cNvPr>
+          <p:cNvSpPr txBox="1"/>
+          <p:nvPr/>
+        </p:nvSpPr>
+        <p:spPr>
+          <a:xfrm>
+            <a:off x="976560" y="2280383"/>
+            <a:ext cx="2066591" cy="307777"/>
+          </a:xfrm>
+          <a:prstGeom prst="rect">
+            <a:avLst/>
+          </a:prstGeom>
+          <a:noFill/>
+        </p:spPr>
+        <p:txBody>
+          <a:bodyPr wrap="none" rtlCol="0">
+            <a:spAutoFit/>
+          </a:bodyPr>
+          <a:lstStyle/>
+          <a:p>
+            <a:r>
+              <a:rPr lang="en-US" altLang="ko-KR" sz="1400" dirty="0" err="1"/>
+              <a:t>ch</a:t>
+            </a:r>
+            <a:r>
+              <a:rPr lang="en-US" altLang="ko-KR" sz="1400" dirty="0"/>
+              <a:t> </a:t>
+            </a:r>
+            <a:r>
+              <a:rPr lang="ko-KR" altLang="en-US" sz="1400" dirty="0"/>
+              <a:t> </a:t>
+            </a:r>
+            <a:r>
+              <a:rPr lang="en-US" altLang="ko-KR" sz="1400" dirty="0"/>
+              <a:t>0   1   2   3 (index)</a:t>
+            </a:r>
+            <a:endParaRPr lang="ko-KR" altLang="en-US" sz="1400" dirty="0"/>
+          </a:p>
+        </p:txBody>
+      </p:sp>
+      <p:sp>
+        <p:nvSpPr>
+          <p:cNvPr id="28" name="TextBox 27">
+            <a:extLst>
+              <a:ext uri="{FF2B5EF4-FFF2-40B4-BE49-F238E27FC236}">
+                <a16:creationId xmlns:a16="http://schemas.microsoft.com/office/drawing/2014/main" id="{864375D6-5E72-4F21-B9C7-A0232C07A766}"/>
+              </a:ext>
+            </a:extLst>
+          </p:cNvPr>
+          <p:cNvSpPr txBox="1"/>
+          <p:nvPr/>
+        </p:nvSpPr>
+        <p:spPr>
+          <a:xfrm>
+            <a:off x="1133900" y="3009463"/>
+            <a:ext cx="965329" cy="523220"/>
+          </a:xfrm>
+          <a:prstGeom prst="rect">
+            <a:avLst/>
+          </a:prstGeom>
+          <a:noFill/>
+        </p:spPr>
+        <p:txBody>
+          <a:bodyPr wrap="none" rtlCol="0">
+            <a:spAutoFit/>
+          </a:bodyPr>
+          <a:lstStyle/>
+          <a:p>
+            <a:r>
+              <a:rPr lang="en-US" altLang="ko-KR" sz="1400" dirty="0"/>
+              <a:t>1</a:t>
+            </a:r>
+            <a:r>
+              <a:rPr lang="ko-KR" altLang="en-US" sz="1400" dirty="0"/>
+              <a:t>사용 중</a:t>
+            </a:r>
+            <a:endParaRPr lang="en-US" altLang="ko-KR" sz="1400" dirty="0"/>
+          </a:p>
+          <a:p>
+            <a:r>
+              <a:rPr lang="ko-KR" altLang="en-US" sz="1400" dirty="0"/>
+              <a:t>사용 못함</a:t>
+            </a:r>
+          </a:p>
+        </p:txBody>
+      </p:sp>
+      <p:graphicFrame>
+        <p:nvGraphicFramePr>
+          <p:cNvPr id="30" name="표 29">
+            <a:extLst>
+              <a:ext uri="{FF2B5EF4-FFF2-40B4-BE49-F238E27FC236}">
+                <a16:creationId xmlns:a16="http://schemas.microsoft.com/office/drawing/2014/main" id="{47540803-46E1-4326-B144-57EB3F148CC3}"/>
+              </a:ext>
+            </a:extLst>
+          </p:cNvPr>
+          <p:cNvGraphicFramePr>
+            <a:graphicFrameLocks noGrp="1"/>
+          </p:cNvGraphicFramePr>
+          <p:nvPr>
+            <p:extLst>
+              <p:ext uri="{D42A27DB-BD31-4B8C-83A1-F6EECF244321}">
+                <p14:modId xmlns:p14="http://schemas.microsoft.com/office/powerpoint/2010/main" val="2000679021"/>
+              </p:ext>
+            </p:extLst>
+          </p:nvPr>
+        </p:nvGraphicFramePr>
+        <p:xfrm>
+          <a:off x="5703167" y="2669133"/>
+          <a:ext cx="1167029" cy="370840"/>
+        </p:xfrm>
+        <a:graphic>
+          <a:graphicData uri="http://schemas.openxmlformats.org/drawingml/2006/table">
+            <a:tbl>
+              <a:tblPr firstRow="1" bandRow="1">
+                <a:tableStyleId>{5C22544A-7EE6-4342-B048-85BDC9FD1C3A}</a:tableStyleId>
+              </a:tblPr>
+              <a:tblGrid>
+                <a:gridCol w="270083">
+                  <a:extLst>
+                    <a:ext uri="{9D8B030D-6E8A-4147-A177-3AD203B41FA5}">
+                      <a16:colId xmlns:a16="http://schemas.microsoft.com/office/drawing/2014/main" val="662917937"/>
+                    </a:ext>
+                  </a:extLst>
+                </a:gridCol>
+                <a:gridCol w="298982">
+                  <a:extLst>
+                    <a:ext uri="{9D8B030D-6E8A-4147-A177-3AD203B41FA5}">
+                      <a16:colId xmlns:a16="http://schemas.microsoft.com/office/drawing/2014/main" val="3082420159"/>
+                    </a:ext>
+                  </a:extLst>
+                </a:gridCol>
+                <a:gridCol w="298982">
+                  <a:extLst>
+                    <a:ext uri="{9D8B030D-6E8A-4147-A177-3AD203B41FA5}">
+                      <a16:colId xmlns:a16="http://schemas.microsoft.com/office/drawing/2014/main" val="48093722"/>
+                    </a:ext>
+                  </a:extLst>
+                </a:gridCol>
+                <a:gridCol w="298982">
+                  <a:extLst>
+                    <a:ext uri="{9D8B030D-6E8A-4147-A177-3AD203B41FA5}">
+                      <a16:colId xmlns:a16="http://schemas.microsoft.com/office/drawing/2014/main" val="2055081397"/>
+                    </a:ext>
+                  </a:extLst>
+                </a:gridCol>
+              </a:tblGrid>
+              <a:tr h="370840">
+                <a:tc>
+                  <a:txBody>
+                    <a:bodyPr/>
+                    <a:lstStyle/>
+                    <a:p>
+                      <a:pPr latinLnBrk="1"/>
+                      <a:r>
+                        <a:rPr lang="en-US" altLang="ko-KR" sz="1100" dirty="0">
+                          <a:solidFill>
+                            <a:schemeClr val="tx1"/>
+                          </a:solidFill>
+                        </a:rPr>
+                        <a:t>0</a:t>
+                      </a:r>
+                      <a:endParaRPr lang="ko-KR" altLang="en-US" sz="1100" dirty="0">
+                        <a:solidFill>
+                          <a:schemeClr val="tx1"/>
+                        </a:solidFill>
+                      </a:endParaRPr>
+                    </a:p>
+                  </a:txBody>
+                  <a:tcPr anchor="ctr">
+                    <a:solidFill>
+                      <a:srgbClr val="FFC000"/>
+                    </a:solidFill>
+                  </a:tcPr>
+                </a:tc>
+                <a:tc>
+                  <a:txBody>
+                    <a:bodyPr/>
+                    <a:lstStyle/>
+                    <a:p>
+                      <a:pPr latinLnBrk="1"/>
+                      <a:r>
+                        <a:rPr lang="en-US" altLang="ko-KR" sz="1100" dirty="0">
+                          <a:solidFill>
+                            <a:schemeClr val="tx1"/>
+                          </a:solidFill>
+                        </a:rPr>
+                        <a:t>1</a:t>
+                      </a:r>
+                      <a:endParaRPr lang="ko-KR" altLang="en-US" sz="1100" dirty="0">
+                        <a:solidFill>
+                          <a:schemeClr val="tx1"/>
+                        </a:solidFill>
+                      </a:endParaRPr>
+                    </a:p>
+                  </a:txBody>
+                  <a:tcPr anchor="ctr">
+                    <a:solidFill>
+                      <a:srgbClr val="FFC000"/>
+                    </a:solidFill>
+                  </a:tcPr>
+                </a:tc>
+                <a:tc>
+                  <a:txBody>
+                    <a:bodyPr/>
+                    <a:lstStyle/>
+                    <a:p>
+                      <a:pPr latinLnBrk="1"/>
+                      <a:r>
+                        <a:rPr lang="en-US" altLang="ko-KR" sz="1100" dirty="0">
+                          <a:solidFill>
+                            <a:schemeClr val="tx1"/>
+                          </a:solidFill>
+                        </a:rPr>
+                        <a:t>0</a:t>
+                      </a:r>
+                      <a:endParaRPr lang="ko-KR" altLang="en-US" sz="1100" dirty="0">
+                        <a:solidFill>
+                          <a:schemeClr val="tx1"/>
+                        </a:solidFill>
+                      </a:endParaRPr>
+                    </a:p>
+                  </a:txBody>
+                  <a:tcPr anchor="ctr">
+                    <a:solidFill>
+                      <a:srgbClr val="FFC000"/>
+                    </a:solidFill>
+                  </a:tcPr>
+                </a:tc>
+                <a:tc>
+                  <a:txBody>
+                    <a:bodyPr/>
+                    <a:lstStyle/>
+                    <a:p>
+                      <a:pPr latinLnBrk="1"/>
+                      <a:r>
+                        <a:rPr lang="en-US" altLang="ko-KR" sz="1100" dirty="0">
+                          <a:solidFill>
+                            <a:schemeClr val="tx1"/>
+                          </a:solidFill>
+                        </a:rPr>
+                        <a:t>1</a:t>
+                      </a:r>
+                      <a:endParaRPr lang="ko-KR" altLang="en-US" sz="1100" dirty="0">
+                        <a:solidFill>
+                          <a:schemeClr val="tx1"/>
+                        </a:solidFill>
+                      </a:endParaRPr>
+                    </a:p>
+                  </a:txBody>
+                  <a:tcPr anchor="ctr">
+                    <a:solidFill>
+                      <a:srgbClr val="FFC000"/>
+                    </a:solidFill>
+                  </a:tcPr>
+                </a:tc>
+                <a:extLst>
+                  <a:ext uri="{0D108BD9-81ED-4DB2-BD59-A6C34878D82A}">
+                    <a16:rowId xmlns:a16="http://schemas.microsoft.com/office/drawing/2014/main" val="547838226"/>
+                  </a:ext>
+                </a:extLst>
+              </a:tr>
+            </a:tbl>
+          </a:graphicData>
+        </a:graphic>
+      </p:graphicFrame>
+      <p:sp>
+        <p:nvSpPr>
+          <p:cNvPr id="32" name="TextBox 31">
+            <a:extLst>
+              <a:ext uri="{FF2B5EF4-FFF2-40B4-BE49-F238E27FC236}">
+                <a16:creationId xmlns:a16="http://schemas.microsoft.com/office/drawing/2014/main" id="{C7D1821D-7358-42DC-AF93-48153D4D2281}"/>
+              </a:ext>
+            </a:extLst>
+          </p:cNvPr>
+          <p:cNvSpPr txBox="1"/>
+          <p:nvPr/>
+        </p:nvSpPr>
+        <p:spPr>
+          <a:xfrm>
+            <a:off x="5379166" y="2371571"/>
+            <a:ext cx="2066591" cy="307777"/>
+          </a:xfrm>
+          <a:prstGeom prst="rect">
+            <a:avLst/>
+          </a:prstGeom>
+          <a:noFill/>
+        </p:spPr>
+        <p:txBody>
+          <a:bodyPr wrap="none" rtlCol="0">
+            <a:spAutoFit/>
+          </a:bodyPr>
+          <a:lstStyle/>
+          <a:p>
+            <a:r>
+              <a:rPr lang="en-US" altLang="ko-KR" sz="1400" dirty="0" err="1"/>
+              <a:t>ch</a:t>
+            </a:r>
+            <a:r>
+              <a:rPr lang="en-US" altLang="ko-KR" sz="1400" dirty="0"/>
+              <a:t> </a:t>
+            </a:r>
+            <a:r>
+              <a:rPr lang="ko-KR" altLang="en-US" sz="1400" dirty="0"/>
+              <a:t> </a:t>
+            </a:r>
+            <a:r>
+              <a:rPr lang="en-US" altLang="ko-KR" sz="1400" dirty="0"/>
+              <a:t>0   1   2   3 (index)</a:t>
+            </a:r>
+            <a:endParaRPr lang="ko-KR" altLang="en-US" sz="1400" dirty="0"/>
+          </a:p>
+        </p:txBody>
+      </p:sp>
+      <p:graphicFrame>
+        <p:nvGraphicFramePr>
+          <p:cNvPr id="33" name="표 32">
+            <a:extLst>
+              <a:ext uri="{FF2B5EF4-FFF2-40B4-BE49-F238E27FC236}">
+                <a16:creationId xmlns:a16="http://schemas.microsoft.com/office/drawing/2014/main" id="{DAE76347-EBD2-4CB2-98A1-89532F2C7C61}"/>
+              </a:ext>
+            </a:extLst>
+          </p:cNvPr>
+          <p:cNvGraphicFramePr>
+            <a:graphicFrameLocks noGrp="1"/>
+          </p:cNvGraphicFramePr>
+          <p:nvPr>
+            <p:extLst>
+              <p:ext uri="{D42A27DB-BD31-4B8C-83A1-F6EECF244321}">
+                <p14:modId xmlns:p14="http://schemas.microsoft.com/office/powerpoint/2010/main" val="3198408493"/>
+              </p:ext>
+            </p:extLst>
+          </p:nvPr>
+        </p:nvGraphicFramePr>
+        <p:xfrm>
+          <a:off x="5727923" y="4041124"/>
+          <a:ext cx="1167029" cy="370840"/>
+        </p:xfrm>
+        <a:graphic>
+          <a:graphicData uri="http://schemas.openxmlformats.org/drawingml/2006/table">
+            <a:tbl>
+              <a:tblPr firstRow="1" bandRow="1">
+                <a:tableStyleId>{5C22544A-7EE6-4342-B048-85BDC9FD1C3A}</a:tableStyleId>
+              </a:tblPr>
+              <a:tblGrid>
+                <a:gridCol w="270083">
+                  <a:extLst>
+                    <a:ext uri="{9D8B030D-6E8A-4147-A177-3AD203B41FA5}">
+                      <a16:colId xmlns:a16="http://schemas.microsoft.com/office/drawing/2014/main" val="662917937"/>
+                    </a:ext>
+                  </a:extLst>
+                </a:gridCol>
+                <a:gridCol w="298982">
+                  <a:extLst>
+                    <a:ext uri="{9D8B030D-6E8A-4147-A177-3AD203B41FA5}">
+                      <a16:colId xmlns:a16="http://schemas.microsoft.com/office/drawing/2014/main" val="3082420159"/>
+                    </a:ext>
+                  </a:extLst>
+                </a:gridCol>
+                <a:gridCol w="298982">
+                  <a:extLst>
+                    <a:ext uri="{9D8B030D-6E8A-4147-A177-3AD203B41FA5}">
+                      <a16:colId xmlns:a16="http://schemas.microsoft.com/office/drawing/2014/main" val="48093722"/>
+                    </a:ext>
+                  </a:extLst>
+                </a:gridCol>
+                <a:gridCol w="298982">
+                  <a:extLst>
+                    <a:ext uri="{9D8B030D-6E8A-4147-A177-3AD203B41FA5}">
+                      <a16:colId xmlns:a16="http://schemas.microsoft.com/office/drawing/2014/main" val="2055081397"/>
+                    </a:ext>
+                  </a:extLst>
+                </a:gridCol>
+              </a:tblGrid>
+              <a:tr h="370840">
+                <a:tc>
+                  <a:txBody>
+                    <a:bodyPr/>
+                    <a:lstStyle/>
+                    <a:p>
+                      <a:pPr latinLnBrk="1"/>
+                      <a:r>
+                        <a:rPr lang="en-US" altLang="ko-KR" sz="1100" dirty="0">
+                          <a:solidFill>
+                            <a:schemeClr val="tx1"/>
+                          </a:solidFill>
+                        </a:rPr>
+                        <a:t>0</a:t>
+                      </a:r>
+                      <a:endParaRPr lang="ko-KR" altLang="en-US" sz="1100" dirty="0">
+                        <a:solidFill>
+                          <a:schemeClr val="tx1"/>
+                        </a:solidFill>
+                      </a:endParaRPr>
+                    </a:p>
+                  </a:txBody>
+                  <a:tcPr anchor="ctr">
+                    <a:solidFill>
+                      <a:srgbClr val="FFC000"/>
+                    </a:solidFill>
+                  </a:tcPr>
+                </a:tc>
+                <a:tc>
+                  <a:txBody>
+                    <a:bodyPr/>
+                    <a:lstStyle/>
+                    <a:p>
+                      <a:pPr latinLnBrk="1"/>
+                      <a:r>
+                        <a:rPr lang="en-US" altLang="ko-KR" sz="1100" dirty="0">
+                          <a:solidFill>
+                            <a:schemeClr val="tx1"/>
+                          </a:solidFill>
+                        </a:rPr>
+                        <a:t>1</a:t>
+                      </a:r>
+                      <a:endParaRPr lang="ko-KR" altLang="en-US" sz="1100" dirty="0">
+                        <a:solidFill>
+                          <a:schemeClr val="tx1"/>
+                        </a:solidFill>
+                      </a:endParaRPr>
+                    </a:p>
+                  </a:txBody>
+                  <a:tcPr anchor="ctr">
+                    <a:solidFill>
+                      <a:srgbClr val="FFC000"/>
+                    </a:solidFill>
+                  </a:tcPr>
+                </a:tc>
+                <a:tc>
+                  <a:txBody>
+                    <a:bodyPr/>
+                    <a:lstStyle/>
+                    <a:p>
+                      <a:pPr latinLnBrk="1"/>
+                      <a:r>
+                        <a:rPr lang="en-US" altLang="ko-KR" sz="1100" dirty="0">
+                          <a:solidFill>
+                            <a:schemeClr val="tx1"/>
+                          </a:solidFill>
+                        </a:rPr>
+                        <a:t>0</a:t>
+                      </a:r>
+                      <a:endParaRPr lang="ko-KR" altLang="en-US" sz="1100" dirty="0">
+                        <a:solidFill>
+                          <a:schemeClr val="tx1"/>
+                        </a:solidFill>
+                      </a:endParaRPr>
+                    </a:p>
+                  </a:txBody>
+                  <a:tcPr anchor="ctr">
+                    <a:solidFill>
+                      <a:srgbClr val="FFC000"/>
+                    </a:solidFill>
+                  </a:tcPr>
+                </a:tc>
+                <a:tc>
+                  <a:txBody>
+                    <a:bodyPr/>
+                    <a:lstStyle/>
+                    <a:p>
+                      <a:pPr latinLnBrk="1"/>
+                      <a:r>
+                        <a:rPr lang="en-US" altLang="ko-KR" sz="1100" dirty="0">
+                          <a:solidFill>
+                            <a:schemeClr val="tx1"/>
+                          </a:solidFill>
+                        </a:rPr>
+                        <a:t>0</a:t>
+                      </a:r>
+                      <a:endParaRPr lang="ko-KR" altLang="en-US" sz="1100" dirty="0">
+                        <a:solidFill>
+                          <a:schemeClr val="tx1"/>
+                        </a:solidFill>
+                      </a:endParaRPr>
+                    </a:p>
+                  </a:txBody>
+                  <a:tcPr anchor="ctr">
+                    <a:solidFill>
+                      <a:srgbClr val="FF0000"/>
+                    </a:solidFill>
+                  </a:tcPr>
+                </a:tc>
+                <a:extLst>
+                  <a:ext uri="{0D108BD9-81ED-4DB2-BD59-A6C34878D82A}">
+                    <a16:rowId xmlns:a16="http://schemas.microsoft.com/office/drawing/2014/main" val="547838226"/>
+                  </a:ext>
+                </a:extLst>
+              </a:tr>
+            </a:tbl>
+          </a:graphicData>
+        </a:graphic>
+      </p:graphicFrame>
+      <p:sp>
+        <p:nvSpPr>
+          <p:cNvPr id="36" name="TextBox 35">
+            <a:extLst>
+              <a:ext uri="{FF2B5EF4-FFF2-40B4-BE49-F238E27FC236}">
+                <a16:creationId xmlns:a16="http://schemas.microsoft.com/office/drawing/2014/main" id="{023659B2-3FBB-4FA1-8511-7319461020AC}"/>
+              </a:ext>
+            </a:extLst>
+          </p:cNvPr>
+          <p:cNvSpPr txBox="1"/>
+          <p:nvPr/>
+        </p:nvSpPr>
+        <p:spPr>
+          <a:xfrm>
+            <a:off x="5403922" y="3743562"/>
+            <a:ext cx="2066591" cy="307777"/>
+          </a:xfrm>
+          <a:prstGeom prst="rect">
+            <a:avLst/>
+          </a:prstGeom>
+          <a:noFill/>
+        </p:spPr>
+        <p:txBody>
+          <a:bodyPr wrap="none" rtlCol="0">
+            <a:spAutoFit/>
+          </a:bodyPr>
+          <a:lstStyle/>
+          <a:p>
+            <a:r>
+              <a:rPr lang="en-US" altLang="ko-KR" sz="1400" dirty="0" err="1"/>
+              <a:t>ch</a:t>
+            </a:r>
+            <a:r>
+              <a:rPr lang="en-US" altLang="ko-KR" sz="1400" dirty="0"/>
+              <a:t> </a:t>
+            </a:r>
+            <a:r>
+              <a:rPr lang="ko-KR" altLang="en-US" sz="1400" dirty="0"/>
+              <a:t> </a:t>
+            </a:r>
+            <a:r>
+              <a:rPr lang="en-US" altLang="ko-KR" sz="1400" dirty="0"/>
+              <a:t>0   1   2   3 (index)</a:t>
+            </a:r>
+            <a:endParaRPr lang="ko-KR" altLang="en-US" sz="1400" dirty="0"/>
+          </a:p>
+        </p:txBody>
+      </p:sp>
+      <p:cxnSp>
+        <p:nvCxnSpPr>
+          <p:cNvPr id="37" name="직선 화살표 연결선 36">
+            <a:extLst>
+              <a:ext uri="{FF2B5EF4-FFF2-40B4-BE49-F238E27FC236}">
+                <a16:creationId xmlns:a16="http://schemas.microsoft.com/office/drawing/2014/main" id="{AB50AB36-3F3F-4850-8449-6652E3D83006}"/>
+              </a:ext>
+            </a:extLst>
+          </p:cNvPr>
+          <p:cNvCxnSpPr>
+            <a:cxnSpLocks/>
+          </p:cNvCxnSpPr>
+          <p:nvPr/>
+        </p:nvCxnSpPr>
+        <p:spPr>
+          <a:xfrm flipH="1">
+            <a:off x="6744547" y="3128455"/>
+            <a:ext cx="1" cy="643941"/>
+          </a:xfrm>
+          <a:prstGeom prst="straightConnector1">
+            <a:avLst/>
+          </a:prstGeom>
+          <a:ln w="15875">
+            <a:solidFill>
+              <a:srgbClr val="FF0000"/>
+            </a:solidFill>
+            <a:tailEnd type="triangle" w="lg" len="med"/>
+          </a:ln>
+        </p:spPr>
+        <p:style>
+          <a:lnRef idx="1">
+            <a:schemeClr val="accent1"/>
+          </a:lnRef>
+          <a:fillRef idx="0">
+            <a:schemeClr val="accent1"/>
+          </a:fillRef>
+          <a:effectRef idx="0">
+            <a:schemeClr val="accent1"/>
+          </a:effectRef>
+          <a:fontRef idx="minor">
+            <a:schemeClr val="tx1"/>
+          </a:fontRef>
+        </p:style>
+      </p:cxnSp>
+      <p:sp>
+        <p:nvSpPr>
+          <p:cNvPr id="10" name="TextBox 9">
+            <a:extLst>
+              <a:ext uri="{FF2B5EF4-FFF2-40B4-BE49-F238E27FC236}">
+                <a16:creationId xmlns:a16="http://schemas.microsoft.com/office/drawing/2014/main" id="{32B34A48-51E3-47B3-B57D-435919A7333F}"/>
+              </a:ext>
+            </a:extLst>
+          </p:cNvPr>
+          <p:cNvSpPr txBox="1"/>
+          <p:nvPr/>
+        </p:nvSpPr>
+        <p:spPr>
+          <a:xfrm>
+            <a:off x="0" y="0"/>
+            <a:ext cx="1806905" cy="369332"/>
+          </a:xfrm>
+          <a:prstGeom prst="rect">
+            <a:avLst/>
+          </a:prstGeom>
+          <a:noFill/>
+        </p:spPr>
+        <p:txBody>
+          <a:bodyPr wrap="none" rtlCol="0">
+            <a:spAutoFit/>
+          </a:bodyPr>
+          <a:lstStyle/>
+          <a:p>
+            <a:r>
+              <a:rPr lang="en-US" altLang="ko-KR" dirty="0"/>
+              <a:t>08. </a:t>
+            </a:r>
+            <a:r>
+              <a:rPr lang="ko-KR" altLang="en-US" dirty="0"/>
+              <a:t>순열 구하기</a:t>
+            </a:r>
+          </a:p>
+        </p:txBody>
+      </p:sp>
     </p:spTree>
     <p:extLst>
       <p:ext uri="{BB962C8B-B14F-4D97-AF65-F5344CB8AC3E}">
-        <p14:creationId xmlns:p14="http://schemas.microsoft.com/office/powerpoint/2010/main" val="3450726087"/>
+        <p14:creationId xmlns:p14="http://schemas.microsoft.com/office/powerpoint/2010/main" val="2706693520"/>
       </p:ext>
     </p:extLst>
   </p:cSld>
@@ -8445,10 +10691,1810 @@
           <a:chExt cx="0" cy="0"/>
         </a:xfrm>
       </p:grpSpPr>
+      <p:sp>
+        <p:nvSpPr>
+          <p:cNvPr id="2" name="직사각형 1">
+            <a:extLst>
+              <a:ext uri="{FF2B5EF4-FFF2-40B4-BE49-F238E27FC236}">
+                <a16:creationId xmlns:a16="http://schemas.microsoft.com/office/drawing/2014/main" id="{B83F85A3-9E91-4882-B739-D1C48BC1D8C5}"/>
+              </a:ext>
+            </a:extLst>
+          </p:cNvPr>
+          <p:cNvSpPr/>
+          <p:nvPr/>
+        </p:nvSpPr>
+        <p:spPr>
+          <a:xfrm>
+            <a:off x="889192" y="555260"/>
+            <a:ext cx="6632294" cy="5018291"/>
+          </a:xfrm>
+          <a:prstGeom prst="rect">
+            <a:avLst/>
+          </a:prstGeom>
+          <a:solidFill>
+            <a:schemeClr val="bg1">
+              <a:lumMod val="95000"/>
+            </a:schemeClr>
+          </a:solidFill>
+          <a:ln>
+            <a:noFill/>
+          </a:ln>
+        </p:spPr>
+        <p:style>
+          <a:lnRef idx="2">
+            <a:schemeClr val="accent1">
+              <a:shade val="50000"/>
+            </a:schemeClr>
+          </a:lnRef>
+          <a:fillRef idx="1">
+            <a:schemeClr val="accent1"/>
+          </a:fillRef>
+          <a:effectRef idx="0">
+            <a:schemeClr val="accent1"/>
+          </a:effectRef>
+          <a:fontRef idx="minor">
+            <a:schemeClr val="lt1"/>
+          </a:fontRef>
+        </p:style>
+        <p:txBody>
+          <a:bodyPr rtlCol="0" anchor="ctr"/>
+          <a:lstStyle/>
+          <a:p>
+            <a:pPr algn="ctr"/>
+            <a:endParaRPr lang="ko-KR" altLang="en-US" dirty="0"/>
+          </a:p>
+        </p:txBody>
+      </p:sp>
+      <p:sp>
+        <p:nvSpPr>
+          <p:cNvPr id="3" name="직사각형 2">
+            <a:extLst>
+              <a:ext uri="{FF2B5EF4-FFF2-40B4-BE49-F238E27FC236}">
+                <a16:creationId xmlns:a16="http://schemas.microsoft.com/office/drawing/2014/main" id="{B6704C18-118C-4019-810A-2778308666CA}"/>
+              </a:ext>
+            </a:extLst>
+          </p:cNvPr>
+          <p:cNvSpPr/>
+          <p:nvPr/>
+        </p:nvSpPr>
+        <p:spPr>
+          <a:xfrm>
+            <a:off x="4338319" y="695325"/>
+            <a:ext cx="1077168" cy="428625"/>
+          </a:xfrm>
+          <a:prstGeom prst="rect">
+            <a:avLst/>
+          </a:prstGeom>
+        </p:spPr>
+        <p:style>
+          <a:lnRef idx="2">
+            <a:schemeClr val="accent1">
+              <a:shade val="50000"/>
+            </a:schemeClr>
+          </a:lnRef>
+          <a:fillRef idx="1">
+            <a:schemeClr val="accent1"/>
+          </a:fillRef>
+          <a:effectRef idx="0">
+            <a:schemeClr val="accent1"/>
+          </a:effectRef>
+          <a:fontRef idx="minor">
+            <a:schemeClr val="lt1"/>
+          </a:fontRef>
+        </p:style>
+        <p:txBody>
+          <a:bodyPr rtlCol="0" anchor="ctr"/>
+          <a:lstStyle/>
+          <a:p>
+            <a:pPr algn="ctr"/>
+            <a:r>
+              <a:rPr lang="en-US" altLang="ko-KR" dirty="0"/>
+              <a:t>D(0,1)</a:t>
+            </a:r>
+            <a:endParaRPr lang="ko-KR" altLang="en-US" dirty="0"/>
+          </a:p>
+        </p:txBody>
+      </p:sp>
+      <p:sp>
+        <p:nvSpPr>
+          <p:cNvPr id="4" name="직사각형 3">
+            <a:extLst>
+              <a:ext uri="{FF2B5EF4-FFF2-40B4-BE49-F238E27FC236}">
+                <a16:creationId xmlns:a16="http://schemas.microsoft.com/office/drawing/2014/main" id="{4AF036C7-C91B-42E7-BEBA-062AF6525865}"/>
+              </a:ext>
+            </a:extLst>
+          </p:cNvPr>
+          <p:cNvSpPr/>
+          <p:nvPr/>
+        </p:nvSpPr>
+        <p:spPr>
+          <a:xfrm>
+            <a:off x="3194796" y="1712419"/>
+            <a:ext cx="1077168" cy="428625"/>
+          </a:xfrm>
+          <a:prstGeom prst="rect">
+            <a:avLst/>
+          </a:prstGeom>
+        </p:spPr>
+        <p:style>
+          <a:lnRef idx="2">
+            <a:schemeClr val="accent1">
+              <a:shade val="50000"/>
+            </a:schemeClr>
+          </a:lnRef>
+          <a:fillRef idx="1">
+            <a:schemeClr val="accent1"/>
+          </a:fillRef>
+          <a:effectRef idx="0">
+            <a:schemeClr val="accent1"/>
+          </a:effectRef>
+          <a:fontRef idx="minor">
+            <a:schemeClr val="lt1"/>
+          </a:fontRef>
+        </p:style>
+        <p:txBody>
+          <a:bodyPr rtlCol="0" anchor="ctr"/>
+          <a:lstStyle/>
+          <a:p>
+            <a:pPr algn="ctr"/>
+            <a:r>
+              <a:rPr lang="en-US" altLang="ko-KR" dirty="0"/>
+              <a:t>D(1,2)</a:t>
+            </a:r>
+            <a:endParaRPr lang="ko-KR" altLang="en-US" dirty="0"/>
+          </a:p>
+        </p:txBody>
+      </p:sp>
+      <p:cxnSp>
+        <p:nvCxnSpPr>
+          <p:cNvPr id="6" name="직선 화살표 연결선 5">
+            <a:extLst>
+              <a:ext uri="{FF2B5EF4-FFF2-40B4-BE49-F238E27FC236}">
+                <a16:creationId xmlns:a16="http://schemas.microsoft.com/office/drawing/2014/main" id="{30C1BADB-DB0D-47BE-B9FB-6199B74B307F}"/>
+              </a:ext>
+            </a:extLst>
+          </p:cNvPr>
+          <p:cNvCxnSpPr>
+            <a:cxnSpLocks/>
+            <a:stCxn id="3" idx="2"/>
+            <a:endCxn id="4" idx="0"/>
+          </p:cNvCxnSpPr>
+          <p:nvPr/>
+        </p:nvCxnSpPr>
+        <p:spPr>
+          <a:xfrm flipH="1">
+            <a:off x="3733380" y="1123950"/>
+            <a:ext cx="1143523" cy="588469"/>
+          </a:xfrm>
+          <a:prstGeom prst="straightConnector1">
+            <a:avLst/>
+          </a:prstGeom>
+          <a:ln w="15875">
+            <a:tailEnd type="triangle" w="lg" len="med"/>
+          </a:ln>
+        </p:spPr>
+        <p:style>
+          <a:lnRef idx="1">
+            <a:schemeClr val="accent1"/>
+          </a:lnRef>
+          <a:fillRef idx="0">
+            <a:schemeClr val="accent1"/>
+          </a:fillRef>
+          <a:effectRef idx="0">
+            <a:schemeClr val="accent1"/>
+          </a:effectRef>
+          <a:fontRef idx="minor">
+            <a:schemeClr val="tx1"/>
+          </a:fontRef>
+        </p:style>
+      </p:cxnSp>
+      <p:cxnSp>
+        <p:nvCxnSpPr>
+          <p:cNvPr id="7" name="직선 화살표 연결선 6">
+            <a:extLst>
+              <a:ext uri="{FF2B5EF4-FFF2-40B4-BE49-F238E27FC236}">
+                <a16:creationId xmlns:a16="http://schemas.microsoft.com/office/drawing/2014/main" id="{2EC7DCED-9934-4A84-9311-58C02E841717}"/>
+              </a:ext>
+            </a:extLst>
+          </p:cNvPr>
+          <p:cNvCxnSpPr>
+            <a:cxnSpLocks/>
+            <a:stCxn id="3" idx="2"/>
+            <a:endCxn id="35" idx="0"/>
+          </p:cNvCxnSpPr>
+          <p:nvPr/>
+        </p:nvCxnSpPr>
+        <p:spPr>
+          <a:xfrm>
+            <a:off x="4876903" y="1123950"/>
+            <a:ext cx="1159703" cy="600073"/>
+          </a:xfrm>
+          <a:prstGeom prst="straightConnector1">
+            <a:avLst/>
+          </a:prstGeom>
+          <a:ln w="15875">
+            <a:solidFill>
+              <a:srgbClr val="FF0000"/>
+            </a:solidFill>
+            <a:tailEnd type="triangle" w="lg" len="med"/>
+          </a:ln>
+        </p:spPr>
+        <p:style>
+          <a:lnRef idx="1">
+            <a:schemeClr val="accent1"/>
+          </a:lnRef>
+          <a:fillRef idx="0">
+            <a:schemeClr val="accent1"/>
+          </a:fillRef>
+          <a:effectRef idx="0">
+            <a:schemeClr val="accent1"/>
+          </a:effectRef>
+          <a:fontRef idx="minor">
+            <a:schemeClr val="tx1"/>
+          </a:fontRef>
+        </p:style>
+      </p:cxnSp>
+      <p:sp>
+        <p:nvSpPr>
+          <p:cNvPr id="9" name="직사각형 8">
+            <a:extLst>
+              <a:ext uri="{FF2B5EF4-FFF2-40B4-BE49-F238E27FC236}">
+                <a16:creationId xmlns:a16="http://schemas.microsoft.com/office/drawing/2014/main" id="{DD180A9A-7472-4FB0-A853-A331827F00FF}"/>
+              </a:ext>
+            </a:extLst>
+          </p:cNvPr>
+          <p:cNvSpPr/>
+          <p:nvPr/>
+        </p:nvSpPr>
+        <p:spPr>
+          <a:xfrm>
+            <a:off x="2324823" y="3169413"/>
+            <a:ext cx="1077168" cy="428625"/>
+          </a:xfrm>
+          <a:prstGeom prst="rect">
+            <a:avLst/>
+          </a:prstGeom>
+        </p:spPr>
+        <p:style>
+          <a:lnRef idx="2">
+            <a:schemeClr val="accent1">
+              <a:shade val="50000"/>
+            </a:schemeClr>
+          </a:lnRef>
+          <a:fillRef idx="1">
+            <a:schemeClr val="accent1"/>
+          </a:fillRef>
+          <a:effectRef idx="0">
+            <a:schemeClr val="accent1"/>
+          </a:effectRef>
+          <a:fontRef idx="minor">
+            <a:schemeClr val="lt1"/>
+          </a:fontRef>
+        </p:style>
+        <p:txBody>
+          <a:bodyPr rtlCol="0" anchor="ctr"/>
+          <a:lstStyle/>
+          <a:p>
+            <a:pPr algn="ctr"/>
+            <a:r>
+              <a:rPr lang="en-US" altLang="ko-KR" dirty="0"/>
+              <a:t>D(2,3)</a:t>
+            </a:r>
+            <a:endParaRPr lang="ko-KR" altLang="en-US" dirty="0"/>
+          </a:p>
+        </p:txBody>
+      </p:sp>
+      <p:cxnSp>
+        <p:nvCxnSpPr>
+          <p:cNvPr id="11" name="직선 화살표 연결선 10">
+            <a:extLst>
+              <a:ext uri="{FF2B5EF4-FFF2-40B4-BE49-F238E27FC236}">
+                <a16:creationId xmlns:a16="http://schemas.microsoft.com/office/drawing/2014/main" id="{ADDD9212-727B-4DA5-9B8D-774AEF2C5EDB}"/>
+              </a:ext>
+            </a:extLst>
+          </p:cNvPr>
+          <p:cNvCxnSpPr>
+            <a:cxnSpLocks/>
+            <a:stCxn id="4" idx="2"/>
+            <a:endCxn id="9" idx="0"/>
+          </p:cNvCxnSpPr>
+          <p:nvPr/>
+        </p:nvCxnSpPr>
+        <p:spPr>
+          <a:xfrm flipH="1">
+            <a:off x="2863407" y="2141044"/>
+            <a:ext cx="869973" cy="1028369"/>
+          </a:xfrm>
+          <a:prstGeom prst="straightConnector1">
+            <a:avLst/>
+          </a:prstGeom>
+          <a:ln w="15875">
+            <a:tailEnd type="triangle" w="lg" len="med"/>
+          </a:ln>
+        </p:spPr>
+        <p:style>
+          <a:lnRef idx="1">
+            <a:schemeClr val="accent1"/>
+          </a:lnRef>
+          <a:fillRef idx="0">
+            <a:schemeClr val="accent1"/>
+          </a:fillRef>
+          <a:effectRef idx="0">
+            <a:schemeClr val="accent1"/>
+          </a:effectRef>
+          <a:fontRef idx="minor">
+            <a:schemeClr val="tx1"/>
+          </a:fontRef>
+        </p:style>
+      </p:cxnSp>
+      <p:cxnSp>
+        <p:nvCxnSpPr>
+          <p:cNvPr id="12" name="직선 화살표 연결선 11">
+            <a:extLst>
+              <a:ext uri="{FF2B5EF4-FFF2-40B4-BE49-F238E27FC236}">
+                <a16:creationId xmlns:a16="http://schemas.microsoft.com/office/drawing/2014/main" id="{34085AAB-DBDF-43AD-B2D5-5A9708CF2C6A}"/>
+              </a:ext>
+            </a:extLst>
+          </p:cNvPr>
+          <p:cNvCxnSpPr>
+            <a:cxnSpLocks/>
+            <a:stCxn id="4" idx="2"/>
+          </p:cNvCxnSpPr>
+          <p:nvPr/>
+        </p:nvCxnSpPr>
+        <p:spPr>
+          <a:xfrm>
+            <a:off x="3733380" y="2141044"/>
+            <a:ext cx="689306" cy="1028368"/>
+          </a:xfrm>
+          <a:prstGeom prst="straightConnector1">
+            <a:avLst/>
+          </a:prstGeom>
+          <a:ln w="15875">
+            <a:solidFill>
+              <a:srgbClr val="FF0000"/>
+            </a:solidFill>
+            <a:tailEnd type="triangle" w="lg" len="med"/>
+          </a:ln>
+        </p:spPr>
+        <p:style>
+          <a:lnRef idx="1">
+            <a:schemeClr val="accent1"/>
+          </a:lnRef>
+          <a:fillRef idx="0">
+            <a:schemeClr val="accent1"/>
+          </a:fillRef>
+          <a:effectRef idx="0">
+            <a:schemeClr val="accent1"/>
+          </a:effectRef>
+          <a:fontRef idx="minor">
+            <a:schemeClr val="tx1"/>
+          </a:fontRef>
+        </p:style>
+      </p:cxnSp>
+      <p:sp>
+        <p:nvSpPr>
+          <p:cNvPr id="13" name="TextBox 12">
+            <a:extLst>
+              <a:ext uri="{FF2B5EF4-FFF2-40B4-BE49-F238E27FC236}">
+                <a16:creationId xmlns:a16="http://schemas.microsoft.com/office/drawing/2014/main" id="{4292A6DB-E07E-48C6-A267-BC1B1B7882E3}"/>
+              </a:ext>
+            </a:extLst>
+          </p:cNvPr>
+          <p:cNvSpPr txBox="1"/>
+          <p:nvPr/>
+        </p:nvSpPr>
+        <p:spPr>
+          <a:xfrm>
+            <a:off x="3745758" y="1249027"/>
+            <a:ext cx="3143809" cy="369332"/>
+          </a:xfrm>
+          <a:prstGeom prst="rect">
+            <a:avLst/>
+          </a:prstGeom>
+          <a:noFill/>
+        </p:spPr>
+        <p:txBody>
+          <a:bodyPr wrap="none" rtlCol="0">
+            <a:spAutoFit/>
+          </a:bodyPr>
+          <a:lstStyle/>
+          <a:p>
+            <a:r>
+              <a:rPr lang="en-US" altLang="ko-KR" dirty="0">
+                <a:solidFill>
+                  <a:srgbClr val="0000FF"/>
+                </a:solidFill>
+              </a:rPr>
+              <a:t>1          2          3          4</a:t>
+            </a:r>
+            <a:endParaRPr lang="ko-KR" altLang="en-US" dirty="0">
+              <a:solidFill>
+                <a:srgbClr val="FF0000"/>
+              </a:solidFill>
+            </a:endParaRPr>
+          </a:p>
+        </p:txBody>
+      </p:sp>
+      <p:sp>
+        <p:nvSpPr>
+          <p:cNvPr id="25" name="TextBox 24">
+            <a:extLst>
+              <a:ext uri="{FF2B5EF4-FFF2-40B4-BE49-F238E27FC236}">
+                <a16:creationId xmlns:a16="http://schemas.microsoft.com/office/drawing/2014/main" id="{68653746-A6D1-419F-9988-FB3D79AA3613}"/>
+              </a:ext>
+            </a:extLst>
+          </p:cNvPr>
+          <p:cNvSpPr txBox="1"/>
+          <p:nvPr/>
+        </p:nvSpPr>
+        <p:spPr>
+          <a:xfrm>
+            <a:off x="3681405" y="4411964"/>
+            <a:ext cx="3470822" cy="1569660"/>
+          </a:xfrm>
+          <a:prstGeom prst="rect">
+            <a:avLst/>
+          </a:prstGeom>
+          <a:noFill/>
+        </p:spPr>
+        <p:txBody>
+          <a:bodyPr wrap="none" rtlCol="0">
+            <a:spAutoFit/>
+          </a:bodyPr>
+          <a:lstStyle/>
+          <a:p>
+            <a:r>
+              <a:rPr lang="en-US" altLang="ko-KR" sz="1600" dirty="0"/>
+              <a:t>res </a:t>
+            </a:r>
+            <a:r>
+              <a:rPr lang="ko-KR" altLang="en-US" sz="1600" dirty="0"/>
+              <a:t>에 횟수 만큼 배열 만들고</a:t>
+            </a:r>
+            <a:r>
+              <a:rPr lang="en-US" altLang="ko-KR" sz="1600" dirty="0"/>
+              <a:t>, </a:t>
+            </a:r>
+          </a:p>
+          <a:p>
+            <a:r>
+              <a:rPr lang="ko-KR" altLang="en-US" sz="1600" dirty="0"/>
+              <a:t>뻗었을 때 그 값을 넣어 줌</a:t>
+            </a:r>
+            <a:endParaRPr lang="en-US" altLang="ko-KR" sz="1600" dirty="0"/>
+          </a:p>
+          <a:p>
+            <a:endParaRPr lang="en-US" altLang="ko-KR" sz="1600" dirty="0"/>
+          </a:p>
+          <a:p>
+            <a:r>
+              <a:rPr lang="en-US" altLang="ko-KR" sz="1600" dirty="0"/>
+              <a:t>D(L, S) </a:t>
+            </a:r>
+            <a:r>
+              <a:rPr lang="ko-KR" altLang="en-US" sz="1600" dirty="0"/>
+              <a:t>의 </a:t>
+            </a:r>
+            <a:r>
+              <a:rPr lang="en-US" altLang="ko-KR" sz="1600" dirty="0"/>
+              <a:t>L </a:t>
+            </a:r>
+            <a:r>
+              <a:rPr lang="ko-KR" altLang="en-US" sz="1600" dirty="0"/>
+              <a:t>은 레벨</a:t>
+            </a:r>
+            <a:r>
+              <a:rPr lang="en-US" altLang="ko-KR" sz="1600" dirty="0"/>
+              <a:t>, S</a:t>
+            </a:r>
+            <a:r>
+              <a:rPr lang="ko-KR" altLang="en-US" sz="1600" dirty="0"/>
+              <a:t>는 시작점</a:t>
+            </a:r>
+            <a:endParaRPr lang="en-US" altLang="ko-KR" sz="1600" dirty="0"/>
+          </a:p>
+          <a:p>
+            <a:endParaRPr lang="en-US" altLang="ko-KR" sz="1600" dirty="0"/>
+          </a:p>
+          <a:p>
+            <a:r>
+              <a:rPr lang="ko-KR" altLang="en-US" sz="1600" dirty="0"/>
+              <a:t>왔다 갈 때는 다시 </a:t>
+            </a:r>
+            <a:r>
+              <a:rPr lang="en-US" altLang="ko-KR" sz="1600" dirty="0"/>
+              <a:t>0 </a:t>
+            </a:r>
+            <a:r>
+              <a:rPr lang="ko-KR" altLang="en-US" sz="1600" dirty="0"/>
+              <a:t>으로 </a:t>
+            </a:r>
+            <a:r>
+              <a:rPr lang="ko-KR" altLang="en-US" sz="1600" dirty="0" err="1"/>
+              <a:t>셋팅한다</a:t>
+            </a:r>
+            <a:r>
+              <a:rPr lang="ko-KR" altLang="en-US" sz="1600" dirty="0"/>
+              <a:t> </a:t>
+            </a:r>
+          </a:p>
+        </p:txBody>
+      </p:sp>
+      <p:sp>
+        <p:nvSpPr>
+          <p:cNvPr id="26" name="TextBox 25">
+            <a:extLst>
+              <a:ext uri="{FF2B5EF4-FFF2-40B4-BE49-F238E27FC236}">
+                <a16:creationId xmlns:a16="http://schemas.microsoft.com/office/drawing/2014/main" id="{17A744BC-6B4F-4099-80B4-2F0FCC53C1C7}"/>
+              </a:ext>
+            </a:extLst>
+          </p:cNvPr>
+          <p:cNvSpPr txBox="1"/>
+          <p:nvPr/>
+        </p:nvSpPr>
+        <p:spPr>
+          <a:xfrm>
+            <a:off x="3905031" y="3093270"/>
+            <a:ext cx="800219" cy="523220"/>
+          </a:xfrm>
+          <a:prstGeom prst="rect">
+            <a:avLst/>
+          </a:prstGeom>
+          <a:noFill/>
+        </p:spPr>
+        <p:txBody>
+          <a:bodyPr wrap="none" rtlCol="0">
+            <a:spAutoFit/>
+          </a:bodyPr>
+          <a:lstStyle/>
+          <a:p>
+            <a:r>
+              <a:rPr lang="en-US" altLang="ko-KR" sz="2800" dirty="0"/>
+              <a:t>. . . </a:t>
+            </a:r>
+            <a:endParaRPr lang="ko-KR" altLang="en-US" sz="2800" dirty="0"/>
+          </a:p>
+        </p:txBody>
+      </p:sp>
+      <p:sp>
+        <p:nvSpPr>
+          <p:cNvPr id="31" name="TextBox 30">
+            <a:extLst>
+              <a:ext uri="{FF2B5EF4-FFF2-40B4-BE49-F238E27FC236}">
+                <a16:creationId xmlns:a16="http://schemas.microsoft.com/office/drawing/2014/main" id="{F37B00DD-DB93-42E5-B14D-4592C54A248B}"/>
+              </a:ext>
+            </a:extLst>
+          </p:cNvPr>
+          <p:cNvSpPr txBox="1"/>
+          <p:nvPr/>
+        </p:nvSpPr>
+        <p:spPr>
+          <a:xfrm>
+            <a:off x="889192" y="678139"/>
+            <a:ext cx="705642" cy="523220"/>
+          </a:xfrm>
+          <a:prstGeom prst="rect">
+            <a:avLst/>
+          </a:prstGeom>
+          <a:noFill/>
+        </p:spPr>
+        <p:txBody>
+          <a:bodyPr wrap="none" rtlCol="0">
+            <a:spAutoFit/>
+          </a:bodyPr>
+          <a:lstStyle/>
+          <a:p>
+            <a:r>
+              <a:rPr lang="ko-KR" altLang="en-US" sz="1400" dirty="0"/>
+              <a:t>구슬 </a:t>
+            </a:r>
+            <a:r>
+              <a:rPr lang="en-US" altLang="ko-KR" sz="1400" dirty="0"/>
+              <a:t>3</a:t>
+            </a:r>
+          </a:p>
+          <a:p>
+            <a:r>
+              <a:rPr lang="ko-KR" altLang="en-US" sz="1400" dirty="0"/>
+              <a:t>횟수 </a:t>
+            </a:r>
+            <a:r>
+              <a:rPr lang="en-US" altLang="ko-KR" sz="1400" dirty="0"/>
+              <a:t>2</a:t>
+            </a:r>
+            <a:endParaRPr lang="ko-KR" altLang="en-US" sz="1400" dirty="0"/>
+          </a:p>
+        </p:txBody>
+      </p:sp>
+      <p:cxnSp>
+        <p:nvCxnSpPr>
+          <p:cNvPr id="29" name="직선 화살표 연결선 28">
+            <a:extLst>
+              <a:ext uri="{FF2B5EF4-FFF2-40B4-BE49-F238E27FC236}">
+                <a16:creationId xmlns:a16="http://schemas.microsoft.com/office/drawing/2014/main" id="{9C7C0AFE-2305-4D89-9313-83FF9F9C84DB}"/>
+              </a:ext>
+            </a:extLst>
+          </p:cNvPr>
+          <p:cNvCxnSpPr>
+            <a:cxnSpLocks/>
+            <a:stCxn id="3" idx="2"/>
+            <a:endCxn id="34" idx="0"/>
+          </p:cNvCxnSpPr>
+          <p:nvPr/>
+        </p:nvCxnSpPr>
+        <p:spPr>
+          <a:xfrm>
+            <a:off x="4876903" y="1123950"/>
+            <a:ext cx="0" cy="600074"/>
+          </a:xfrm>
+          <a:prstGeom prst="straightConnector1">
+            <a:avLst/>
+          </a:prstGeom>
+          <a:ln w="15875">
+            <a:solidFill>
+              <a:srgbClr val="FF0000"/>
+            </a:solidFill>
+            <a:tailEnd type="triangle" w="lg" len="med"/>
+          </a:ln>
+        </p:spPr>
+        <p:style>
+          <a:lnRef idx="1">
+            <a:schemeClr val="accent1"/>
+          </a:lnRef>
+          <a:fillRef idx="0">
+            <a:schemeClr val="accent1"/>
+          </a:fillRef>
+          <a:effectRef idx="0">
+            <a:schemeClr val="accent1"/>
+          </a:effectRef>
+          <a:fontRef idx="minor">
+            <a:schemeClr val="tx1"/>
+          </a:fontRef>
+        </p:style>
+      </p:cxnSp>
+      <p:sp>
+        <p:nvSpPr>
+          <p:cNvPr id="34" name="직사각형 33">
+            <a:extLst>
+              <a:ext uri="{FF2B5EF4-FFF2-40B4-BE49-F238E27FC236}">
+                <a16:creationId xmlns:a16="http://schemas.microsoft.com/office/drawing/2014/main" id="{ABECE2D1-7B0A-490B-83F1-B281DD342FB9}"/>
+              </a:ext>
+            </a:extLst>
+          </p:cNvPr>
+          <p:cNvSpPr/>
+          <p:nvPr/>
+        </p:nvSpPr>
+        <p:spPr>
+          <a:xfrm>
+            <a:off x="4338319" y="1724024"/>
+            <a:ext cx="1077168" cy="428625"/>
+          </a:xfrm>
+          <a:prstGeom prst="rect">
+            <a:avLst/>
+          </a:prstGeom>
+        </p:spPr>
+        <p:style>
+          <a:lnRef idx="2">
+            <a:schemeClr val="accent1">
+              <a:shade val="50000"/>
+            </a:schemeClr>
+          </a:lnRef>
+          <a:fillRef idx="1">
+            <a:schemeClr val="accent1"/>
+          </a:fillRef>
+          <a:effectRef idx="0">
+            <a:schemeClr val="accent1"/>
+          </a:effectRef>
+          <a:fontRef idx="minor">
+            <a:schemeClr val="lt1"/>
+          </a:fontRef>
+        </p:style>
+        <p:txBody>
+          <a:bodyPr rtlCol="0" anchor="ctr"/>
+          <a:lstStyle/>
+          <a:p>
+            <a:pPr algn="ctr"/>
+            <a:r>
+              <a:rPr lang="en-US" altLang="ko-KR" dirty="0"/>
+              <a:t>D(1,3)</a:t>
+            </a:r>
+            <a:endParaRPr lang="ko-KR" altLang="en-US" dirty="0"/>
+          </a:p>
+        </p:txBody>
+      </p:sp>
+      <p:sp>
+        <p:nvSpPr>
+          <p:cNvPr id="35" name="직사각형 34">
+            <a:extLst>
+              <a:ext uri="{FF2B5EF4-FFF2-40B4-BE49-F238E27FC236}">
+                <a16:creationId xmlns:a16="http://schemas.microsoft.com/office/drawing/2014/main" id="{C56F9B67-E6B6-444D-B011-398A88629926}"/>
+              </a:ext>
+            </a:extLst>
+          </p:cNvPr>
+          <p:cNvSpPr/>
+          <p:nvPr/>
+        </p:nvSpPr>
+        <p:spPr>
+          <a:xfrm>
+            <a:off x="5498022" y="1724023"/>
+            <a:ext cx="1077168" cy="428625"/>
+          </a:xfrm>
+          <a:prstGeom prst="rect">
+            <a:avLst/>
+          </a:prstGeom>
+        </p:spPr>
+        <p:style>
+          <a:lnRef idx="2">
+            <a:schemeClr val="accent1">
+              <a:shade val="50000"/>
+            </a:schemeClr>
+          </a:lnRef>
+          <a:fillRef idx="1">
+            <a:schemeClr val="accent1"/>
+          </a:fillRef>
+          <a:effectRef idx="0">
+            <a:schemeClr val="accent1"/>
+          </a:effectRef>
+          <a:fontRef idx="minor">
+            <a:schemeClr val="lt1"/>
+          </a:fontRef>
+        </p:style>
+        <p:txBody>
+          <a:bodyPr rtlCol="0" anchor="ctr"/>
+          <a:lstStyle/>
+          <a:p>
+            <a:pPr algn="ctr"/>
+            <a:r>
+              <a:rPr lang="en-US" altLang="ko-KR" dirty="0"/>
+              <a:t>D(1,4)</a:t>
+            </a:r>
+            <a:endParaRPr lang="ko-KR" altLang="en-US" dirty="0"/>
+          </a:p>
+        </p:txBody>
+      </p:sp>
+      <p:cxnSp>
+        <p:nvCxnSpPr>
+          <p:cNvPr id="41" name="직선 화살표 연결선 40">
+            <a:extLst>
+              <a:ext uri="{FF2B5EF4-FFF2-40B4-BE49-F238E27FC236}">
+                <a16:creationId xmlns:a16="http://schemas.microsoft.com/office/drawing/2014/main" id="{AEBA5115-3C84-4776-88CD-354F073D6878}"/>
+              </a:ext>
+            </a:extLst>
+          </p:cNvPr>
+          <p:cNvCxnSpPr>
+            <a:cxnSpLocks/>
+            <a:stCxn id="4" idx="2"/>
+          </p:cNvCxnSpPr>
+          <p:nvPr/>
+        </p:nvCxnSpPr>
+        <p:spPr>
+          <a:xfrm>
+            <a:off x="3733380" y="2141044"/>
+            <a:ext cx="12378" cy="1028368"/>
+          </a:xfrm>
+          <a:prstGeom prst="straightConnector1">
+            <a:avLst/>
+          </a:prstGeom>
+          <a:ln w="15875">
+            <a:solidFill>
+              <a:srgbClr val="FF0000"/>
+            </a:solidFill>
+            <a:tailEnd type="triangle" w="lg" len="med"/>
+          </a:ln>
+        </p:spPr>
+        <p:style>
+          <a:lnRef idx="1">
+            <a:schemeClr val="accent1"/>
+          </a:lnRef>
+          <a:fillRef idx="0">
+            <a:schemeClr val="accent1"/>
+          </a:fillRef>
+          <a:effectRef idx="0">
+            <a:schemeClr val="accent1"/>
+          </a:effectRef>
+          <a:fontRef idx="minor">
+            <a:schemeClr val="tx1"/>
+          </a:fontRef>
+        </p:style>
+      </p:cxnSp>
+      <p:sp>
+        <p:nvSpPr>
+          <p:cNvPr id="50" name="TextBox 49">
+            <a:extLst>
+              <a:ext uri="{FF2B5EF4-FFF2-40B4-BE49-F238E27FC236}">
+                <a16:creationId xmlns:a16="http://schemas.microsoft.com/office/drawing/2014/main" id="{FF12CCA2-E776-4FFC-8D0C-028AC773ED69}"/>
+              </a:ext>
+            </a:extLst>
+          </p:cNvPr>
+          <p:cNvSpPr txBox="1"/>
+          <p:nvPr/>
+        </p:nvSpPr>
+        <p:spPr>
+          <a:xfrm>
+            <a:off x="2895996" y="2524744"/>
+            <a:ext cx="1545616" cy="369332"/>
+          </a:xfrm>
+          <a:prstGeom prst="rect">
+            <a:avLst/>
+          </a:prstGeom>
+          <a:noFill/>
+        </p:spPr>
+        <p:txBody>
+          <a:bodyPr wrap="none" rtlCol="0">
+            <a:spAutoFit/>
+          </a:bodyPr>
+          <a:lstStyle/>
+          <a:p>
+            <a:r>
+              <a:rPr lang="en-US" altLang="ko-KR" dirty="0">
+                <a:solidFill>
+                  <a:srgbClr val="0000FF"/>
+                </a:solidFill>
+              </a:rPr>
+              <a:t>2      3      4</a:t>
+            </a:r>
+            <a:endParaRPr lang="ko-KR" altLang="en-US" dirty="0">
+              <a:solidFill>
+                <a:srgbClr val="FF0000"/>
+              </a:solidFill>
+            </a:endParaRPr>
+          </a:p>
+        </p:txBody>
+      </p:sp>
+      <p:graphicFrame>
+        <p:nvGraphicFramePr>
+          <p:cNvPr id="51" name="표 50">
+            <a:extLst>
+              <a:ext uri="{FF2B5EF4-FFF2-40B4-BE49-F238E27FC236}">
+                <a16:creationId xmlns:a16="http://schemas.microsoft.com/office/drawing/2014/main" id="{1EBFCB8B-9D5C-4F53-91D8-F933803E2482}"/>
+              </a:ext>
+            </a:extLst>
+          </p:cNvPr>
+          <p:cNvGraphicFramePr>
+            <a:graphicFrameLocks noGrp="1"/>
+          </p:cNvGraphicFramePr>
+          <p:nvPr>
+            <p:extLst>
+              <p:ext uri="{D42A27DB-BD31-4B8C-83A1-F6EECF244321}">
+                <p14:modId xmlns:p14="http://schemas.microsoft.com/office/powerpoint/2010/main" val="3582537749"/>
+              </p:ext>
+            </p:extLst>
+          </p:nvPr>
+        </p:nvGraphicFramePr>
+        <p:xfrm>
+          <a:off x="1727001" y="2003271"/>
+          <a:ext cx="665772" cy="370840"/>
+        </p:xfrm>
+        <a:graphic>
+          <a:graphicData uri="http://schemas.openxmlformats.org/drawingml/2006/table">
+            <a:tbl>
+              <a:tblPr firstRow="1" bandRow="1">
+                <a:tableStyleId>{5C22544A-7EE6-4342-B048-85BDC9FD1C3A}</a:tableStyleId>
+              </a:tblPr>
+              <a:tblGrid>
+                <a:gridCol w="313055">
+                  <a:extLst>
+                    <a:ext uri="{9D8B030D-6E8A-4147-A177-3AD203B41FA5}">
+                      <a16:colId xmlns:a16="http://schemas.microsoft.com/office/drawing/2014/main" val="662917937"/>
+                    </a:ext>
+                  </a:extLst>
+                </a:gridCol>
+                <a:gridCol w="352717">
+                  <a:extLst>
+                    <a:ext uri="{9D8B030D-6E8A-4147-A177-3AD203B41FA5}">
+                      <a16:colId xmlns:a16="http://schemas.microsoft.com/office/drawing/2014/main" val="3082420159"/>
+                    </a:ext>
+                  </a:extLst>
+                </a:gridCol>
+              </a:tblGrid>
+              <a:tr h="370840">
+                <a:tc>
+                  <a:txBody>
+                    <a:bodyPr/>
+                    <a:lstStyle/>
+                    <a:p>
+                      <a:pPr latinLnBrk="1"/>
+                      <a:r>
+                        <a:rPr lang="en-US" altLang="ko-KR" sz="1100" dirty="0"/>
+                        <a:t>1</a:t>
+                      </a:r>
+                      <a:endParaRPr lang="ko-KR" altLang="en-US" sz="1100" dirty="0"/>
+                    </a:p>
+                  </a:txBody>
+                  <a:tcPr anchor="ctr"/>
+                </a:tc>
+                <a:tc>
+                  <a:txBody>
+                    <a:bodyPr/>
+                    <a:lstStyle/>
+                    <a:p>
+                      <a:pPr latinLnBrk="1"/>
+                      <a:r>
+                        <a:rPr lang="en-US" altLang="ko-KR" sz="1100" dirty="0"/>
+                        <a:t>0</a:t>
+                      </a:r>
+                      <a:endParaRPr lang="ko-KR" altLang="en-US" sz="1100" dirty="0"/>
+                    </a:p>
+                  </a:txBody>
+                  <a:tcPr anchor="ctr"/>
+                </a:tc>
+                <a:extLst>
+                  <a:ext uri="{0D108BD9-81ED-4DB2-BD59-A6C34878D82A}">
+                    <a16:rowId xmlns:a16="http://schemas.microsoft.com/office/drawing/2014/main" val="547838226"/>
+                  </a:ext>
+                </a:extLst>
+              </a:tr>
+            </a:tbl>
+          </a:graphicData>
+        </a:graphic>
+      </p:graphicFrame>
+      <p:sp>
+        <p:nvSpPr>
+          <p:cNvPr id="52" name="TextBox 51">
+            <a:extLst>
+              <a:ext uri="{FF2B5EF4-FFF2-40B4-BE49-F238E27FC236}">
+                <a16:creationId xmlns:a16="http://schemas.microsoft.com/office/drawing/2014/main" id="{08A227A7-7B93-4738-A395-F5AFC593C574}"/>
+              </a:ext>
+            </a:extLst>
+          </p:cNvPr>
+          <p:cNvSpPr txBox="1"/>
+          <p:nvPr/>
+        </p:nvSpPr>
+        <p:spPr>
+          <a:xfrm>
+            <a:off x="1418135" y="1500352"/>
+            <a:ext cx="1664879" cy="523220"/>
+          </a:xfrm>
+          <a:prstGeom prst="rect">
+            <a:avLst/>
+          </a:prstGeom>
+          <a:noFill/>
+        </p:spPr>
+        <p:txBody>
+          <a:bodyPr wrap="none" rtlCol="0">
+            <a:spAutoFit/>
+          </a:bodyPr>
+          <a:lstStyle/>
+          <a:p>
+            <a:r>
+              <a:rPr lang="en-US" altLang="ko-KR" sz="1400" dirty="0"/>
+              <a:t>1</a:t>
+            </a:r>
+            <a:r>
+              <a:rPr lang="ko-KR" altLang="en-US" sz="1400" dirty="0" err="1"/>
+              <a:t>일때</a:t>
+            </a:r>
+            <a:endParaRPr lang="en-US" altLang="ko-KR" sz="1400" dirty="0"/>
+          </a:p>
+          <a:p>
+            <a:r>
+              <a:rPr lang="en-US" altLang="ko-KR" sz="1400" dirty="0"/>
+              <a:t>res</a:t>
+            </a:r>
+            <a:r>
+              <a:rPr lang="ko-KR" altLang="en-US" sz="1400" dirty="0"/>
+              <a:t> </a:t>
+            </a:r>
+            <a:r>
+              <a:rPr lang="en-US" altLang="ko-KR" sz="1400" dirty="0"/>
+              <a:t>0    1   (index)</a:t>
+            </a:r>
+            <a:endParaRPr lang="ko-KR" altLang="en-US" sz="1400" dirty="0"/>
+          </a:p>
+        </p:txBody>
+      </p:sp>
+      <p:sp>
+        <p:nvSpPr>
+          <p:cNvPr id="10" name="TextBox 9">
+            <a:extLst>
+              <a:ext uri="{FF2B5EF4-FFF2-40B4-BE49-F238E27FC236}">
+                <a16:creationId xmlns:a16="http://schemas.microsoft.com/office/drawing/2014/main" id="{32B34A48-51E3-47B3-B57D-435919A7333F}"/>
+              </a:ext>
+            </a:extLst>
+          </p:cNvPr>
+          <p:cNvSpPr txBox="1"/>
+          <p:nvPr/>
+        </p:nvSpPr>
+        <p:spPr>
+          <a:xfrm>
+            <a:off x="0" y="0"/>
+            <a:ext cx="1806905" cy="369332"/>
+          </a:xfrm>
+          <a:prstGeom prst="rect">
+            <a:avLst/>
+          </a:prstGeom>
+          <a:noFill/>
+        </p:spPr>
+        <p:txBody>
+          <a:bodyPr wrap="none" rtlCol="0">
+            <a:spAutoFit/>
+          </a:bodyPr>
+          <a:lstStyle/>
+          <a:p>
+            <a:r>
+              <a:rPr lang="en-US" altLang="ko-KR" dirty="0">
+                <a:highlight>
+                  <a:srgbClr val="FFFF00"/>
+                </a:highlight>
+              </a:rPr>
+              <a:t>10. </a:t>
+            </a:r>
+            <a:r>
+              <a:rPr lang="ko-KR" altLang="en-US" dirty="0">
+                <a:highlight>
+                  <a:srgbClr val="FFFF00"/>
+                </a:highlight>
+              </a:rPr>
+              <a:t>조합 구하기</a:t>
+            </a:r>
+          </a:p>
+        </p:txBody>
+      </p:sp>
+      <p:sp>
+        <p:nvSpPr>
+          <p:cNvPr id="38" name="직사각형 37">
+            <a:extLst>
+              <a:ext uri="{FF2B5EF4-FFF2-40B4-BE49-F238E27FC236}">
+                <a16:creationId xmlns:a16="http://schemas.microsoft.com/office/drawing/2014/main" id="{7DE99596-3206-4FDE-9BCD-FA1F0B374E05}"/>
+              </a:ext>
+            </a:extLst>
+          </p:cNvPr>
+          <p:cNvSpPr/>
+          <p:nvPr/>
+        </p:nvSpPr>
+        <p:spPr>
+          <a:xfrm>
+            <a:off x="6641545" y="1712418"/>
+            <a:ext cx="1077168" cy="428625"/>
+          </a:xfrm>
+          <a:prstGeom prst="rect">
+            <a:avLst/>
+          </a:prstGeom>
+        </p:spPr>
+        <p:style>
+          <a:lnRef idx="2">
+            <a:schemeClr val="accent1">
+              <a:shade val="50000"/>
+            </a:schemeClr>
+          </a:lnRef>
+          <a:fillRef idx="1">
+            <a:schemeClr val="accent1"/>
+          </a:fillRef>
+          <a:effectRef idx="0">
+            <a:schemeClr val="accent1"/>
+          </a:effectRef>
+          <a:fontRef idx="minor">
+            <a:schemeClr val="lt1"/>
+          </a:fontRef>
+        </p:style>
+        <p:txBody>
+          <a:bodyPr rtlCol="0" anchor="ctr"/>
+          <a:lstStyle/>
+          <a:p>
+            <a:pPr algn="ctr"/>
+            <a:r>
+              <a:rPr lang="en-US" altLang="ko-KR" dirty="0"/>
+              <a:t>D(1,5)</a:t>
+            </a:r>
+            <a:endParaRPr lang="ko-KR" altLang="en-US" dirty="0"/>
+          </a:p>
+        </p:txBody>
+      </p:sp>
+      <p:cxnSp>
+        <p:nvCxnSpPr>
+          <p:cNvPr id="39" name="직선 화살표 연결선 38">
+            <a:extLst>
+              <a:ext uri="{FF2B5EF4-FFF2-40B4-BE49-F238E27FC236}">
+                <a16:creationId xmlns:a16="http://schemas.microsoft.com/office/drawing/2014/main" id="{28BBB83D-A017-48FC-BBE2-0439E9417BDD}"/>
+              </a:ext>
+            </a:extLst>
+          </p:cNvPr>
+          <p:cNvCxnSpPr>
+            <a:cxnSpLocks/>
+            <a:stCxn id="3" idx="2"/>
+            <a:endCxn id="38" idx="0"/>
+          </p:cNvCxnSpPr>
+          <p:nvPr/>
+        </p:nvCxnSpPr>
+        <p:spPr>
+          <a:xfrm>
+            <a:off x="4876903" y="1123950"/>
+            <a:ext cx="2303226" cy="588468"/>
+          </a:xfrm>
+          <a:prstGeom prst="straightConnector1">
+            <a:avLst/>
+          </a:prstGeom>
+          <a:ln w="15875">
+            <a:solidFill>
+              <a:srgbClr val="FF0000"/>
+            </a:solidFill>
+            <a:tailEnd type="triangle" w="lg" len="med"/>
+          </a:ln>
+        </p:spPr>
+        <p:style>
+          <a:lnRef idx="1">
+            <a:schemeClr val="accent1"/>
+          </a:lnRef>
+          <a:fillRef idx="0">
+            <a:schemeClr val="accent1"/>
+          </a:fillRef>
+          <a:effectRef idx="0">
+            <a:schemeClr val="accent1"/>
+          </a:effectRef>
+          <a:fontRef idx="minor">
+            <a:schemeClr val="tx1"/>
+          </a:fontRef>
+        </p:style>
+      </p:cxnSp>
+      <p:graphicFrame>
+        <p:nvGraphicFramePr>
+          <p:cNvPr id="40" name="표 39">
+            <a:extLst>
+              <a:ext uri="{FF2B5EF4-FFF2-40B4-BE49-F238E27FC236}">
+                <a16:creationId xmlns:a16="http://schemas.microsoft.com/office/drawing/2014/main" id="{1E9B1F8D-E972-46A8-811A-5B8BE96875B0}"/>
+              </a:ext>
+            </a:extLst>
+          </p:cNvPr>
+          <p:cNvGraphicFramePr>
+            <a:graphicFrameLocks noGrp="1"/>
+          </p:cNvGraphicFramePr>
+          <p:nvPr>
+            <p:extLst>
+              <p:ext uri="{D42A27DB-BD31-4B8C-83A1-F6EECF244321}">
+                <p14:modId xmlns:p14="http://schemas.microsoft.com/office/powerpoint/2010/main" val="133238962"/>
+              </p:ext>
+            </p:extLst>
+          </p:nvPr>
+        </p:nvGraphicFramePr>
+        <p:xfrm>
+          <a:off x="1363291" y="3086789"/>
+          <a:ext cx="665772" cy="370840"/>
+        </p:xfrm>
+        <a:graphic>
+          <a:graphicData uri="http://schemas.openxmlformats.org/drawingml/2006/table">
+            <a:tbl>
+              <a:tblPr firstRow="1" bandRow="1">
+                <a:tableStyleId>{5C22544A-7EE6-4342-B048-85BDC9FD1C3A}</a:tableStyleId>
+              </a:tblPr>
+              <a:tblGrid>
+                <a:gridCol w="313055">
+                  <a:extLst>
+                    <a:ext uri="{9D8B030D-6E8A-4147-A177-3AD203B41FA5}">
+                      <a16:colId xmlns:a16="http://schemas.microsoft.com/office/drawing/2014/main" val="662917937"/>
+                    </a:ext>
+                  </a:extLst>
+                </a:gridCol>
+                <a:gridCol w="352717">
+                  <a:extLst>
+                    <a:ext uri="{9D8B030D-6E8A-4147-A177-3AD203B41FA5}">
+                      <a16:colId xmlns:a16="http://schemas.microsoft.com/office/drawing/2014/main" val="3082420159"/>
+                    </a:ext>
+                  </a:extLst>
+                </a:gridCol>
+              </a:tblGrid>
+              <a:tr h="370840">
+                <a:tc>
+                  <a:txBody>
+                    <a:bodyPr/>
+                    <a:lstStyle/>
+                    <a:p>
+                      <a:pPr latinLnBrk="1"/>
+                      <a:r>
+                        <a:rPr lang="en-US" altLang="ko-KR" sz="1100" dirty="0"/>
+                        <a:t>1</a:t>
+                      </a:r>
+                      <a:endParaRPr lang="ko-KR" altLang="en-US" sz="1100" dirty="0"/>
+                    </a:p>
+                  </a:txBody>
+                  <a:tcPr anchor="ctr"/>
+                </a:tc>
+                <a:tc>
+                  <a:txBody>
+                    <a:bodyPr/>
+                    <a:lstStyle/>
+                    <a:p>
+                      <a:pPr latinLnBrk="1"/>
+                      <a:r>
+                        <a:rPr lang="en-US" altLang="ko-KR" sz="1100" dirty="0"/>
+                        <a:t>2</a:t>
+                      </a:r>
+                      <a:endParaRPr lang="ko-KR" altLang="en-US" sz="1100" dirty="0"/>
+                    </a:p>
+                  </a:txBody>
+                  <a:tcPr anchor="ctr"/>
+                </a:tc>
+                <a:extLst>
+                  <a:ext uri="{0D108BD9-81ED-4DB2-BD59-A6C34878D82A}">
+                    <a16:rowId xmlns:a16="http://schemas.microsoft.com/office/drawing/2014/main" val="547838226"/>
+                  </a:ext>
+                </a:extLst>
+              </a:tr>
+            </a:tbl>
+          </a:graphicData>
+        </a:graphic>
+      </p:graphicFrame>
+      <p:sp>
+        <p:nvSpPr>
+          <p:cNvPr id="42" name="TextBox 41">
+            <a:extLst>
+              <a:ext uri="{FF2B5EF4-FFF2-40B4-BE49-F238E27FC236}">
+                <a16:creationId xmlns:a16="http://schemas.microsoft.com/office/drawing/2014/main" id="{6DC0AEBD-9130-48C2-ADEE-89672B165708}"/>
+              </a:ext>
+            </a:extLst>
+          </p:cNvPr>
+          <p:cNvSpPr txBox="1"/>
+          <p:nvPr/>
+        </p:nvSpPr>
+        <p:spPr>
+          <a:xfrm>
+            <a:off x="1054425" y="2583870"/>
+            <a:ext cx="1664879" cy="523220"/>
+          </a:xfrm>
+          <a:prstGeom prst="rect">
+            <a:avLst/>
+          </a:prstGeom>
+          <a:noFill/>
+        </p:spPr>
+        <p:txBody>
+          <a:bodyPr wrap="none" rtlCol="0">
+            <a:spAutoFit/>
+          </a:bodyPr>
+          <a:lstStyle/>
+          <a:p>
+            <a:r>
+              <a:rPr lang="en-US" altLang="ko-KR" sz="1400" dirty="0"/>
+              <a:t>2</a:t>
+            </a:r>
+            <a:r>
+              <a:rPr lang="ko-KR" altLang="en-US" sz="1400" dirty="0" err="1"/>
+              <a:t>일때</a:t>
+            </a:r>
+            <a:endParaRPr lang="en-US" altLang="ko-KR" sz="1400" dirty="0"/>
+          </a:p>
+          <a:p>
+            <a:r>
+              <a:rPr lang="en-US" altLang="ko-KR" sz="1400" dirty="0"/>
+              <a:t>res</a:t>
+            </a:r>
+            <a:r>
+              <a:rPr lang="ko-KR" altLang="en-US" sz="1400" dirty="0"/>
+              <a:t> </a:t>
+            </a:r>
+            <a:r>
+              <a:rPr lang="en-US" altLang="ko-KR" sz="1400" dirty="0"/>
+              <a:t>0    1   (index)</a:t>
+            </a:r>
+            <a:endParaRPr lang="ko-KR" altLang="en-US" sz="1400" dirty="0"/>
+          </a:p>
+        </p:txBody>
+      </p:sp>
+      <p:cxnSp>
+        <p:nvCxnSpPr>
+          <p:cNvPr id="43" name="직선 화살표 연결선 42">
+            <a:extLst>
+              <a:ext uri="{FF2B5EF4-FFF2-40B4-BE49-F238E27FC236}">
+                <a16:creationId xmlns:a16="http://schemas.microsoft.com/office/drawing/2014/main" id="{ED1FEBFC-DC1A-4633-8D89-1B5D24590452}"/>
+              </a:ext>
+            </a:extLst>
+          </p:cNvPr>
+          <p:cNvCxnSpPr>
+            <a:cxnSpLocks/>
+            <a:stCxn id="34" idx="2"/>
+          </p:cNvCxnSpPr>
+          <p:nvPr/>
+        </p:nvCxnSpPr>
+        <p:spPr>
+          <a:xfrm>
+            <a:off x="4876903" y="2152649"/>
+            <a:ext cx="726934" cy="1027145"/>
+          </a:xfrm>
+          <a:prstGeom prst="straightConnector1">
+            <a:avLst/>
+          </a:prstGeom>
+          <a:ln w="15875">
+            <a:solidFill>
+              <a:srgbClr val="FF0000"/>
+            </a:solidFill>
+            <a:tailEnd type="triangle" w="lg" len="med"/>
+          </a:ln>
+        </p:spPr>
+        <p:style>
+          <a:lnRef idx="1">
+            <a:schemeClr val="accent1"/>
+          </a:lnRef>
+          <a:fillRef idx="0">
+            <a:schemeClr val="accent1"/>
+          </a:fillRef>
+          <a:effectRef idx="0">
+            <a:schemeClr val="accent1"/>
+          </a:effectRef>
+          <a:fontRef idx="minor">
+            <a:schemeClr val="tx1"/>
+          </a:fontRef>
+        </p:style>
+      </p:cxnSp>
+      <p:cxnSp>
+        <p:nvCxnSpPr>
+          <p:cNvPr id="44" name="직선 화살표 연결선 43">
+            <a:extLst>
+              <a:ext uri="{FF2B5EF4-FFF2-40B4-BE49-F238E27FC236}">
+                <a16:creationId xmlns:a16="http://schemas.microsoft.com/office/drawing/2014/main" id="{1F17DBB4-B808-41EF-8D59-D9BF07B0C3E1}"/>
+              </a:ext>
+            </a:extLst>
+          </p:cNvPr>
+          <p:cNvCxnSpPr>
+            <a:cxnSpLocks/>
+            <a:stCxn id="34" idx="2"/>
+          </p:cNvCxnSpPr>
+          <p:nvPr/>
+        </p:nvCxnSpPr>
+        <p:spPr>
+          <a:xfrm>
+            <a:off x="4876903" y="2152649"/>
+            <a:ext cx="21925" cy="1016763"/>
+          </a:xfrm>
+          <a:prstGeom prst="straightConnector1">
+            <a:avLst/>
+          </a:prstGeom>
+          <a:ln w="15875">
+            <a:solidFill>
+              <a:srgbClr val="FF0000"/>
+            </a:solidFill>
+            <a:tailEnd type="triangle" w="lg" len="med"/>
+          </a:ln>
+        </p:spPr>
+        <p:style>
+          <a:lnRef idx="1">
+            <a:schemeClr val="accent1"/>
+          </a:lnRef>
+          <a:fillRef idx="0">
+            <a:schemeClr val="accent1"/>
+          </a:fillRef>
+          <a:effectRef idx="0">
+            <a:schemeClr val="accent1"/>
+          </a:effectRef>
+          <a:fontRef idx="minor">
+            <a:schemeClr val="tx1"/>
+          </a:fontRef>
+        </p:style>
+      </p:cxnSp>
+      <p:sp>
+        <p:nvSpPr>
+          <p:cNvPr id="45" name="TextBox 44">
+            <a:extLst>
+              <a:ext uri="{FF2B5EF4-FFF2-40B4-BE49-F238E27FC236}">
+                <a16:creationId xmlns:a16="http://schemas.microsoft.com/office/drawing/2014/main" id="{CA9CAC0C-9AC6-4536-B411-92D37C1FB723}"/>
+              </a:ext>
+            </a:extLst>
+          </p:cNvPr>
+          <p:cNvSpPr txBox="1"/>
+          <p:nvPr/>
+        </p:nvSpPr>
+        <p:spPr>
+          <a:xfrm>
+            <a:off x="4675378" y="2526191"/>
+            <a:ext cx="928459" cy="369332"/>
+          </a:xfrm>
+          <a:prstGeom prst="rect">
+            <a:avLst/>
+          </a:prstGeom>
+          <a:noFill/>
+        </p:spPr>
+        <p:txBody>
+          <a:bodyPr wrap="none" rtlCol="0">
+            <a:spAutoFit/>
+          </a:bodyPr>
+          <a:lstStyle/>
+          <a:p>
+            <a:r>
+              <a:rPr lang="en-US" altLang="ko-KR" dirty="0">
+                <a:solidFill>
+                  <a:srgbClr val="0000FF"/>
+                </a:solidFill>
+              </a:rPr>
+              <a:t>3      4</a:t>
+            </a:r>
+            <a:endParaRPr lang="ko-KR" altLang="en-US" dirty="0">
+              <a:solidFill>
+                <a:srgbClr val="FF0000"/>
+              </a:solidFill>
+            </a:endParaRPr>
+          </a:p>
+        </p:txBody>
+      </p:sp>
+      <p:graphicFrame>
+        <p:nvGraphicFramePr>
+          <p:cNvPr id="46" name="표 45">
+            <a:extLst>
+              <a:ext uri="{FF2B5EF4-FFF2-40B4-BE49-F238E27FC236}">
+                <a16:creationId xmlns:a16="http://schemas.microsoft.com/office/drawing/2014/main" id="{836536BF-88D5-4090-9036-05E9C76C553D}"/>
+              </a:ext>
+            </a:extLst>
+          </p:cNvPr>
+          <p:cNvGraphicFramePr>
+            <a:graphicFrameLocks noGrp="1"/>
+          </p:cNvGraphicFramePr>
+          <p:nvPr>
+            <p:extLst>
+              <p:ext uri="{D42A27DB-BD31-4B8C-83A1-F6EECF244321}">
+                <p14:modId xmlns:p14="http://schemas.microsoft.com/office/powerpoint/2010/main" val="3921420380"/>
+              </p:ext>
+            </p:extLst>
+          </p:nvPr>
+        </p:nvGraphicFramePr>
+        <p:xfrm>
+          <a:off x="5975773" y="3086789"/>
+          <a:ext cx="665772" cy="370840"/>
+        </p:xfrm>
+        <a:graphic>
+          <a:graphicData uri="http://schemas.openxmlformats.org/drawingml/2006/table">
+            <a:tbl>
+              <a:tblPr firstRow="1" bandRow="1">
+                <a:tableStyleId>{5C22544A-7EE6-4342-B048-85BDC9FD1C3A}</a:tableStyleId>
+              </a:tblPr>
+              <a:tblGrid>
+                <a:gridCol w="313055">
+                  <a:extLst>
+                    <a:ext uri="{9D8B030D-6E8A-4147-A177-3AD203B41FA5}">
+                      <a16:colId xmlns:a16="http://schemas.microsoft.com/office/drawing/2014/main" val="662917937"/>
+                    </a:ext>
+                  </a:extLst>
+                </a:gridCol>
+                <a:gridCol w="352717">
+                  <a:extLst>
+                    <a:ext uri="{9D8B030D-6E8A-4147-A177-3AD203B41FA5}">
+                      <a16:colId xmlns:a16="http://schemas.microsoft.com/office/drawing/2014/main" val="3082420159"/>
+                    </a:ext>
+                  </a:extLst>
+                </a:gridCol>
+              </a:tblGrid>
+              <a:tr h="370840">
+                <a:tc>
+                  <a:txBody>
+                    <a:bodyPr/>
+                    <a:lstStyle/>
+                    <a:p>
+                      <a:pPr latinLnBrk="1"/>
+                      <a:r>
+                        <a:rPr lang="en-US" altLang="ko-KR" sz="1100" dirty="0"/>
+                        <a:t>2</a:t>
+                      </a:r>
+                      <a:endParaRPr lang="ko-KR" altLang="en-US" sz="1100" dirty="0"/>
+                    </a:p>
+                  </a:txBody>
+                  <a:tcPr anchor="ctr"/>
+                </a:tc>
+                <a:tc>
+                  <a:txBody>
+                    <a:bodyPr/>
+                    <a:lstStyle/>
+                    <a:p>
+                      <a:pPr latinLnBrk="1"/>
+                      <a:r>
+                        <a:rPr lang="en-US" altLang="ko-KR" sz="1100" dirty="0"/>
+                        <a:t>4</a:t>
+                      </a:r>
+                      <a:endParaRPr lang="ko-KR" altLang="en-US" sz="1100" dirty="0"/>
+                    </a:p>
+                  </a:txBody>
+                  <a:tcPr anchor="ctr"/>
+                </a:tc>
+                <a:extLst>
+                  <a:ext uri="{0D108BD9-81ED-4DB2-BD59-A6C34878D82A}">
+                    <a16:rowId xmlns:a16="http://schemas.microsoft.com/office/drawing/2014/main" val="547838226"/>
+                  </a:ext>
+                </a:extLst>
+              </a:tr>
+            </a:tbl>
+          </a:graphicData>
+        </a:graphic>
+      </p:graphicFrame>
+      <p:sp>
+        <p:nvSpPr>
+          <p:cNvPr id="47" name="TextBox 46">
+            <a:extLst>
+              <a:ext uri="{FF2B5EF4-FFF2-40B4-BE49-F238E27FC236}">
+                <a16:creationId xmlns:a16="http://schemas.microsoft.com/office/drawing/2014/main" id="{93AC585D-2B10-48DC-BB0C-23245E763B24}"/>
+              </a:ext>
+            </a:extLst>
+          </p:cNvPr>
+          <p:cNvSpPr txBox="1"/>
+          <p:nvPr/>
+        </p:nvSpPr>
+        <p:spPr>
+          <a:xfrm>
+            <a:off x="5666907" y="2583870"/>
+            <a:ext cx="1664879" cy="523220"/>
+          </a:xfrm>
+          <a:prstGeom prst="rect">
+            <a:avLst/>
+          </a:prstGeom>
+          <a:noFill/>
+        </p:spPr>
+        <p:txBody>
+          <a:bodyPr wrap="none" rtlCol="0">
+            <a:spAutoFit/>
+          </a:bodyPr>
+          <a:lstStyle/>
+          <a:p>
+            <a:r>
+              <a:rPr lang="en-US" altLang="ko-KR" sz="1400" dirty="0"/>
+              <a:t>4</a:t>
+            </a:r>
+            <a:r>
+              <a:rPr lang="ko-KR" altLang="en-US" sz="1400" dirty="0" err="1"/>
+              <a:t>일때</a:t>
+            </a:r>
+            <a:endParaRPr lang="en-US" altLang="ko-KR" sz="1400" dirty="0"/>
+          </a:p>
+          <a:p>
+            <a:r>
+              <a:rPr lang="en-US" altLang="ko-KR" sz="1400" dirty="0"/>
+              <a:t>res</a:t>
+            </a:r>
+            <a:r>
+              <a:rPr lang="ko-KR" altLang="en-US" sz="1400" dirty="0"/>
+              <a:t> </a:t>
+            </a:r>
+            <a:r>
+              <a:rPr lang="en-US" altLang="ko-KR" sz="1400" dirty="0"/>
+              <a:t>0    1   (index)</a:t>
+            </a:r>
+            <a:endParaRPr lang="ko-KR" altLang="en-US" sz="1400" dirty="0"/>
+          </a:p>
+        </p:txBody>
+      </p:sp>
+      <p:sp>
+        <p:nvSpPr>
+          <p:cNvPr id="18" name="타원 17">
+            <a:extLst>
+              <a:ext uri="{FF2B5EF4-FFF2-40B4-BE49-F238E27FC236}">
+                <a16:creationId xmlns:a16="http://schemas.microsoft.com/office/drawing/2014/main" id="{2B39F1F6-89FE-4A2B-A7DF-061E6744BA25}"/>
+              </a:ext>
+            </a:extLst>
+          </p:cNvPr>
+          <p:cNvSpPr/>
+          <p:nvPr/>
+        </p:nvSpPr>
+        <p:spPr>
+          <a:xfrm>
+            <a:off x="2863407" y="2524744"/>
+            <a:ext cx="343767" cy="369332"/>
+          </a:xfrm>
+          <a:prstGeom prst="ellipse">
+            <a:avLst/>
+          </a:prstGeom>
+          <a:noFill/>
+          <a:ln w="22225">
+            <a:solidFill>
+              <a:srgbClr val="FFC000"/>
+            </a:solidFill>
+          </a:ln>
+        </p:spPr>
+        <p:style>
+          <a:lnRef idx="2">
+            <a:schemeClr val="accent1">
+              <a:shade val="50000"/>
+            </a:schemeClr>
+          </a:lnRef>
+          <a:fillRef idx="1">
+            <a:schemeClr val="accent1"/>
+          </a:fillRef>
+          <a:effectRef idx="0">
+            <a:schemeClr val="accent1"/>
+          </a:effectRef>
+          <a:fontRef idx="minor">
+            <a:schemeClr val="lt1"/>
+          </a:fontRef>
+        </p:style>
+        <p:txBody>
+          <a:bodyPr rtlCol="0" anchor="ctr"/>
+          <a:lstStyle/>
+          <a:p>
+            <a:pPr algn="ctr"/>
+            <a:endParaRPr lang="ko-KR" altLang="en-US"/>
+          </a:p>
+        </p:txBody>
+      </p:sp>
+      <p:cxnSp>
+        <p:nvCxnSpPr>
+          <p:cNvPr id="55" name="직선 화살표 연결선 54">
+            <a:extLst>
+              <a:ext uri="{FF2B5EF4-FFF2-40B4-BE49-F238E27FC236}">
+                <a16:creationId xmlns:a16="http://schemas.microsoft.com/office/drawing/2014/main" id="{BF0255D5-63D9-4379-BA1E-B28301BE3A03}"/>
+              </a:ext>
+            </a:extLst>
+          </p:cNvPr>
+          <p:cNvCxnSpPr>
+            <a:cxnSpLocks/>
+            <a:stCxn id="18" idx="2"/>
+          </p:cNvCxnSpPr>
+          <p:nvPr/>
+        </p:nvCxnSpPr>
+        <p:spPr>
+          <a:xfrm flipH="1">
+            <a:off x="1815731" y="2709410"/>
+            <a:ext cx="1047676" cy="20103"/>
+          </a:xfrm>
+          <a:prstGeom prst="straightConnector1">
+            <a:avLst/>
+          </a:prstGeom>
+          <a:ln w="22225">
+            <a:solidFill>
+              <a:srgbClr val="FFC000"/>
+            </a:solidFill>
+            <a:tailEnd type="triangle" w="lg" len="med"/>
+          </a:ln>
+        </p:spPr>
+        <p:style>
+          <a:lnRef idx="1">
+            <a:schemeClr val="accent1"/>
+          </a:lnRef>
+          <a:fillRef idx="0">
+            <a:schemeClr val="accent1"/>
+          </a:fillRef>
+          <a:effectRef idx="0">
+            <a:schemeClr val="accent1"/>
+          </a:effectRef>
+          <a:fontRef idx="minor">
+            <a:schemeClr val="tx1"/>
+          </a:fontRef>
+        </p:style>
+      </p:cxnSp>
+      <p:sp>
+        <p:nvSpPr>
+          <p:cNvPr id="56" name="타원 55">
+            <a:extLst>
+              <a:ext uri="{FF2B5EF4-FFF2-40B4-BE49-F238E27FC236}">
+                <a16:creationId xmlns:a16="http://schemas.microsoft.com/office/drawing/2014/main" id="{69BAAEBE-4783-4C29-BC10-9B4BCD9B0503}"/>
+              </a:ext>
+            </a:extLst>
+          </p:cNvPr>
+          <p:cNvSpPr/>
+          <p:nvPr/>
+        </p:nvSpPr>
+        <p:spPr>
+          <a:xfrm>
+            <a:off x="3760152" y="1238976"/>
+            <a:ext cx="343767" cy="369332"/>
+          </a:xfrm>
+          <a:prstGeom prst="ellipse">
+            <a:avLst/>
+          </a:prstGeom>
+          <a:noFill/>
+          <a:ln w="22225">
+            <a:solidFill>
+              <a:srgbClr val="FFC000"/>
+            </a:solidFill>
+          </a:ln>
+        </p:spPr>
+        <p:style>
+          <a:lnRef idx="2">
+            <a:schemeClr val="accent1">
+              <a:shade val="50000"/>
+            </a:schemeClr>
+          </a:lnRef>
+          <a:fillRef idx="1">
+            <a:schemeClr val="accent1"/>
+          </a:fillRef>
+          <a:effectRef idx="0">
+            <a:schemeClr val="accent1"/>
+          </a:effectRef>
+          <a:fontRef idx="minor">
+            <a:schemeClr val="lt1"/>
+          </a:fontRef>
+        </p:style>
+        <p:txBody>
+          <a:bodyPr rtlCol="0" anchor="ctr"/>
+          <a:lstStyle/>
+          <a:p>
+            <a:pPr algn="ctr"/>
+            <a:endParaRPr lang="ko-KR" altLang="en-US"/>
+          </a:p>
+        </p:txBody>
+      </p:sp>
+      <p:cxnSp>
+        <p:nvCxnSpPr>
+          <p:cNvPr id="57" name="직선 화살표 연결선 56">
+            <a:extLst>
+              <a:ext uri="{FF2B5EF4-FFF2-40B4-BE49-F238E27FC236}">
+                <a16:creationId xmlns:a16="http://schemas.microsoft.com/office/drawing/2014/main" id="{C4EBC6C7-175C-4C03-932E-5804293B2C43}"/>
+              </a:ext>
+            </a:extLst>
+          </p:cNvPr>
+          <p:cNvCxnSpPr>
+            <a:cxnSpLocks/>
+            <a:stCxn id="56" idx="2"/>
+          </p:cNvCxnSpPr>
+          <p:nvPr/>
+        </p:nvCxnSpPr>
+        <p:spPr>
+          <a:xfrm flipH="1">
+            <a:off x="2029063" y="1423642"/>
+            <a:ext cx="1731089" cy="204768"/>
+          </a:xfrm>
+          <a:prstGeom prst="straightConnector1">
+            <a:avLst/>
+          </a:prstGeom>
+          <a:ln w="22225">
+            <a:solidFill>
+              <a:srgbClr val="FFC000"/>
+            </a:solidFill>
+            <a:tailEnd type="triangle" w="lg" len="med"/>
+          </a:ln>
+        </p:spPr>
+        <p:style>
+          <a:lnRef idx="1">
+            <a:schemeClr val="accent1"/>
+          </a:lnRef>
+          <a:fillRef idx="0">
+            <a:schemeClr val="accent1"/>
+          </a:fillRef>
+          <a:effectRef idx="0">
+            <a:schemeClr val="accent1"/>
+          </a:effectRef>
+          <a:fontRef idx="minor">
+            <a:schemeClr val="tx1"/>
+          </a:fontRef>
+        </p:style>
+      </p:cxnSp>
+      <p:sp>
+        <p:nvSpPr>
+          <p:cNvPr id="58" name="타원 57">
+            <a:extLst>
+              <a:ext uri="{FF2B5EF4-FFF2-40B4-BE49-F238E27FC236}">
+                <a16:creationId xmlns:a16="http://schemas.microsoft.com/office/drawing/2014/main" id="{ECC1D11F-B74B-406E-8594-483EBC8C0CA3}"/>
+              </a:ext>
+            </a:extLst>
+          </p:cNvPr>
+          <p:cNvSpPr/>
+          <p:nvPr/>
+        </p:nvSpPr>
+        <p:spPr>
+          <a:xfrm>
+            <a:off x="5278996" y="2534795"/>
+            <a:ext cx="343767" cy="369332"/>
+          </a:xfrm>
+          <a:prstGeom prst="ellipse">
+            <a:avLst/>
+          </a:prstGeom>
+          <a:noFill/>
+          <a:ln w="22225">
+            <a:solidFill>
+              <a:srgbClr val="FFC000"/>
+            </a:solidFill>
+          </a:ln>
+        </p:spPr>
+        <p:style>
+          <a:lnRef idx="2">
+            <a:schemeClr val="accent1">
+              <a:shade val="50000"/>
+            </a:schemeClr>
+          </a:lnRef>
+          <a:fillRef idx="1">
+            <a:schemeClr val="accent1"/>
+          </a:fillRef>
+          <a:effectRef idx="0">
+            <a:schemeClr val="accent1"/>
+          </a:effectRef>
+          <a:fontRef idx="minor">
+            <a:schemeClr val="lt1"/>
+          </a:fontRef>
+        </p:style>
+        <p:txBody>
+          <a:bodyPr rtlCol="0" anchor="ctr"/>
+          <a:lstStyle/>
+          <a:p>
+            <a:pPr algn="ctr"/>
+            <a:endParaRPr lang="ko-KR" altLang="en-US"/>
+          </a:p>
+        </p:txBody>
+      </p:sp>
     </p:spTree>
     <p:extLst>
       <p:ext uri="{BB962C8B-B14F-4D97-AF65-F5344CB8AC3E}">
-        <p14:creationId xmlns:p14="http://schemas.microsoft.com/office/powerpoint/2010/main" val="2944582328"/>
+        <p14:creationId xmlns:p14="http://schemas.microsoft.com/office/powerpoint/2010/main" val="3445969165"/>
       </p:ext>
     </p:extLst>
   </p:cSld>
@@ -8478,7 +12524,7 @@
     </p:spTree>
     <p:extLst>
       <p:ext uri="{BB962C8B-B14F-4D97-AF65-F5344CB8AC3E}">
-        <p14:creationId xmlns:p14="http://schemas.microsoft.com/office/powerpoint/2010/main" val="3249580640"/>
+        <p14:creationId xmlns:p14="http://schemas.microsoft.com/office/powerpoint/2010/main" val="3450726087"/>
       </p:ext>
     </p:extLst>
   </p:cSld>
@@ -8508,7 +12554,7 @@
     </p:spTree>
     <p:extLst>
       <p:ext uri="{BB962C8B-B14F-4D97-AF65-F5344CB8AC3E}">
-        <p14:creationId xmlns:p14="http://schemas.microsoft.com/office/powerpoint/2010/main" val="3468511111"/>
+        <p14:creationId xmlns:p14="http://schemas.microsoft.com/office/powerpoint/2010/main" val="2944582328"/>
       </p:ext>
     </p:extLst>
   </p:cSld>

</xml_diff>

<commit_message>
2023 07 11 home 1
</commit_message>
<xml_diff>
--- a/inf-learn/section6/연습/인프런_코딩_section6.pptx
+++ b/inf-learn/section6/연습/인프런_코딩_section6.pptx
@@ -12,10 +12,11 @@
     <p:sldId id="264" r:id="rId6"/>
     <p:sldId id="265" r:id="rId7"/>
     <p:sldId id="266" r:id="rId8"/>
-    <p:sldId id="259" r:id="rId9"/>
-    <p:sldId id="260" r:id="rId10"/>
-    <p:sldId id="261" r:id="rId11"/>
-    <p:sldId id="262" r:id="rId12"/>
+    <p:sldId id="267" r:id="rId9"/>
+    <p:sldId id="259" r:id="rId10"/>
+    <p:sldId id="260" r:id="rId11"/>
+    <p:sldId id="261" r:id="rId12"/>
+    <p:sldId id="262" r:id="rId13"/>
   </p:sldIdLst>
   <p:sldSz cx="12192000" cy="6858000"/>
   <p:notesSz cx="6858000" cy="9144000"/>
@@ -269,7 +270,7 @@
           <a:p>
             <a:fld id="{CE8136C4-3EB1-4277-BE83-74E88DB1AA9E}" type="datetimeFigureOut">
               <a:rPr lang="ko-KR" altLang="en-US" smtClean="0"/>
-              <a:t>2023-07-09</a:t>
+              <a:t>2023-07-11</a:t>
             </a:fld>
             <a:endParaRPr lang="ko-KR" altLang="en-US"/>
           </a:p>
@@ -467,7 +468,7 @@
           <a:p>
             <a:fld id="{CE8136C4-3EB1-4277-BE83-74E88DB1AA9E}" type="datetimeFigureOut">
               <a:rPr lang="ko-KR" altLang="en-US" smtClean="0"/>
-              <a:t>2023-07-09</a:t>
+              <a:t>2023-07-11</a:t>
             </a:fld>
             <a:endParaRPr lang="ko-KR" altLang="en-US"/>
           </a:p>
@@ -675,7 +676,7 @@
           <a:p>
             <a:fld id="{CE8136C4-3EB1-4277-BE83-74E88DB1AA9E}" type="datetimeFigureOut">
               <a:rPr lang="ko-KR" altLang="en-US" smtClean="0"/>
-              <a:t>2023-07-09</a:t>
+              <a:t>2023-07-11</a:t>
             </a:fld>
             <a:endParaRPr lang="ko-KR" altLang="en-US"/>
           </a:p>
@@ -873,7 +874,7 @@
           <a:p>
             <a:fld id="{CE8136C4-3EB1-4277-BE83-74E88DB1AA9E}" type="datetimeFigureOut">
               <a:rPr lang="ko-KR" altLang="en-US" smtClean="0"/>
-              <a:t>2023-07-09</a:t>
+              <a:t>2023-07-11</a:t>
             </a:fld>
             <a:endParaRPr lang="ko-KR" altLang="en-US"/>
           </a:p>
@@ -1148,7 +1149,7 @@
           <a:p>
             <a:fld id="{CE8136C4-3EB1-4277-BE83-74E88DB1AA9E}" type="datetimeFigureOut">
               <a:rPr lang="ko-KR" altLang="en-US" smtClean="0"/>
-              <a:t>2023-07-09</a:t>
+              <a:t>2023-07-11</a:t>
             </a:fld>
             <a:endParaRPr lang="ko-KR" altLang="en-US"/>
           </a:p>
@@ -1413,7 +1414,7 @@
           <a:p>
             <a:fld id="{CE8136C4-3EB1-4277-BE83-74E88DB1AA9E}" type="datetimeFigureOut">
               <a:rPr lang="ko-KR" altLang="en-US" smtClean="0"/>
-              <a:t>2023-07-09</a:t>
+              <a:t>2023-07-11</a:t>
             </a:fld>
             <a:endParaRPr lang="ko-KR" altLang="en-US"/>
           </a:p>
@@ -1825,7 +1826,7 @@
           <a:p>
             <a:fld id="{CE8136C4-3EB1-4277-BE83-74E88DB1AA9E}" type="datetimeFigureOut">
               <a:rPr lang="ko-KR" altLang="en-US" smtClean="0"/>
-              <a:t>2023-07-09</a:t>
+              <a:t>2023-07-11</a:t>
             </a:fld>
             <a:endParaRPr lang="ko-KR" altLang="en-US"/>
           </a:p>
@@ -1966,7 +1967,7 @@
           <a:p>
             <a:fld id="{CE8136C4-3EB1-4277-BE83-74E88DB1AA9E}" type="datetimeFigureOut">
               <a:rPr lang="ko-KR" altLang="en-US" smtClean="0"/>
-              <a:t>2023-07-09</a:t>
+              <a:t>2023-07-11</a:t>
             </a:fld>
             <a:endParaRPr lang="ko-KR" altLang="en-US"/>
           </a:p>
@@ -2079,7 +2080,7 @@
           <a:p>
             <a:fld id="{CE8136C4-3EB1-4277-BE83-74E88DB1AA9E}" type="datetimeFigureOut">
               <a:rPr lang="ko-KR" altLang="en-US" smtClean="0"/>
-              <a:t>2023-07-09</a:t>
+              <a:t>2023-07-11</a:t>
             </a:fld>
             <a:endParaRPr lang="ko-KR" altLang="en-US"/>
           </a:p>
@@ -2390,7 +2391,7 @@
           <a:p>
             <a:fld id="{CE8136C4-3EB1-4277-BE83-74E88DB1AA9E}" type="datetimeFigureOut">
               <a:rPr lang="ko-KR" altLang="en-US" smtClean="0"/>
-              <a:t>2023-07-09</a:t>
+              <a:t>2023-07-11</a:t>
             </a:fld>
             <a:endParaRPr lang="ko-KR" altLang="en-US"/>
           </a:p>
@@ -2678,7 +2679,7 @@
           <a:p>
             <a:fld id="{CE8136C4-3EB1-4277-BE83-74E88DB1AA9E}" type="datetimeFigureOut">
               <a:rPr lang="ko-KR" altLang="en-US" smtClean="0"/>
-              <a:t>2023-07-09</a:t>
+              <a:t>2023-07-11</a:t>
             </a:fld>
             <a:endParaRPr lang="ko-KR" altLang="en-US"/>
           </a:p>
@@ -2919,7 +2920,7 @@
           <a:p>
             <a:fld id="{CE8136C4-3EB1-4277-BE83-74E88DB1AA9E}" type="datetimeFigureOut">
               <a:rPr lang="ko-KR" altLang="en-US" smtClean="0"/>
-              <a:t>2023-07-09</a:t>
+              <a:t>2023-07-11</a:t>
             </a:fld>
             <a:endParaRPr lang="ko-KR" altLang="en-US"/>
           </a:p>
@@ -4654,6 +4655,36 @@
     </p:spTree>
     <p:extLst>
       <p:ext uri="{BB962C8B-B14F-4D97-AF65-F5344CB8AC3E}">
+        <p14:creationId xmlns:p14="http://schemas.microsoft.com/office/powerpoint/2010/main" val="2944582328"/>
+      </p:ext>
+    </p:extLst>
+  </p:cSld>
+  <p:clrMapOvr>
+    <a:masterClrMapping/>
+  </p:clrMapOvr>
+</p:sld>
+</file>
+
+<file path=ppt/slides/slide11.xml><?xml version="1.0" encoding="utf-8"?>
+<p:sld xmlns:a="http://schemas.openxmlformats.org/drawingml/2006/main" xmlns:r="http://schemas.openxmlformats.org/officeDocument/2006/relationships" xmlns:p="http://schemas.openxmlformats.org/presentationml/2006/main">
+  <p:cSld>
+    <p:spTree>
+      <p:nvGrpSpPr>
+        <p:cNvPr id="1" name=""/>
+        <p:cNvGrpSpPr/>
+        <p:nvPr/>
+      </p:nvGrpSpPr>
+      <p:grpSpPr>
+        <a:xfrm>
+          <a:off x="0" y="0"/>
+          <a:ext cx="0" cy="0"/>
+          <a:chOff x="0" y="0"/>
+          <a:chExt cx="0" cy="0"/>
+        </a:xfrm>
+      </p:grpSpPr>
+    </p:spTree>
+    <p:extLst>
+      <p:ext uri="{BB962C8B-B14F-4D97-AF65-F5344CB8AC3E}">
         <p14:creationId xmlns:p14="http://schemas.microsoft.com/office/powerpoint/2010/main" val="3249580640"/>
       </p:ext>
     </p:extLst>
@@ -4664,7 +4695,7 @@
 </p:sld>
 </file>
 
-<file path=ppt/slides/slide11.xml><?xml version="1.0" encoding="utf-8"?>
+<file path=ppt/slides/slide12.xml><?xml version="1.0" encoding="utf-8"?>
 <p:sld xmlns:a="http://schemas.openxmlformats.org/drawingml/2006/main" xmlns:r="http://schemas.openxmlformats.org/officeDocument/2006/relationships" xmlns:p="http://schemas.openxmlformats.org/presentationml/2006/main">
   <p:cSld>
     <p:spTree>
@@ -12521,10 +12552,2369 @@
           <a:chExt cx="0" cy="0"/>
         </a:xfrm>
       </p:grpSpPr>
+      <p:sp>
+        <p:nvSpPr>
+          <p:cNvPr id="2" name="직사각형 1">
+            <a:extLst>
+              <a:ext uri="{FF2B5EF4-FFF2-40B4-BE49-F238E27FC236}">
+                <a16:creationId xmlns:a16="http://schemas.microsoft.com/office/drawing/2014/main" id="{B83F85A3-9E91-4882-B739-D1C48BC1D8C5}"/>
+              </a:ext>
+            </a:extLst>
+          </p:cNvPr>
+          <p:cNvSpPr/>
+          <p:nvPr/>
+        </p:nvSpPr>
+        <p:spPr>
+          <a:xfrm>
+            <a:off x="889192" y="555260"/>
+            <a:ext cx="6632294" cy="5018291"/>
+          </a:xfrm>
+          <a:prstGeom prst="rect">
+            <a:avLst/>
+          </a:prstGeom>
+          <a:solidFill>
+            <a:schemeClr val="bg1">
+              <a:lumMod val="95000"/>
+            </a:schemeClr>
+          </a:solidFill>
+          <a:ln>
+            <a:noFill/>
+          </a:ln>
+        </p:spPr>
+        <p:style>
+          <a:lnRef idx="2">
+            <a:schemeClr val="accent1">
+              <a:shade val="50000"/>
+            </a:schemeClr>
+          </a:lnRef>
+          <a:fillRef idx="1">
+            <a:schemeClr val="accent1"/>
+          </a:fillRef>
+          <a:effectRef idx="0">
+            <a:schemeClr val="accent1"/>
+          </a:effectRef>
+          <a:fontRef idx="minor">
+            <a:schemeClr val="lt1"/>
+          </a:fontRef>
+        </p:style>
+        <p:txBody>
+          <a:bodyPr rtlCol="0" anchor="ctr"/>
+          <a:lstStyle/>
+          <a:p>
+            <a:pPr algn="ctr"/>
+            <a:endParaRPr lang="ko-KR" altLang="en-US" dirty="0"/>
+          </a:p>
+        </p:txBody>
+      </p:sp>
+      <p:sp>
+        <p:nvSpPr>
+          <p:cNvPr id="3" name="직사각형 2">
+            <a:extLst>
+              <a:ext uri="{FF2B5EF4-FFF2-40B4-BE49-F238E27FC236}">
+                <a16:creationId xmlns:a16="http://schemas.microsoft.com/office/drawing/2014/main" id="{B6704C18-118C-4019-810A-2778308666CA}"/>
+              </a:ext>
+            </a:extLst>
+          </p:cNvPr>
+          <p:cNvSpPr/>
+          <p:nvPr/>
+        </p:nvSpPr>
+        <p:spPr>
+          <a:xfrm>
+            <a:off x="5197388" y="695325"/>
+            <a:ext cx="665773" cy="428625"/>
+          </a:xfrm>
+          <a:prstGeom prst="rect">
+            <a:avLst/>
+          </a:prstGeom>
+        </p:spPr>
+        <p:style>
+          <a:lnRef idx="2">
+            <a:schemeClr val="accent1">
+              <a:shade val="50000"/>
+            </a:schemeClr>
+          </a:lnRef>
+          <a:fillRef idx="1">
+            <a:schemeClr val="accent1"/>
+          </a:fillRef>
+          <a:effectRef idx="0">
+            <a:schemeClr val="accent1"/>
+          </a:effectRef>
+          <a:fontRef idx="minor">
+            <a:schemeClr val="lt1"/>
+          </a:fontRef>
+        </p:style>
+        <p:txBody>
+          <a:bodyPr rtlCol="0" anchor="ctr"/>
+          <a:lstStyle/>
+          <a:p>
+            <a:pPr algn="ctr"/>
+            <a:r>
+              <a:rPr lang="en-US" altLang="ko-KR" dirty="0"/>
+              <a:t>D(1)</a:t>
+            </a:r>
+            <a:endParaRPr lang="ko-KR" altLang="en-US" dirty="0"/>
+          </a:p>
+        </p:txBody>
+      </p:sp>
+      <p:cxnSp>
+        <p:nvCxnSpPr>
+          <p:cNvPr id="6" name="직선 화살표 연결선 5">
+            <a:extLst>
+              <a:ext uri="{FF2B5EF4-FFF2-40B4-BE49-F238E27FC236}">
+                <a16:creationId xmlns:a16="http://schemas.microsoft.com/office/drawing/2014/main" id="{30C1BADB-DB0D-47BE-B9FB-6199B74B307F}"/>
+              </a:ext>
+            </a:extLst>
+          </p:cNvPr>
+          <p:cNvCxnSpPr>
+            <a:cxnSpLocks/>
+            <a:stCxn id="3" idx="2"/>
+          </p:cNvCxnSpPr>
+          <p:nvPr/>
+        </p:nvCxnSpPr>
+        <p:spPr>
+          <a:xfrm flipH="1">
+            <a:off x="4514850" y="1123950"/>
+            <a:ext cx="1015425" cy="609906"/>
+          </a:xfrm>
+          <a:prstGeom prst="straightConnector1">
+            <a:avLst/>
+          </a:prstGeom>
+          <a:ln w="15875">
+            <a:tailEnd type="triangle" w="lg" len="med"/>
+          </a:ln>
+        </p:spPr>
+        <p:style>
+          <a:lnRef idx="1">
+            <a:schemeClr val="accent1"/>
+          </a:lnRef>
+          <a:fillRef idx="0">
+            <a:schemeClr val="accent1"/>
+          </a:fillRef>
+          <a:effectRef idx="0">
+            <a:schemeClr val="accent1"/>
+          </a:effectRef>
+          <a:fontRef idx="minor">
+            <a:schemeClr val="tx1"/>
+          </a:fontRef>
+        </p:style>
+      </p:cxnSp>
+      <p:cxnSp>
+        <p:nvCxnSpPr>
+          <p:cNvPr id="7" name="직선 화살표 연결선 6">
+            <a:extLst>
+              <a:ext uri="{FF2B5EF4-FFF2-40B4-BE49-F238E27FC236}">
+                <a16:creationId xmlns:a16="http://schemas.microsoft.com/office/drawing/2014/main" id="{2EC7DCED-9934-4A84-9311-58C02E841717}"/>
+              </a:ext>
+            </a:extLst>
+          </p:cNvPr>
+          <p:cNvCxnSpPr>
+            <a:cxnSpLocks/>
+            <a:stCxn id="3" idx="2"/>
+            <a:endCxn id="35" idx="0"/>
+          </p:cNvCxnSpPr>
+          <p:nvPr/>
+        </p:nvCxnSpPr>
+        <p:spPr>
+          <a:xfrm>
+            <a:off x="5530275" y="1123950"/>
+            <a:ext cx="584686" cy="588469"/>
+          </a:xfrm>
+          <a:prstGeom prst="straightConnector1">
+            <a:avLst/>
+          </a:prstGeom>
+          <a:ln w="15875">
+            <a:solidFill>
+              <a:srgbClr val="FF0000"/>
+            </a:solidFill>
+            <a:tailEnd type="triangle" w="lg" len="med"/>
+          </a:ln>
+        </p:spPr>
+        <p:style>
+          <a:lnRef idx="1">
+            <a:schemeClr val="accent1"/>
+          </a:lnRef>
+          <a:fillRef idx="0">
+            <a:schemeClr val="accent1"/>
+          </a:fillRef>
+          <a:effectRef idx="0">
+            <a:schemeClr val="accent1"/>
+          </a:effectRef>
+          <a:fontRef idx="minor">
+            <a:schemeClr val="tx1"/>
+          </a:fontRef>
+        </p:style>
+      </p:cxnSp>
+      <p:sp>
+        <p:nvSpPr>
+          <p:cNvPr id="9" name="직사각형 8">
+            <a:extLst>
+              <a:ext uri="{FF2B5EF4-FFF2-40B4-BE49-F238E27FC236}">
+                <a16:creationId xmlns:a16="http://schemas.microsoft.com/office/drawing/2014/main" id="{DD180A9A-7472-4FB0-A853-A331827F00FF}"/>
+              </a:ext>
+            </a:extLst>
+          </p:cNvPr>
+          <p:cNvSpPr/>
+          <p:nvPr/>
+        </p:nvSpPr>
+        <p:spPr>
+          <a:xfrm>
+            <a:off x="4761807" y="3149257"/>
+            <a:ext cx="665773" cy="428625"/>
+          </a:xfrm>
+          <a:prstGeom prst="rect">
+            <a:avLst/>
+          </a:prstGeom>
+        </p:spPr>
+        <p:style>
+          <a:lnRef idx="2">
+            <a:schemeClr val="accent1">
+              <a:shade val="50000"/>
+            </a:schemeClr>
+          </a:lnRef>
+          <a:fillRef idx="1">
+            <a:schemeClr val="accent1"/>
+          </a:fillRef>
+          <a:effectRef idx="0">
+            <a:schemeClr val="accent1"/>
+          </a:effectRef>
+          <a:fontRef idx="minor">
+            <a:schemeClr val="lt1"/>
+          </a:fontRef>
+        </p:style>
+        <p:txBody>
+          <a:bodyPr rtlCol="0" anchor="ctr"/>
+          <a:lstStyle/>
+          <a:p>
+            <a:pPr algn="ctr"/>
+            <a:r>
+              <a:rPr lang="en-US" altLang="ko-KR" dirty="0"/>
+              <a:t>D(3)</a:t>
+            </a:r>
+            <a:endParaRPr lang="ko-KR" altLang="en-US" dirty="0"/>
+          </a:p>
+        </p:txBody>
+      </p:sp>
+      <p:cxnSp>
+        <p:nvCxnSpPr>
+          <p:cNvPr id="11" name="직선 화살표 연결선 10">
+            <a:extLst>
+              <a:ext uri="{FF2B5EF4-FFF2-40B4-BE49-F238E27FC236}">
+                <a16:creationId xmlns:a16="http://schemas.microsoft.com/office/drawing/2014/main" id="{ADDD9212-727B-4DA5-9B8D-774AEF2C5EDB}"/>
+              </a:ext>
+            </a:extLst>
+          </p:cNvPr>
+          <p:cNvCxnSpPr>
+            <a:cxnSpLocks/>
+            <a:stCxn id="34" idx="2"/>
+          </p:cNvCxnSpPr>
+          <p:nvPr/>
+        </p:nvCxnSpPr>
+        <p:spPr>
+          <a:xfrm flipH="1">
+            <a:off x="4032639" y="2152649"/>
+            <a:ext cx="1192836" cy="949525"/>
+          </a:xfrm>
+          <a:prstGeom prst="straightConnector1">
+            <a:avLst/>
+          </a:prstGeom>
+          <a:ln w="15875">
+            <a:tailEnd type="triangle" w="lg" len="med"/>
+          </a:ln>
+        </p:spPr>
+        <p:style>
+          <a:lnRef idx="1">
+            <a:schemeClr val="accent1"/>
+          </a:lnRef>
+          <a:fillRef idx="0">
+            <a:schemeClr val="accent1"/>
+          </a:fillRef>
+          <a:effectRef idx="0">
+            <a:schemeClr val="accent1"/>
+          </a:effectRef>
+          <a:fontRef idx="minor">
+            <a:schemeClr val="tx1"/>
+          </a:fontRef>
+        </p:style>
+      </p:cxnSp>
+      <p:cxnSp>
+        <p:nvCxnSpPr>
+          <p:cNvPr id="12" name="직선 화살표 연결선 11">
+            <a:extLst>
+              <a:ext uri="{FF2B5EF4-FFF2-40B4-BE49-F238E27FC236}">
+                <a16:creationId xmlns:a16="http://schemas.microsoft.com/office/drawing/2014/main" id="{34085AAB-DBDF-43AD-B2D5-5A9708CF2C6A}"/>
+              </a:ext>
+            </a:extLst>
+          </p:cNvPr>
+          <p:cNvCxnSpPr>
+            <a:cxnSpLocks/>
+            <a:stCxn id="34" idx="2"/>
+          </p:cNvCxnSpPr>
+          <p:nvPr/>
+        </p:nvCxnSpPr>
+        <p:spPr>
+          <a:xfrm>
+            <a:off x="5225475" y="2152649"/>
+            <a:ext cx="355232" cy="992672"/>
+          </a:xfrm>
+          <a:prstGeom prst="straightConnector1">
+            <a:avLst/>
+          </a:prstGeom>
+          <a:ln w="15875">
+            <a:solidFill>
+              <a:srgbClr val="FF0000"/>
+            </a:solidFill>
+            <a:tailEnd type="triangle" w="lg" len="med"/>
+          </a:ln>
+        </p:spPr>
+        <p:style>
+          <a:lnRef idx="1">
+            <a:schemeClr val="accent1"/>
+          </a:lnRef>
+          <a:fillRef idx="0">
+            <a:schemeClr val="accent1"/>
+          </a:fillRef>
+          <a:effectRef idx="0">
+            <a:schemeClr val="accent1"/>
+          </a:effectRef>
+          <a:fontRef idx="minor">
+            <a:schemeClr val="tx1"/>
+          </a:fontRef>
+        </p:style>
+      </p:cxnSp>
+      <p:sp>
+        <p:nvSpPr>
+          <p:cNvPr id="13" name="TextBox 12">
+            <a:extLst>
+              <a:ext uri="{FF2B5EF4-FFF2-40B4-BE49-F238E27FC236}">
+                <a16:creationId xmlns:a16="http://schemas.microsoft.com/office/drawing/2014/main" id="{4292A6DB-E07E-48C6-A267-BC1B1B7882E3}"/>
+              </a:ext>
+            </a:extLst>
+          </p:cNvPr>
+          <p:cNvSpPr txBox="1"/>
+          <p:nvPr/>
+        </p:nvSpPr>
+        <p:spPr>
+          <a:xfrm>
+            <a:off x="4480761" y="1182536"/>
+            <a:ext cx="2452916" cy="369332"/>
+          </a:xfrm>
+          <a:prstGeom prst="rect">
+            <a:avLst/>
+          </a:prstGeom>
+          <a:noFill/>
+        </p:spPr>
+        <p:txBody>
+          <a:bodyPr wrap="none" rtlCol="0">
+            <a:spAutoFit/>
+          </a:bodyPr>
+          <a:lstStyle/>
+          <a:p>
+            <a:r>
+              <a:rPr lang="en-US" altLang="ko-KR" dirty="0">
+                <a:solidFill>
+                  <a:srgbClr val="0000FF"/>
+                </a:solidFill>
+              </a:rPr>
+              <a:t>1      2    3    4    5 </a:t>
+            </a:r>
+            <a:endParaRPr lang="ko-KR" altLang="en-US" dirty="0">
+              <a:solidFill>
+                <a:srgbClr val="FF0000"/>
+              </a:solidFill>
+            </a:endParaRPr>
+          </a:p>
+        </p:txBody>
+      </p:sp>
+      <p:sp>
+        <p:nvSpPr>
+          <p:cNvPr id="26" name="TextBox 25">
+            <a:extLst>
+              <a:ext uri="{FF2B5EF4-FFF2-40B4-BE49-F238E27FC236}">
+                <a16:creationId xmlns:a16="http://schemas.microsoft.com/office/drawing/2014/main" id="{17A744BC-6B4F-4099-80B4-2F0FCC53C1C7}"/>
+              </a:ext>
+            </a:extLst>
+          </p:cNvPr>
+          <p:cNvSpPr txBox="1"/>
+          <p:nvPr/>
+        </p:nvSpPr>
+        <p:spPr>
+          <a:xfrm>
+            <a:off x="5131814" y="4947213"/>
+            <a:ext cx="800219" cy="523220"/>
+          </a:xfrm>
+          <a:prstGeom prst="rect">
+            <a:avLst/>
+          </a:prstGeom>
+          <a:noFill/>
+        </p:spPr>
+        <p:txBody>
+          <a:bodyPr wrap="none" rtlCol="0">
+            <a:spAutoFit/>
+          </a:bodyPr>
+          <a:lstStyle/>
+          <a:p>
+            <a:r>
+              <a:rPr lang="en-US" altLang="ko-KR" sz="2800" dirty="0"/>
+              <a:t>. . . </a:t>
+            </a:r>
+            <a:endParaRPr lang="ko-KR" altLang="en-US" sz="2800" dirty="0"/>
+          </a:p>
+        </p:txBody>
+      </p:sp>
+      <p:cxnSp>
+        <p:nvCxnSpPr>
+          <p:cNvPr id="29" name="직선 화살표 연결선 28">
+            <a:extLst>
+              <a:ext uri="{FF2B5EF4-FFF2-40B4-BE49-F238E27FC236}">
+                <a16:creationId xmlns:a16="http://schemas.microsoft.com/office/drawing/2014/main" id="{9C7C0AFE-2305-4D89-9313-83FF9F9C84DB}"/>
+              </a:ext>
+            </a:extLst>
+          </p:cNvPr>
+          <p:cNvCxnSpPr>
+            <a:cxnSpLocks/>
+            <a:stCxn id="3" idx="2"/>
+            <a:endCxn id="34" idx="0"/>
+          </p:cNvCxnSpPr>
+          <p:nvPr/>
+        </p:nvCxnSpPr>
+        <p:spPr>
+          <a:xfrm flipH="1">
+            <a:off x="5225475" y="1123950"/>
+            <a:ext cx="304800" cy="600074"/>
+          </a:xfrm>
+          <a:prstGeom prst="straightConnector1">
+            <a:avLst/>
+          </a:prstGeom>
+          <a:ln w="15875">
+            <a:solidFill>
+              <a:srgbClr val="FF0000"/>
+            </a:solidFill>
+            <a:tailEnd type="triangle" w="lg" len="med"/>
+          </a:ln>
+        </p:spPr>
+        <p:style>
+          <a:lnRef idx="1">
+            <a:schemeClr val="accent1"/>
+          </a:lnRef>
+          <a:fillRef idx="0">
+            <a:schemeClr val="accent1"/>
+          </a:fillRef>
+          <a:effectRef idx="0">
+            <a:schemeClr val="accent1"/>
+          </a:effectRef>
+          <a:fontRef idx="minor">
+            <a:schemeClr val="tx1"/>
+          </a:fontRef>
+        </p:style>
+      </p:cxnSp>
+      <p:sp>
+        <p:nvSpPr>
+          <p:cNvPr id="34" name="직사각형 33">
+            <a:extLst>
+              <a:ext uri="{FF2B5EF4-FFF2-40B4-BE49-F238E27FC236}">
+                <a16:creationId xmlns:a16="http://schemas.microsoft.com/office/drawing/2014/main" id="{ABECE2D1-7B0A-490B-83F1-B281DD342FB9}"/>
+              </a:ext>
+            </a:extLst>
+          </p:cNvPr>
+          <p:cNvSpPr/>
+          <p:nvPr/>
+        </p:nvSpPr>
+        <p:spPr>
+          <a:xfrm>
+            <a:off x="4892588" y="1724024"/>
+            <a:ext cx="665773" cy="428625"/>
+          </a:xfrm>
+          <a:prstGeom prst="rect">
+            <a:avLst/>
+          </a:prstGeom>
+        </p:spPr>
+        <p:style>
+          <a:lnRef idx="2">
+            <a:schemeClr val="accent1">
+              <a:shade val="50000"/>
+            </a:schemeClr>
+          </a:lnRef>
+          <a:fillRef idx="1">
+            <a:schemeClr val="accent1"/>
+          </a:fillRef>
+          <a:effectRef idx="0">
+            <a:schemeClr val="accent1"/>
+          </a:effectRef>
+          <a:fontRef idx="minor">
+            <a:schemeClr val="lt1"/>
+          </a:fontRef>
+        </p:style>
+        <p:txBody>
+          <a:bodyPr rtlCol="0" anchor="ctr"/>
+          <a:lstStyle/>
+          <a:p>
+            <a:pPr algn="ctr"/>
+            <a:r>
+              <a:rPr lang="en-US" altLang="ko-KR" dirty="0"/>
+              <a:t>D(2)</a:t>
+            </a:r>
+            <a:endParaRPr lang="ko-KR" altLang="en-US" dirty="0"/>
+          </a:p>
+        </p:txBody>
+      </p:sp>
+      <p:sp>
+        <p:nvSpPr>
+          <p:cNvPr id="35" name="직사각형 34">
+            <a:extLst>
+              <a:ext uri="{FF2B5EF4-FFF2-40B4-BE49-F238E27FC236}">
+                <a16:creationId xmlns:a16="http://schemas.microsoft.com/office/drawing/2014/main" id="{C56F9B67-E6B6-444D-B011-398A88629926}"/>
+              </a:ext>
+            </a:extLst>
+          </p:cNvPr>
+          <p:cNvSpPr/>
+          <p:nvPr/>
+        </p:nvSpPr>
+        <p:spPr>
+          <a:xfrm>
+            <a:off x="5782074" y="1712419"/>
+            <a:ext cx="665773" cy="428625"/>
+          </a:xfrm>
+          <a:prstGeom prst="rect">
+            <a:avLst/>
+          </a:prstGeom>
+        </p:spPr>
+        <p:style>
+          <a:lnRef idx="2">
+            <a:schemeClr val="accent1">
+              <a:shade val="50000"/>
+            </a:schemeClr>
+          </a:lnRef>
+          <a:fillRef idx="1">
+            <a:schemeClr val="accent1"/>
+          </a:fillRef>
+          <a:effectRef idx="0">
+            <a:schemeClr val="accent1"/>
+          </a:effectRef>
+          <a:fontRef idx="minor">
+            <a:schemeClr val="lt1"/>
+          </a:fontRef>
+        </p:style>
+        <p:txBody>
+          <a:bodyPr rtlCol="0" anchor="ctr"/>
+          <a:lstStyle/>
+          <a:p>
+            <a:pPr algn="ctr"/>
+            <a:r>
+              <a:rPr lang="en-US" altLang="ko-KR" dirty="0"/>
+              <a:t>D(3)</a:t>
+            </a:r>
+            <a:endParaRPr lang="ko-KR" altLang="en-US" dirty="0"/>
+          </a:p>
+        </p:txBody>
+      </p:sp>
+      <p:cxnSp>
+        <p:nvCxnSpPr>
+          <p:cNvPr id="41" name="직선 화살표 연결선 40">
+            <a:extLst>
+              <a:ext uri="{FF2B5EF4-FFF2-40B4-BE49-F238E27FC236}">
+                <a16:creationId xmlns:a16="http://schemas.microsoft.com/office/drawing/2014/main" id="{AEBA5115-3C84-4776-88CD-354F073D6878}"/>
+              </a:ext>
+            </a:extLst>
+          </p:cNvPr>
+          <p:cNvCxnSpPr>
+            <a:cxnSpLocks/>
+            <a:stCxn id="34" idx="2"/>
+            <a:endCxn id="9" idx="0"/>
+          </p:cNvCxnSpPr>
+          <p:nvPr/>
+        </p:nvCxnSpPr>
+        <p:spPr>
+          <a:xfrm flipH="1">
+            <a:off x="5094694" y="2152649"/>
+            <a:ext cx="130781" cy="996608"/>
+          </a:xfrm>
+          <a:prstGeom prst="straightConnector1">
+            <a:avLst/>
+          </a:prstGeom>
+          <a:ln w="15875">
+            <a:solidFill>
+              <a:srgbClr val="FF0000"/>
+            </a:solidFill>
+            <a:tailEnd type="triangle" w="lg" len="med"/>
+          </a:ln>
+        </p:spPr>
+        <p:style>
+          <a:lnRef idx="1">
+            <a:schemeClr val="accent1"/>
+          </a:lnRef>
+          <a:fillRef idx="0">
+            <a:schemeClr val="accent1"/>
+          </a:fillRef>
+          <a:effectRef idx="0">
+            <a:schemeClr val="accent1"/>
+          </a:effectRef>
+          <a:fontRef idx="minor">
+            <a:schemeClr val="tx1"/>
+          </a:fontRef>
+        </p:style>
+      </p:cxnSp>
+      <p:sp>
+        <p:nvSpPr>
+          <p:cNvPr id="49" name="&quot;허용 안 됨&quot; 기호 48">
+            <a:extLst>
+              <a:ext uri="{FF2B5EF4-FFF2-40B4-BE49-F238E27FC236}">
+                <a16:creationId xmlns:a16="http://schemas.microsoft.com/office/drawing/2014/main" id="{72F35C74-A8C6-43BC-9C75-43E52989A741}"/>
+              </a:ext>
+            </a:extLst>
+          </p:cNvPr>
+          <p:cNvSpPr/>
+          <p:nvPr/>
+        </p:nvSpPr>
+        <p:spPr>
+          <a:xfrm>
+            <a:off x="4699488" y="1413895"/>
+            <a:ext cx="313952" cy="318304"/>
+          </a:xfrm>
+          <a:prstGeom prst="noSmoking">
+            <a:avLst/>
+          </a:prstGeom>
+          <a:solidFill>
+            <a:srgbClr val="FF0000"/>
+          </a:solidFill>
+          <a:ln>
+            <a:solidFill>
+              <a:srgbClr val="FF0000"/>
+            </a:solidFill>
+          </a:ln>
+        </p:spPr>
+        <p:style>
+          <a:lnRef idx="2">
+            <a:schemeClr val="accent1">
+              <a:shade val="50000"/>
+            </a:schemeClr>
+          </a:lnRef>
+          <a:fillRef idx="1">
+            <a:schemeClr val="accent1"/>
+          </a:fillRef>
+          <a:effectRef idx="0">
+            <a:schemeClr val="accent1"/>
+          </a:effectRef>
+          <a:fontRef idx="minor">
+            <a:schemeClr val="lt1"/>
+          </a:fontRef>
+        </p:style>
+        <p:txBody>
+          <a:bodyPr rtlCol="0" anchor="ctr"/>
+          <a:lstStyle/>
+          <a:p>
+            <a:pPr algn="ctr"/>
+            <a:endParaRPr lang="ko-KR" altLang="en-US">
+              <a:solidFill>
+                <a:schemeClr val="tx1"/>
+              </a:solidFill>
+            </a:endParaRPr>
+          </a:p>
+        </p:txBody>
+      </p:sp>
+      <p:sp>
+        <p:nvSpPr>
+          <p:cNvPr id="50" name="TextBox 49">
+            <a:extLst>
+              <a:ext uri="{FF2B5EF4-FFF2-40B4-BE49-F238E27FC236}">
+                <a16:creationId xmlns:a16="http://schemas.microsoft.com/office/drawing/2014/main" id="{FF12CCA2-E776-4FFC-8D0C-028AC773ED69}"/>
+              </a:ext>
+            </a:extLst>
+          </p:cNvPr>
+          <p:cNvSpPr txBox="1"/>
+          <p:nvPr/>
+        </p:nvSpPr>
+        <p:spPr>
+          <a:xfrm>
+            <a:off x="4277002" y="2385328"/>
+            <a:ext cx="1635384" cy="369332"/>
+          </a:xfrm>
+          <a:prstGeom prst="rect">
+            <a:avLst/>
+          </a:prstGeom>
+          <a:noFill/>
+        </p:spPr>
+        <p:txBody>
+          <a:bodyPr wrap="none" rtlCol="0">
+            <a:spAutoFit/>
+          </a:bodyPr>
+          <a:lstStyle/>
+          <a:p>
+            <a:r>
+              <a:rPr lang="en-US" altLang="ko-KR" dirty="0">
+                <a:solidFill>
+                  <a:srgbClr val="0000FF"/>
+                </a:solidFill>
+              </a:rPr>
+              <a:t>1   2   3  4  5</a:t>
+            </a:r>
+            <a:endParaRPr lang="ko-KR" altLang="en-US" dirty="0">
+              <a:solidFill>
+                <a:srgbClr val="FF0000"/>
+              </a:solidFill>
+            </a:endParaRPr>
+          </a:p>
+        </p:txBody>
+      </p:sp>
+      <p:sp>
+        <p:nvSpPr>
+          <p:cNvPr id="10" name="TextBox 9">
+            <a:extLst>
+              <a:ext uri="{FF2B5EF4-FFF2-40B4-BE49-F238E27FC236}">
+                <a16:creationId xmlns:a16="http://schemas.microsoft.com/office/drawing/2014/main" id="{32B34A48-51E3-47B3-B57D-435919A7333F}"/>
+              </a:ext>
+            </a:extLst>
+          </p:cNvPr>
+          <p:cNvSpPr txBox="1"/>
+          <p:nvPr/>
+        </p:nvSpPr>
+        <p:spPr>
+          <a:xfrm>
+            <a:off x="0" y="0"/>
+            <a:ext cx="2975430" cy="369332"/>
+          </a:xfrm>
+          <a:prstGeom prst="rect">
+            <a:avLst/>
+          </a:prstGeom>
+          <a:noFill/>
+        </p:spPr>
+        <p:txBody>
+          <a:bodyPr wrap="none" rtlCol="0">
+            <a:spAutoFit/>
+          </a:bodyPr>
+          <a:lstStyle/>
+          <a:p>
+            <a:r>
+              <a:rPr lang="en-US" altLang="ko-KR" dirty="0"/>
+              <a:t>15. </a:t>
+            </a:r>
+            <a:r>
+              <a:rPr lang="ko-KR" altLang="en-US" dirty="0"/>
+              <a:t>경로 탐색 </a:t>
+            </a:r>
+            <a:r>
+              <a:rPr lang="en-US" altLang="ko-KR" dirty="0"/>
+              <a:t>(</a:t>
+            </a:r>
+            <a:r>
+              <a:rPr lang="ko-KR" altLang="en-US" dirty="0"/>
+              <a:t>그래프 </a:t>
+            </a:r>
+            <a:r>
+              <a:rPr lang="en-US" altLang="ko-KR" dirty="0"/>
+              <a:t>DFS)</a:t>
+            </a:r>
+            <a:endParaRPr lang="ko-KR" altLang="en-US" dirty="0"/>
+          </a:p>
+        </p:txBody>
+      </p:sp>
+      <p:cxnSp>
+        <p:nvCxnSpPr>
+          <p:cNvPr id="42" name="직선 화살표 연결선 41">
+            <a:extLst>
+              <a:ext uri="{FF2B5EF4-FFF2-40B4-BE49-F238E27FC236}">
+                <a16:creationId xmlns:a16="http://schemas.microsoft.com/office/drawing/2014/main" id="{D3CAC532-4062-4C4F-9E0D-FEFC8859DB1D}"/>
+              </a:ext>
+            </a:extLst>
+          </p:cNvPr>
+          <p:cNvCxnSpPr>
+            <a:cxnSpLocks/>
+          </p:cNvCxnSpPr>
+          <p:nvPr/>
+        </p:nvCxnSpPr>
+        <p:spPr>
+          <a:xfrm>
+            <a:off x="5584861" y="1135555"/>
+            <a:ext cx="1870750" cy="598301"/>
+          </a:xfrm>
+          <a:prstGeom prst="straightConnector1">
+            <a:avLst/>
+          </a:prstGeom>
+          <a:ln w="15875">
+            <a:solidFill>
+              <a:srgbClr val="FF0000"/>
+            </a:solidFill>
+            <a:tailEnd type="triangle" w="lg" len="med"/>
+          </a:ln>
+        </p:spPr>
+        <p:style>
+          <a:lnRef idx="1">
+            <a:schemeClr val="accent1"/>
+          </a:lnRef>
+          <a:fillRef idx="0">
+            <a:schemeClr val="accent1"/>
+          </a:fillRef>
+          <a:effectRef idx="0">
+            <a:schemeClr val="accent1"/>
+          </a:effectRef>
+          <a:fontRef idx="minor">
+            <a:schemeClr val="tx1"/>
+          </a:fontRef>
+        </p:style>
+      </p:cxnSp>
+      <p:cxnSp>
+        <p:nvCxnSpPr>
+          <p:cNvPr id="44" name="직선 화살표 연결선 43">
+            <a:extLst>
+              <a:ext uri="{FF2B5EF4-FFF2-40B4-BE49-F238E27FC236}">
+                <a16:creationId xmlns:a16="http://schemas.microsoft.com/office/drawing/2014/main" id="{AD3491D4-5A33-4FF9-8D0F-038D59D88D90}"/>
+              </a:ext>
+            </a:extLst>
+          </p:cNvPr>
+          <p:cNvCxnSpPr>
+            <a:cxnSpLocks/>
+            <a:stCxn id="3" idx="2"/>
+          </p:cNvCxnSpPr>
+          <p:nvPr/>
+        </p:nvCxnSpPr>
+        <p:spPr>
+          <a:xfrm>
+            <a:off x="5530275" y="1123950"/>
+            <a:ext cx="1251525" cy="588469"/>
+          </a:xfrm>
+          <a:prstGeom prst="straightConnector1">
+            <a:avLst/>
+          </a:prstGeom>
+          <a:ln w="15875">
+            <a:solidFill>
+              <a:srgbClr val="FF0000"/>
+            </a:solidFill>
+            <a:tailEnd type="triangle" w="lg" len="med"/>
+          </a:ln>
+        </p:spPr>
+        <p:style>
+          <a:lnRef idx="1">
+            <a:schemeClr val="accent1"/>
+          </a:lnRef>
+          <a:fillRef idx="0">
+            <a:schemeClr val="accent1"/>
+          </a:fillRef>
+          <a:effectRef idx="0">
+            <a:schemeClr val="accent1"/>
+          </a:effectRef>
+          <a:fontRef idx="minor">
+            <a:schemeClr val="tx1"/>
+          </a:fontRef>
+        </p:style>
+      </p:cxnSp>
+      <p:cxnSp>
+        <p:nvCxnSpPr>
+          <p:cNvPr id="55" name="직선 화살표 연결선 54">
+            <a:extLst>
+              <a:ext uri="{FF2B5EF4-FFF2-40B4-BE49-F238E27FC236}">
+                <a16:creationId xmlns:a16="http://schemas.microsoft.com/office/drawing/2014/main" id="{54FB5CC6-082E-40DD-86B9-8DBF76905F8B}"/>
+              </a:ext>
+            </a:extLst>
+          </p:cNvPr>
+          <p:cNvCxnSpPr>
+            <a:cxnSpLocks/>
+            <a:stCxn id="34" idx="2"/>
+          </p:cNvCxnSpPr>
+          <p:nvPr/>
+        </p:nvCxnSpPr>
+        <p:spPr>
+          <a:xfrm flipH="1">
+            <a:off x="4598717" y="2152649"/>
+            <a:ext cx="626758" cy="1016764"/>
+          </a:xfrm>
+          <a:prstGeom prst="straightConnector1">
+            <a:avLst/>
+          </a:prstGeom>
+          <a:ln w="15875">
+            <a:solidFill>
+              <a:srgbClr val="FF0000"/>
+            </a:solidFill>
+            <a:tailEnd type="triangle" w="lg" len="med"/>
+          </a:ln>
+        </p:spPr>
+        <p:style>
+          <a:lnRef idx="1">
+            <a:schemeClr val="accent1"/>
+          </a:lnRef>
+          <a:fillRef idx="0">
+            <a:schemeClr val="accent1"/>
+          </a:fillRef>
+          <a:effectRef idx="0">
+            <a:schemeClr val="accent1"/>
+          </a:effectRef>
+          <a:fontRef idx="minor">
+            <a:schemeClr val="tx1"/>
+          </a:fontRef>
+        </p:style>
+      </p:cxnSp>
+      <p:cxnSp>
+        <p:nvCxnSpPr>
+          <p:cNvPr id="60" name="직선 화살표 연결선 59">
+            <a:extLst>
+              <a:ext uri="{FF2B5EF4-FFF2-40B4-BE49-F238E27FC236}">
+                <a16:creationId xmlns:a16="http://schemas.microsoft.com/office/drawing/2014/main" id="{5DBBEACA-EBE0-4171-A6A1-D044D027B3F3}"/>
+              </a:ext>
+            </a:extLst>
+          </p:cNvPr>
+          <p:cNvCxnSpPr>
+            <a:cxnSpLocks/>
+            <a:stCxn id="34" idx="2"/>
+          </p:cNvCxnSpPr>
+          <p:nvPr/>
+        </p:nvCxnSpPr>
+        <p:spPr>
+          <a:xfrm>
+            <a:off x="5225475" y="2152649"/>
+            <a:ext cx="804152" cy="949525"/>
+          </a:xfrm>
+          <a:prstGeom prst="straightConnector1">
+            <a:avLst/>
+          </a:prstGeom>
+          <a:ln w="15875">
+            <a:solidFill>
+              <a:srgbClr val="FF0000"/>
+            </a:solidFill>
+            <a:tailEnd type="triangle" w="lg" len="med"/>
+          </a:ln>
+        </p:spPr>
+        <p:style>
+          <a:lnRef idx="1">
+            <a:schemeClr val="accent1"/>
+          </a:lnRef>
+          <a:fillRef idx="0">
+            <a:schemeClr val="accent1"/>
+          </a:fillRef>
+          <a:effectRef idx="0">
+            <a:schemeClr val="accent1"/>
+          </a:effectRef>
+          <a:fontRef idx="minor">
+            <a:schemeClr val="tx1"/>
+          </a:fontRef>
+        </p:style>
+      </p:cxnSp>
+      <p:pic>
+        <p:nvPicPr>
+          <p:cNvPr id="63" name="그림 62">
+            <a:extLst>
+              <a:ext uri="{FF2B5EF4-FFF2-40B4-BE49-F238E27FC236}">
+                <a16:creationId xmlns:a16="http://schemas.microsoft.com/office/drawing/2014/main" id="{B3230487-705A-4855-B7D0-D3EB323E1BFC}"/>
+              </a:ext>
+            </a:extLst>
+          </p:cNvPr>
+          <p:cNvPicPr>
+            <a:picLocks noChangeAspect="1"/>
+          </p:cNvPicPr>
+          <p:nvPr/>
+        </p:nvPicPr>
+        <p:blipFill>
+          <a:blip r:embed="rId2"/>
+          <a:stretch>
+            <a:fillRect/>
+          </a:stretch>
+        </p:blipFill>
+        <p:spPr>
+          <a:xfrm>
+            <a:off x="54940" y="688498"/>
+            <a:ext cx="3838575" cy="1952625"/>
+          </a:xfrm>
+          <a:prstGeom prst="rect">
+            <a:avLst/>
+          </a:prstGeom>
+        </p:spPr>
+      </p:pic>
+      <p:sp>
+        <p:nvSpPr>
+          <p:cNvPr id="64" name="&quot;허용 안 됨&quot; 기호 63">
+            <a:extLst>
+              <a:ext uri="{FF2B5EF4-FFF2-40B4-BE49-F238E27FC236}">
+                <a16:creationId xmlns:a16="http://schemas.microsoft.com/office/drawing/2014/main" id="{ED88BE7C-3182-43DF-B505-8D8AE19D282D}"/>
+              </a:ext>
+            </a:extLst>
+          </p:cNvPr>
+          <p:cNvSpPr/>
+          <p:nvPr/>
+        </p:nvSpPr>
+        <p:spPr>
+          <a:xfrm>
+            <a:off x="4114006" y="2703409"/>
+            <a:ext cx="313952" cy="318304"/>
+          </a:xfrm>
+          <a:prstGeom prst="noSmoking">
+            <a:avLst/>
+          </a:prstGeom>
+          <a:solidFill>
+            <a:srgbClr val="FF0000"/>
+          </a:solidFill>
+          <a:ln>
+            <a:solidFill>
+              <a:srgbClr val="FF0000"/>
+            </a:solidFill>
+          </a:ln>
+        </p:spPr>
+        <p:style>
+          <a:lnRef idx="2">
+            <a:schemeClr val="accent1">
+              <a:shade val="50000"/>
+            </a:schemeClr>
+          </a:lnRef>
+          <a:fillRef idx="1">
+            <a:schemeClr val="accent1"/>
+          </a:fillRef>
+          <a:effectRef idx="0">
+            <a:schemeClr val="accent1"/>
+          </a:effectRef>
+          <a:fontRef idx="minor">
+            <a:schemeClr val="lt1"/>
+          </a:fontRef>
+        </p:style>
+        <p:txBody>
+          <a:bodyPr rtlCol="0" anchor="ctr"/>
+          <a:lstStyle/>
+          <a:p>
+            <a:pPr algn="ctr"/>
+            <a:endParaRPr lang="ko-KR" altLang="en-US">
+              <a:solidFill>
+                <a:schemeClr val="tx1"/>
+              </a:solidFill>
+            </a:endParaRPr>
+          </a:p>
+        </p:txBody>
+      </p:sp>
+      <p:sp>
+        <p:nvSpPr>
+          <p:cNvPr id="65" name="&quot;허용 안 됨&quot; 기호 64">
+            <a:extLst>
+              <a:ext uri="{FF2B5EF4-FFF2-40B4-BE49-F238E27FC236}">
+                <a16:creationId xmlns:a16="http://schemas.microsoft.com/office/drawing/2014/main" id="{2D38CA38-4536-4B28-AB20-C6168294E3E1}"/>
+              </a:ext>
+            </a:extLst>
+          </p:cNvPr>
+          <p:cNvSpPr/>
+          <p:nvPr/>
+        </p:nvSpPr>
+        <p:spPr>
+          <a:xfrm>
+            <a:off x="4578913" y="2703409"/>
+            <a:ext cx="313952" cy="318304"/>
+          </a:xfrm>
+          <a:prstGeom prst="noSmoking">
+            <a:avLst/>
+          </a:prstGeom>
+          <a:solidFill>
+            <a:srgbClr val="FF0000"/>
+          </a:solidFill>
+          <a:ln>
+            <a:solidFill>
+              <a:srgbClr val="FF0000"/>
+            </a:solidFill>
+          </a:ln>
+        </p:spPr>
+        <p:style>
+          <a:lnRef idx="2">
+            <a:schemeClr val="accent1">
+              <a:shade val="50000"/>
+            </a:schemeClr>
+          </a:lnRef>
+          <a:fillRef idx="1">
+            <a:schemeClr val="accent1"/>
+          </a:fillRef>
+          <a:effectRef idx="0">
+            <a:schemeClr val="accent1"/>
+          </a:effectRef>
+          <a:fontRef idx="minor">
+            <a:schemeClr val="lt1"/>
+          </a:fontRef>
+        </p:style>
+        <p:txBody>
+          <a:bodyPr rtlCol="0" anchor="ctr"/>
+          <a:lstStyle/>
+          <a:p>
+            <a:pPr algn="ctr"/>
+            <a:endParaRPr lang="ko-KR" altLang="en-US">
+              <a:solidFill>
+                <a:schemeClr val="tx1"/>
+              </a:solidFill>
+            </a:endParaRPr>
+          </a:p>
+        </p:txBody>
+      </p:sp>
+      <p:cxnSp>
+        <p:nvCxnSpPr>
+          <p:cNvPr id="67" name="직선 화살표 연결선 66">
+            <a:extLst>
+              <a:ext uri="{FF2B5EF4-FFF2-40B4-BE49-F238E27FC236}">
+                <a16:creationId xmlns:a16="http://schemas.microsoft.com/office/drawing/2014/main" id="{F11FD182-00E4-4535-9E71-C0CA3A82DB0F}"/>
+              </a:ext>
+            </a:extLst>
+          </p:cNvPr>
+          <p:cNvCxnSpPr>
+            <a:cxnSpLocks/>
+            <a:stCxn id="9" idx="2"/>
+          </p:cNvCxnSpPr>
+          <p:nvPr/>
+        </p:nvCxnSpPr>
+        <p:spPr>
+          <a:xfrm flipH="1">
+            <a:off x="3901858" y="3577882"/>
+            <a:ext cx="1192836" cy="953461"/>
+          </a:xfrm>
+          <a:prstGeom prst="straightConnector1">
+            <a:avLst/>
+          </a:prstGeom>
+          <a:ln w="15875">
+            <a:tailEnd type="triangle" w="lg" len="med"/>
+          </a:ln>
+        </p:spPr>
+        <p:style>
+          <a:lnRef idx="1">
+            <a:schemeClr val="accent1"/>
+          </a:lnRef>
+          <a:fillRef idx="0">
+            <a:schemeClr val="accent1"/>
+          </a:fillRef>
+          <a:effectRef idx="0">
+            <a:schemeClr val="accent1"/>
+          </a:effectRef>
+          <a:fontRef idx="minor">
+            <a:schemeClr val="tx1"/>
+          </a:fontRef>
+        </p:style>
+      </p:cxnSp>
+      <p:cxnSp>
+        <p:nvCxnSpPr>
+          <p:cNvPr id="68" name="직선 화살표 연결선 67">
+            <a:extLst>
+              <a:ext uri="{FF2B5EF4-FFF2-40B4-BE49-F238E27FC236}">
+                <a16:creationId xmlns:a16="http://schemas.microsoft.com/office/drawing/2014/main" id="{93C57CB9-D509-4707-964E-B26499C4EA74}"/>
+              </a:ext>
+            </a:extLst>
+          </p:cNvPr>
+          <p:cNvCxnSpPr>
+            <a:cxnSpLocks/>
+            <a:stCxn id="9" idx="2"/>
+          </p:cNvCxnSpPr>
+          <p:nvPr/>
+        </p:nvCxnSpPr>
+        <p:spPr>
+          <a:xfrm>
+            <a:off x="5094694" y="3577882"/>
+            <a:ext cx="355232" cy="996608"/>
+          </a:xfrm>
+          <a:prstGeom prst="straightConnector1">
+            <a:avLst/>
+          </a:prstGeom>
+          <a:ln w="15875">
+            <a:solidFill>
+              <a:srgbClr val="FF0000"/>
+            </a:solidFill>
+            <a:tailEnd type="triangle" w="lg" len="med"/>
+          </a:ln>
+        </p:spPr>
+        <p:style>
+          <a:lnRef idx="1">
+            <a:schemeClr val="accent1"/>
+          </a:lnRef>
+          <a:fillRef idx="0">
+            <a:schemeClr val="accent1"/>
+          </a:fillRef>
+          <a:effectRef idx="0">
+            <a:schemeClr val="accent1"/>
+          </a:effectRef>
+          <a:fontRef idx="minor">
+            <a:schemeClr val="tx1"/>
+          </a:fontRef>
+        </p:style>
+      </p:cxnSp>
+      <p:cxnSp>
+        <p:nvCxnSpPr>
+          <p:cNvPr id="69" name="직선 화살표 연결선 68">
+            <a:extLst>
+              <a:ext uri="{FF2B5EF4-FFF2-40B4-BE49-F238E27FC236}">
+                <a16:creationId xmlns:a16="http://schemas.microsoft.com/office/drawing/2014/main" id="{5B585B2E-F449-475B-B12D-7A505E9E4D6A}"/>
+              </a:ext>
+            </a:extLst>
+          </p:cNvPr>
+          <p:cNvCxnSpPr>
+            <a:cxnSpLocks/>
+            <a:stCxn id="9" idx="2"/>
+          </p:cNvCxnSpPr>
+          <p:nvPr/>
+        </p:nvCxnSpPr>
+        <p:spPr>
+          <a:xfrm flipH="1">
+            <a:off x="4963914" y="3577882"/>
+            <a:ext cx="130780" cy="1000544"/>
+          </a:xfrm>
+          <a:prstGeom prst="straightConnector1">
+            <a:avLst/>
+          </a:prstGeom>
+          <a:ln w="15875">
+            <a:solidFill>
+              <a:srgbClr val="FF0000"/>
+            </a:solidFill>
+            <a:tailEnd type="triangle" w="lg" len="med"/>
+          </a:ln>
+        </p:spPr>
+        <p:style>
+          <a:lnRef idx="1">
+            <a:schemeClr val="accent1"/>
+          </a:lnRef>
+          <a:fillRef idx="0">
+            <a:schemeClr val="accent1"/>
+          </a:fillRef>
+          <a:effectRef idx="0">
+            <a:schemeClr val="accent1"/>
+          </a:effectRef>
+          <a:fontRef idx="minor">
+            <a:schemeClr val="tx1"/>
+          </a:fontRef>
+        </p:style>
+      </p:cxnSp>
+      <p:sp>
+        <p:nvSpPr>
+          <p:cNvPr id="70" name="TextBox 69">
+            <a:extLst>
+              <a:ext uri="{FF2B5EF4-FFF2-40B4-BE49-F238E27FC236}">
+                <a16:creationId xmlns:a16="http://schemas.microsoft.com/office/drawing/2014/main" id="{6AF5F910-D056-40B6-BD0A-D5A19D9FA215}"/>
+              </a:ext>
+            </a:extLst>
+          </p:cNvPr>
+          <p:cNvSpPr txBox="1"/>
+          <p:nvPr/>
+        </p:nvSpPr>
+        <p:spPr>
+          <a:xfrm>
+            <a:off x="4146221" y="3814497"/>
+            <a:ext cx="1635384" cy="369332"/>
+          </a:xfrm>
+          <a:prstGeom prst="rect">
+            <a:avLst/>
+          </a:prstGeom>
+          <a:noFill/>
+        </p:spPr>
+        <p:txBody>
+          <a:bodyPr wrap="none" rtlCol="0">
+            <a:spAutoFit/>
+          </a:bodyPr>
+          <a:lstStyle/>
+          <a:p>
+            <a:r>
+              <a:rPr lang="en-US" altLang="ko-KR" dirty="0">
+                <a:solidFill>
+                  <a:srgbClr val="0000FF"/>
+                </a:solidFill>
+              </a:rPr>
+              <a:t>1   2   3  4  5</a:t>
+            </a:r>
+            <a:endParaRPr lang="ko-KR" altLang="en-US" dirty="0">
+              <a:solidFill>
+                <a:srgbClr val="FF0000"/>
+              </a:solidFill>
+            </a:endParaRPr>
+          </a:p>
+        </p:txBody>
+      </p:sp>
+      <p:cxnSp>
+        <p:nvCxnSpPr>
+          <p:cNvPr id="71" name="직선 화살표 연결선 70">
+            <a:extLst>
+              <a:ext uri="{FF2B5EF4-FFF2-40B4-BE49-F238E27FC236}">
+                <a16:creationId xmlns:a16="http://schemas.microsoft.com/office/drawing/2014/main" id="{71FC6FF6-755B-4D1E-9277-2418553E478F}"/>
+              </a:ext>
+            </a:extLst>
+          </p:cNvPr>
+          <p:cNvCxnSpPr>
+            <a:cxnSpLocks/>
+            <a:stCxn id="9" idx="2"/>
+          </p:cNvCxnSpPr>
+          <p:nvPr/>
+        </p:nvCxnSpPr>
+        <p:spPr>
+          <a:xfrm flipH="1">
+            <a:off x="4467936" y="3577882"/>
+            <a:ext cx="626758" cy="1020700"/>
+          </a:xfrm>
+          <a:prstGeom prst="straightConnector1">
+            <a:avLst/>
+          </a:prstGeom>
+          <a:ln w="15875">
+            <a:solidFill>
+              <a:srgbClr val="FF0000"/>
+            </a:solidFill>
+            <a:tailEnd type="triangle" w="lg" len="med"/>
+          </a:ln>
+        </p:spPr>
+        <p:style>
+          <a:lnRef idx="1">
+            <a:schemeClr val="accent1"/>
+          </a:lnRef>
+          <a:fillRef idx="0">
+            <a:schemeClr val="accent1"/>
+          </a:fillRef>
+          <a:effectRef idx="0">
+            <a:schemeClr val="accent1"/>
+          </a:effectRef>
+          <a:fontRef idx="minor">
+            <a:schemeClr val="tx1"/>
+          </a:fontRef>
+        </p:style>
+      </p:cxnSp>
+      <p:cxnSp>
+        <p:nvCxnSpPr>
+          <p:cNvPr id="72" name="직선 화살표 연결선 71">
+            <a:extLst>
+              <a:ext uri="{FF2B5EF4-FFF2-40B4-BE49-F238E27FC236}">
+                <a16:creationId xmlns:a16="http://schemas.microsoft.com/office/drawing/2014/main" id="{3DF5530C-D861-409B-9B4B-0E45F5F71B5F}"/>
+              </a:ext>
+            </a:extLst>
+          </p:cNvPr>
+          <p:cNvCxnSpPr>
+            <a:cxnSpLocks/>
+            <a:stCxn id="9" idx="2"/>
+          </p:cNvCxnSpPr>
+          <p:nvPr/>
+        </p:nvCxnSpPr>
+        <p:spPr>
+          <a:xfrm>
+            <a:off x="5094694" y="3577882"/>
+            <a:ext cx="804152" cy="953461"/>
+          </a:xfrm>
+          <a:prstGeom prst="straightConnector1">
+            <a:avLst/>
+          </a:prstGeom>
+          <a:ln w="15875">
+            <a:solidFill>
+              <a:srgbClr val="FF0000"/>
+            </a:solidFill>
+            <a:tailEnd type="triangle" w="lg" len="med"/>
+          </a:ln>
+        </p:spPr>
+        <p:style>
+          <a:lnRef idx="1">
+            <a:schemeClr val="accent1"/>
+          </a:lnRef>
+          <a:fillRef idx="0">
+            <a:schemeClr val="accent1"/>
+          </a:fillRef>
+          <a:effectRef idx="0">
+            <a:schemeClr val="accent1"/>
+          </a:effectRef>
+          <a:fontRef idx="minor">
+            <a:schemeClr val="tx1"/>
+          </a:fontRef>
+        </p:style>
+      </p:cxnSp>
+      <p:sp>
+        <p:nvSpPr>
+          <p:cNvPr id="73" name="&quot;허용 안 됨&quot; 기호 72">
+            <a:extLst>
+              <a:ext uri="{FF2B5EF4-FFF2-40B4-BE49-F238E27FC236}">
+                <a16:creationId xmlns:a16="http://schemas.microsoft.com/office/drawing/2014/main" id="{4CCCAF3E-8040-4B90-9A27-87D48D0A06F1}"/>
+              </a:ext>
+            </a:extLst>
+          </p:cNvPr>
+          <p:cNvSpPr/>
+          <p:nvPr/>
+        </p:nvSpPr>
+        <p:spPr>
+          <a:xfrm>
+            <a:off x="3983225" y="4132578"/>
+            <a:ext cx="313952" cy="318304"/>
+          </a:xfrm>
+          <a:prstGeom prst="noSmoking">
+            <a:avLst/>
+          </a:prstGeom>
+          <a:solidFill>
+            <a:srgbClr val="FF0000"/>
+          </a:solidFill>
+          <a:ln>
+            <a:solidFill>
+              <a:srgbClr val="FF0000"/>
+            </a:solidFill>
+          </a:ln>
+        </p:spPr>
+        <p:style>
+          <a:lnRef idx="2">
+            <a:schemeClr val="accent1">
+              <a:shade val="50000"/>
+            </a:schemeClr>
+          </a:lnRef>
+          <a:fillRef idx="1">
+            <a:schemeClr val="accent1"/>
+          </a:fillRef>
+          <a:effectRef idx="0">
+            <a:schemeClr val="accent1"/>
+          </a:effectRef>
+          <a:fontRef idx="minor">
+            <a:schemeClr val="lt1"/>
+          </a:fontRef>
+        </p:style>
+        <p:txBody>
+          <a:bodyPr rtlCol="0" anchor="ctr"/>
+          <a:lstStyle/>
+          <a:p>
+            <a:pPr algn="ctr"/>
+            <a:endParaRPr lang="ko-KR" altLang="en-US">
+              <a:solidFill>
+                <a:schemeClr val="tx1"/>
+              </a:solidFill>
+            </a:endParaRPr>
+          </a:p>
+        </p:txBody>
+      </p:sp>
+      <p:sp>
+        <p:nvSpPr>
+          <p:cNvPr id="74" name="&quot;허용 안 됨&quot; 기호 73">
+            <a:extLst>
+              <a:ext uri="{FF2B5EF4-FFF2-40B4-BE49-F238E27FC236}">
+                <a16:creationId xmlns:a16="http://schemas.microsoft.com/office/drawing/2014/main" id="{6E7B2531-922D-46B9-AD56-7CE5C51EBB61}"/>
+              </a:ext>
+            </a:extLst>
+          </p:cNvPr>
+          <p:cNvSpPr/>
+          <p:nvPr/>
+        </p:nvSpPr>
+        <p:spPr>
+          <a:xfrm>
+            <a:off x="4448132" y="4132578"/>
+            <a:ext cx="313952" cy="318304"/>
+          </a:xfrm>
+          <a:prstGeom prst="noSmoking">
+            <a:avLst/>
+          </a:prstGeom>
+          <a:solidFill>
+            <a:srgbClr val="FF0000"/>
+          </a:solidFill>
+          <a:ln>
+            <a:solidFill>
+              <a:srgbClr val="FF0000"/>
+            </a:solidFill>
+          </a:ln>
+        </p:spPr>
+        <p:style>
+          <a:lnRef idx="2">
+            <a:schemeClr val="accent1">
+              <a:shade val="50000"/>
+            </a:schemeClr>
+          </a:lnRef>
+          <a:fillRef idx="1">
+            <a:schemeClr val="accent1"/>
+          </a:fillRef>
+          <a:effectRef idx="0">
+            <a:schemeClr val="accent1"/>
+          </a:effectRef>
+          <a:fontRef idx="minor">
+            <a:schemeClr val="lt1"/>
+          </a:fontRef>
+        </p:style>
+        <p:txBody>
+          <a:bodyPr rtlCol="0" anchor="ctr"/>
+          <a:lstStyle/>
+          <a:p>
+            <a:pPr algn="ctr"/>
+            <a:endParaRPr lang="ko-KR" altLang="en-US">
+              <a:solidFill>
+                <a:schemeClr val="tx1"/>
+              </a:solidFill>
+            </a:endParaRPr>
+          </a:p>
+        </p:txBody>
+      </p:sp>
+      <p:sp>
+        <p:nvSpPr>
+          <p:cNvPr id="75" name="&quot;허용 안 됨&quot; 기호 74">
+            <a:extLst>
+              <a:ext uri="{FF2B5EF4-FFF2-40B4-BE49-F238E27FC236}">
+                <a16:creationId xmlns:a16="http://schemas.microsoft.com/office/drawing/2014/main" id="{999FAF98-21DF-4AB4-A176-F5029A4EA6D0}"/>
+              </a:ext>
+            </a:extLst>
+          </p:cNvPr>
+          <p:cNvSpPr/>
+          <p:nvPr/>
+        </p:nvSpPr>
+        <p:spPr>
+          <a:xfrm>
+            <a:off x="4875388" y="4132578"/>
+            <a:ext cx="313952" cy="318304"/>
+          </a:xfrm>
+          <a:prstGeom prst="noSmoking">
+            <a:avLst/>
+          </a:prstGeom>
+          <a:solidFill>
+            <a:srgbClr val="FF0000"/>
+          </a:solidFill>
+          <a:ln>
+            <a:solidFill>
+              <a:srgbClr val="FF0000"/>
+            </a:solidFill>
+          </a:ln>
+        </p:spPr>
+        <p:style>
+          <a:lnRef idx="2">
+            <a:schemeClr val="accent1">
+              <a:shade val="50000"/>
+            </a:schemeClr>
+          </a:lnRef>
+          <a:fillRef idx="1">
+            <a:schemeClr val="accent1"/>
+          </a:fillRef>
+          <a:effectRef idx="0">
+            <a:schemeClr val="accent1"/>
+          </a:effectRef>
+          <a:fontRef idx="minor">
+            <a:schemeClr val="lt1"/>
+          </a:fontRef>
+        </p:style>
+        <p:txBody>
+          <a:bodyPr rtlCol="0" anchor="ctr"/>
+          <a:lstStyle/>
+          <a:p>
+            <a:pPr algn="ctr"/>
+            <a:endParaRPr lang="ko-KR" altLang="en-US">
+              <a:solidFill>
+                <a:schemeClr val="tx1"/>
+              </a:solidFill>
+            </a:endParaRPr>
+          </a:p>
+        </p:txBody>
+      </p:sp>
+      <p:sp>
+        <p:nvSpPr>
+          <p:cNvPr id="76" name="직사각형 75">
+            <a:extLst>
+              <a:ext uri="{FF2B5EF4-FFF2-40B4-BE49-F238E27FC236}">
+                <a16:creationId xmlns:a16="http://schemas.microsoft.com/office/drawing/2014/main" id="{1FBFE77B-4630-4013-AC40-5E4D20BC998C}"/>
+              </a:ext>
+            </a:extLst>
+          </p:cNvPr>
+          <p:cNvSpPr/>
+          <p:nvPr/>
+        </p:nvSpPr>
+        <p:spPr>
+          <a:xfrm>
+            <a:off x="5131814" y="4570972"/>
+            <a:ext cx="665773" cy="428625"/>
+          </a:xfrm>
+          <a:prstGeom prst="rect">
+            <a:avLst/>
+          </a:prstGeom>
+        </p:spPr>
+        <p:style>
+          <a:lnRef idx="2">
+            <a:schemeClr val="accent1">
+              <a:shade val="50000"/>
+            </a:schemeClr>
+          </a:lnRef>
+          <a:fillRef idx="1">
+            <a:schemeClr val="accent1"/>
+          </a:fillRef>
+          <a:effectRef idx="0">
+            <a:schemeClr val="accent1"/>
+          </a:effectRef>
+          <a:fontRef idx="minor">
+            <a:schemeClr val="lt1"/>
+          </a:fontRef>
+        </p:style>
+        <p:txBody>
+          <a:bodyPr rtlCol="0" anchor="ctr"/>
+          <a:lstStyle/>
+          <a:p>
+            <a:pPr algn="ctr"/>
+            <a:r>
+              <a:rPr lang="en-US" altLang="ko-KR" dirty="0"/>
+              <a:t>D(4)</a:t>
+            </a:r>
+            <a:endParaRPr lang="ko-KR" altLang="en-US" dirty="0"/>
+          </a:p>
+        </p:txBody>
+      </p:sp>
+      <p:graphicFrame>
+        <p:nvGraphicFramePr>
+          <p:cNvPr id="82" name="표 81">
+            <a:extLst>
+              <a:ext uri="{FF2B5EF4-FFF2-40B4-BE49-F238E27FC236}">
+                <a16:creationId xmlns:a16="http://schemas.microsoft.com/office/drawing/2014/main" id="{5150B279-67BA-420F-AB35-BEF2AE7706CE}"/>
+              </a:ext>
+            </a:extLst>
+          </p:cNvPr>
+          <p:cNvGraphicFramePr>
+            <a:graphicFrameLocks noGrp="1"/>
+          </p:cNvGraphicFramePr>
+          <p:nvPr>
+            <p:extLst>
+              <p:ext uri="{D42A27DB-BD31-4B8C-83A1-F6EECF244321}">
+                <p14:modId xmlns:p14="http://schemas.microsoft.com/office/powerpoint/2010/main" val="611837193"/>
+              </p:ext>
+            </p:extLst>
+          </p:nvPr>
+        </p:nvGraphicFramePr>
+        <p:xfrm>
+          <a:off x="1774728" y="3035460"/>
+          <a:ext cx="1644852" cy="370840"/>
+        </p:xfrm>
+        <a:graphic>
+          <a:graphicData uri="http://schemas.openxmlformats.org/drawingml/2006/table">
+            <a:tbl>
+              <a:tblPr firstRow="1" bandRow="1">
+                <a:tableStyleId>{5C22544A-7EE6-4342-B048-85BDC9FD1C3A}</a:tableStyleId>
+              </a:tblPr>
+              <a:tblGrid>
+                <a:gridCol w="274142">
+                  <a:extLst>
+                    <a:ext uri="{9D8B030D-6E8A-4147-A177-3AD203B41FA5}">
+                      <a16:colId xmlns:a16="http://schemas.microsoft.com/office/drawing/2014/main" val="662917937"/>
+                    </a:ext>
+                  </a:extLst>
+                </a:gridCol>
+                <a:gridCol w="274142">
+                  <a:extLst>
+                    <a:ext uri="{9D8B030D-6E8A-4147-A177-3AD203B41FA5}">
+                      <a16:colId xmlns:a16="http://schemas.microsoft.com/office/drawing/2014/main" val="3082420159"/>
+                    </a:ext>
+                  </a:extLst>
+                </a:gridCol>
+                <a:gridCol w="274142">
+                  <a:extLst>
+                    <a:ext uri="{9D8B030D-6E8A-4147-A177-3AD203B41FA5}">
+                      <a16:colId xmlns:a16="http://schemas.microsoft.com/office/drawing/2014/main" val="48093722"/>
+                    </a:ext>
+                  </a:extLst>
+                </a:gridCol>
+                <a:gridCol w="274142">
+                  <a:extLst>
+                    <a:ext uri="{9D8B030D-6E8A-4147-A177-3AD203B41FA5}">
+                      <a16:colId xmlns:a16="http://schemas.microsoft.com/office/drawing/2014/main" val="2055081397"/>
+                    </a:ext>
+                  </a:extLst>
+                </a:gridCol>
+                <a:gridCol w="274142">
+                  <a:extLst>
+                    <a:ext uri="{9D8B030D-6E8A-4147-A177-3AD203B41FA5}">
+                      <a16:colId xmlns:a16="http://schemas.microsoft.com/office/drawing/2014/main" val="178370341"/>
+                    </a:ext>
+                  </a:extLst>
+                </a:gridCol>
+                <a:gridCol w="274142">
+                  <a:extLst>
+                    <a:ext uri="{9D8B030D-6E8A-4147-A177-3AD203B41FA5}">
+                      <a16:colId xmlns:a16="http://schemas.microsoft.com/office/drawing/2014/main" val="32228609"/>
+                    </a:ext>
+                  </a:extLst>
+                </a:gridCol>
+              </a:tblGrid>
+              <a:tr h="370840">
+                <a:tc>
+                  <a:txBody>
+                    <a:bodyPr/>
+                    <a:lstStyle/>
+                    <a:p>
+                      <a:pPr latinLnBrk="1"/>
+                      <a:r>
+                        <a:rPr lang="en-US" altLang="ko-KR" sz="1100" dirty="0">
+                          <a:solidFill>
+                            <a:schemeClr val="tx1"/>
+                          </a:solidFill>
+                        </a:rPr>
+                        <a:t>0</a:t>
+                      </a:r>
+                      <a:endParaRPr lang="ko-KR" altLang="en-US" sz="1100" dirty="0">
+                        <a:solidFill>
+                          <a:schemeClr val="tx1"/>
+                        </a:solidFill>
+                      </a:endParaRPr>
+                    </a:p>
+                  </a:txBody>
+                  <a:tcPr anchor="ctr">
+                    <a:solidFill>
+                      <a:srgbClr val="FFC000"/>
+                    </a:solidFill>
+                  </a:tcPr>
+                </a:tc>
+                <a:tc>
+                  <a:txBody>
+                    <a:bodyPr/>
+                    <a:lstStyle/>
+                    <a:p>
+                      <a:pPr latinLnBrk="1"/>
+                      <a:r>
+                        <a:rPr lang="en-US" altLang="ko-KR" sz="1100" dirty="0">
+                          <a:solidFill>
+                            <a:schemeClr val="tx1"/>
+                          </a:solidFill>
+                        </a:rPr>
+                        <a:t>1</a:t>
+                      </a:r>
+                      <a:endParaRPr lang="ko-KR" altLang="en-US" sz="1100" dirty="0">
+                        <a:solidFill>
+                          <a:schemeClr val="tx1"/>
+                        </a:solidFill>
+                      </a:endParaRPr>
+                    </a:p>
+                  </a:txBody>
+                  <a:tcPr anchor="ctr">
+                    <a:solidFill>
+                      <a:srgbClr val="FFC000"/>
+                    </a:solidFill>
+                  </a:tcPr>
+                </a:tc>
+                <a:tc>
+                  <a:txBody>
+                    <a:bodyPr/>
+                    <a:lstStyle/>
+                    <a:p>
+                      <a:pPr latinLnBrk="1"/>
+                      <a:r>
+                        <a:rPr lang="en-US" altLang="ko-KR" sz="1100" dirty="0">
+                          <a:solidFill>
+                            <a:schemeClr val="tx1"/>
+                          </a:solidFill>
+                        </a:rPr>
+                        <a:t>1</a:t>
+                      </a:r>
+                      <a:endParaRPr lang="ko-KR" altLang="en-US" sz="1100" dirty="0">
+                        <a:solidFill>
+                          <a:schemeClr val="tx1"/>
+                        </a:solidFill>
+                      </a:endParaRPr>
+                    </a:p>
+                  </a:txBody>
+                  <a:tcPr anchor="ctr">
+                    <a:solidFill>
+                      <a:srgbClr val="FFC000"/>
+                    </a:solidFill>
+                  </a:tcPr>
+                </a:tc>
+                <a:tc>
+                  <a:txBody>
+                    <a:bodyPr/>
+                    <a:lstStyle/>
+                    <a:p>
+                      <a:pPr latinLnBrk="1"/>
+                      <a:r>
+                        <a:rPr lang="en-US" altLang="ko-KR" sz="1100" dirty="0">
+                          <a:solidFill>
+                            <a:schemeClr val="tx1"/>
+                          </a:solidFill>
+                        </a:rPr>
+                        <a:t>1</a:t>
+                      </a:r>
+                      <a:endParaRPr lang="ko-KR" altLang="en-US" sz="1100" dirty="0">
+                        <a:solidFill>
+                          <a:schemeClr val="tx1"/>
+                        </a:solidFill>
+                      </a:endParaRPr>
+                    </a:p>
+                  </a:txBody>
+                  <a:tcPr anchor="ctr">
+                    <a:solidFill>
+                      <a:srgbClr val="FFC000"/>
+                    </a:solidFill>
+                  </a:tcPr>
+                </a:tc>
+                <a:tc>
+                  <a:txBody>
+                    <a:bodyPr/>
+                    <a:lstStyle/>
+                    <a:p>
+                      <a:pPr latinLnBrk="1"/>
+                      <a:r>
+                        <a:rPr lang="en-US" altLang="ko-KR" sz="1100" dirty="0">
+                          <a:solidFill>
+                            <a:schemeClr val="tx1"/>
+                          </a:solidFill>
+                        </a:rPr>
+                        <a:t>0</a:t>
+                      </a:r>
+                      <a:endParaRPr lang="ko-KR" altLang="en-US" sz="1100" dirty="0">
+                        <a:solidFill>
+                          <a:schemeClr val="tx1"/>
+                        </a:solidFill>
+                      </a:endParaRPr>
+                    </a:p>
+                  </a:txBody>
+                  <a:tcPr anchor="ctr">
+                    <a:solidFill>
+                      <a:srgbClr val="FFC000"/>
+                    </a:solidFill>
+                  </a:tcPr>
+                </a:tc>
+                <a:tc>
+                  <a:txBody>
+                    <a:bodyPr/>
+                    <a:lstStyle/>
+                    <a:p>
+                      <a:pPr latinLnBrk="1"/>
+                      <a:r>
+                        <a:rPr lang="en-US" altLang="ko-KR" sz="1100" dirty="0">
+                          <a:solidFill>
+                            <a:schemeClr val="tx1"/>
+                          </a:solidFill>
+                        </a:rPr>
+                        <a:t>0</a:t>
+                      </a:r>
+                      <a:endParaRPr lang="ko-KR" altLang="en-US" sz="1100" dirty="0">
+                        <a:solidFill>
+                          <a:schemeClr val="tx1"/>
+                        </a:solidFill>
+                      </a:endParaRPr>
+                    </a:p>
+                  </a:txBody>
+                  <a:tcPr anchor="ctr">
+                    <a:solidFill>
+                      <a:srgbClr val="FFC000"/>
+                    </a:solidFill>
+                  </a:tcPr>
+                </a:tc>
+                <a:extLst>
+                  <a:ext uri="{0D108BD9-81ED-4DB2-BD59-A6C34878D82A}">
+                    <a16:rowId xmlns:a16="http://schemas.microsoft.com/office/drawing/2014/main" val="547838226"/>
+                  </a:ext>
+                </a:extLst>
+              </a:tr>
+            </a:tbl>
+          </a:graphicData>
+        </a:graphic>
+      </p:graphicFrame>
+      <p:sp>
+        <p:nvSpPr>
+          <p:cNvPr id="83" name="TextBox 82">
+            <a:extLst>
+              <a:ext uri="{FF2B5EF4-FFF2-40B4-BE49-F238E27FC236}">
+                <a16:creationId xmlns:a16="http://schemas.microsoft.com/office/drawing/2014/main" id="{A4FDE48D-5CEF-49E2-A561-266372A39F6C}"/>
+              </a:ext>
+            </a:extLst>
+          </p:cNvPr>
+          <p:cNvSpPr txBox="1"/>
+          <p:nvPr/>
+        </p:nvSpPr>
+        <p:spPr>
+          <a:xfrm>
+            <a:off x="1436322" y="2737898"/>
+            <a:ext cx="2640466" cy="307777"/>
+          </a:xfrm>
+          <a:prstGeom prst="rect">
+            <a:avLst/>
+          </a:prstGeom>
+          <a:noFill/>
+        </p:spPr>
+        <p:txBody>
+          <a:bodyPr wrap="none" rtlCol="0">
+            <a:spAutoFit/>
+          </a:bodyPr>
+          <a:lstStyle/>
+          <a:p>
+            <a:r>
+              <a:rPr lang="en-US" altLang="ko-KR" sz="1400" dirty="0" err="1"/>
+              <a:t>ch</a:t>
+            </a:r>
+            <a:r>
+              <a:rPr lang="en-US" altLang="ko-KR" sz="1400" dirty="0"/>
+              <a:t> </a:t>
+            </a:r>
+            <a:r>
+              <a:rPr lang="ko-KR" altLang="en-US" sz="1400" dirty="0"/>
+              <a:t> </a:t>
+            </a:r>
+            <a:r>
+              <a:rPr lang="en-US" altLang="ko-KR" sz="1400" dirty="0"/>
+              <a:t>0   1   2   3   4   5 (index)</a:t>
+            </a:r>
+            <a:endParaRPr lang="ko-KR" altLang="en-US" sz="1400" dirty="0"/>
+          </a:p>
+        </p:txBody>
+      </p:sp>
+      <p:graphicFrame>
+        <p:nvGraphicFramePr>
+          <p:cNvPr id="84" name="표 83">
+            <a:extLst>
+              <a:ext uri="{FF2B5EF4-FFF2-40B4-BE49-F238E27FC236}">
+                <a16:creationId xmlns:a16="http://schemas.microsoft.com/office/drawing/2014/main" id="{6120797C-8356-4770-A9C9-9D93EF0FE340}"/>
+              </a:ext>
+            </a:extLst>
+          </p:cNvPr>
+          <p:cNvGraphicFramePr>
+            <a:graphicFrameLocks noGrp="1"/>
+          </p:cNvGraphicFramePr>
+          <p:nvPr>
+            <p:extLst>
+              <p:ext uri="{D42A27DB-BD31-4B8C-83A1-F6EECF244321}">
+                <p14:modId xmlns:p14="http://schemas.microsoft.com/office/powerpoint/2010/main" val="1567990845"/>
+              </p:ext>
+            </p:extLst>
+          </p:nvPr>
+        </p:nvGraphicFramePr>
+        <p:xfrm>
+          <a:off x="1799484" y="4407451"/>
+          <a:ext cx="1644852" cy="370840"/>
+        </p:xfrm>
+        <a:graphic>
+          <a:graphicData uri="http://schemas.openxmlformats.org/drawingml/2006/table">
+            <a:tbl>
+              <a:tblPr firstRow="1" bandRow="1">
+                <a:tableStyleId>{5C22544A-7EE6-4342-B048-85BDC9FD1C3A}</a:tableStyleId>
+              </a:tblPr>
+              <a:tblGrid>
+                <a:gridCol w="274142">
+                  <a:extLst>
+                    <a:ext uri="{9D8B030D-6E8A-4147-A177-3AD203B41FA5}">
+                      <a16:colId xmlns:a16="http://schemas.microsoft.com/office/drawing/2014/main" val="662917937"/>
+                    </a:ext>
+                  </a:extLst>
+                </a:gridCol>
+                <a:gridCol w="274142">
+                  <a:extLst>
+                    <a:ext uri="{9D8B030D-6E8A-4147-A177-3AD203B41FA5}">
+                      <a16:colId xmlns:a16="http://schemas.microsoft.com/office/drawing/2014/main" val="3082420159"/>
+                    </a:ext>
+                  </a:extLst>
+                </a:gridCol>
+                <a:gridCol w="274142">
+                  <a:extLst>
+                    <a:ext uri="{9D8B030D-6E8A-4147-A177-3AD203B41FA5}">
+                      <a16:colId xmlns:a16="http://schemas.microsoft.com/office/drawing/2014/main" val="48093722"/>
+                    </a:ext>
+                  </a:extLst>
+                </a:gridCol>
+                <a:gridCol w="274142">
+                  <a:extLst>
+                    <a:ext uri="{9D8B030D-6E8A-4147-A177-3AD203B41FA5}">
+                      <a16:colId xmlns:a16="http://schemas.microsoft.com/office/drawing/2014/main" val="2055081397"/>
+                    </a:ext>
+                  </a:extLst>
+                </a:gridCol>
+                <a:gridCol w="274142">
+                  <a:extLst>
+                    <a:ext uri="{9D8B030D-6E8A-4147-A177-3AD203B41FA5}">
+                      <a16:colId xmlns:a16="http://schemas.microsoft.com/office/drawing/2014/main" val="419147833"/>
+                    </a:ext>
+                  </a:extLst>
+                </a:gridCol>
+                <a:gridCol w="274142">
+                  <a:extLst>
+                    <a:ext uri="{9D8B030D-6E8A-4147-A177-3AD203B41FA5}">
+                      <a16:colId xmlns:a16="http://schemas.microsoft.com/office/drawing/2014/main" val="2879936494"/>
+                    </a:ext>
+                  </a:extLst>
+                </a:gridCol>
+              </a:tblGrid>
+              <a:tr h="370840">
+                <a:tc>
+                  <a:txBody>
+                    <a:bodyPr/>
+                    <a:lstStyle/>
+                    <a:p>
+                      <a:pPr latinLnBrk="1"/>
+                      <a:r>
+                        <a:rPr lang="en-US" altLang="ko-KR" sz="1100" dirty="0">
+                          <a:solidFill>
+                            <a:schemeClr val="tx1"/>
+                          </a:solidFill>
+                        </a:rPr>
+                        <a:t>0</a:t>
+                      </a:r>
+                      <a:endParaRPr lang="ko-KR" altLang="en-US" sz="1100" dirty="0">
+                        <a:solidFill>
+                          <a:schemeClr val="tx1"/>
+                        </a:solidFill>
+                      </a:endParaRPr>
+                    </a:p>
+                  </a:txBody>
+                  <a:tcPr anchor="ctr">
+                    <a:solidFill>
+                      <a:srgbClr val="FFC000"/>
+                    </a:solidFill>
+                  </a:tcPr>
+                </a:tc>
+                <a:tc>
+                  <a:txBody>
+                    <a:bodyPr/>
+                    <a:lstStyle/>
+                    <a:p>
+                      <a:pPr latinLnBrk="1"/>
+                      <a:r>
+                        <a:rPr lang="en-US" altLang="ko-KR" sz="1100" dirty="0">
+                          <a:solidFill>
+                            <a:schemeClr val="tx1"/>
+                          </a:solidFill>
+                        </a:rPr>
+                        <a:t>1</a:t>
+                      </a:r>
+                      <a:endParaRPr lang="ko-KR" altLang="en-US" sz="1100" dirty="0">
+                        <a:solidFill>
+                          <a:schemeClr val="tx1"/>
+                        </a:solidFill>
+                      </a:endParaRPr>
+                    </a:p>
+                  </a:txBody>
+                  <a:tcPr anchor="ctr">
+                    <a:solidFill>
+                      <a:srgbClr val="FFC000"/>
+                    </a:solidFill>
+                  </a:tcPr>
+                </a:tc>
+                <a:tc>
+                  <a:txBody>
+                    <a:bodyPr/>
+                    <a:lstStyle/>
+                    <a:p>
+                      <a:pPr latinLnBrk="1"/>
+                      <a:r>
+                        <a:rPr lang="en-US" altLang="ko-KR" sz="1100" dirty="0">
+                          <a:solidFill>
+                            <a:schemeClr val="tx1"/>
+                          </a:solidFill>
+                        </a:rPr>
+                        <a:t>1</a:t>
+                      </a:r>
+                      <a:endParaRPr lang="ko-KR" altLang="en-US" sz="1100" dirty="0">
+                        <a:solidFill>
+                          <a:schemeClr val="tx1"/>
+                        </a:solidFill>
+                      </a:endParaRPr>
+                    </a:p>
+                  </a:txBody>
+                  <a:tcPr anchor="ctr">
+                    <a:solidFill>
+                      <a:srgbClr val="FFC000"/>
+                    </a:solidFill>
+                  </a:tcPr>
+                </a:tc>
+                <a:tc>
+                  <a:txBody>
+                    <a:bodyPr/>
+                    <a:lstStyle/>
+                    <a:p>
+                      <a:pPr latinLnBrk="1"/>
+                      <a:r>
+                        <a:rPr lang="en-US" altLang="ko-KR" sz="1100" dirty="0">
+                          <a:solidFill>
+                            <a:schemeClr val="tx1"/>
+                          </a:solidFill>
+                        </a:rPr>
+                        <a:t>0</a:t>
+                      </a:r>
+                      <a:endParaRPr lang="ko-KR" altLang="en-US" sz="1100" dirty="0">
+                        <a:solidFill>
+                          <a:schemeClr val="tx1"/>
+                        </a:solidFill>
+                      </a:endParaRPr>
+                    </a:p>
+                  </a:txBody>
+                  <a:tcPr anchor="ctr">
+                    <a:solidFill>
+                      <a:srgbClr val="FF0000"/>
+                    </a:solidFill>
+                  </a:tcPr>
+                </a:tc>
+                <a:tc>
+                  <a:txBody>
+                    <a:bodyPr/>
+                    <a:lstStyle/>
+                    <a:p>
+                      <a:pPr marL="0" algn="l" defTabSz="914400" rtl="0" eaLnBrk="1" latinLnBrk="1" hangingPunct="1"/>
+                      <a:r>
+                        <a:rPr lang="en-US" altLang="ko-KR" sz="1100" b="1" kern="1200" dirty="0">
+                          <a:solidFill>
+                            <a:schemeClr val="tx1"/>
+                          </a:solidFill>
+                          <a:latin typeface="+mn-lt"/>
+                          <a:ea typeface="+mn-ea"/>
+                          <a:cs typeface="+mn-cs"/>
+                        </a:rPr>
+                        <a:t>0</a:t>
+                      </a:r>
+                      <a:endParaRPr lang="ko-KR" altLang="en-US" sz="1100" b="1" kern="1200" dirty="0">
+                        <a:solidFill>
+                          <a:schemeClr val="tx1"/>
+                        </a:solidFill>
+                        <a:latin typeface="+mn-lt"/>
+                        <a:ea typeface="+mn-ea"/>
+                        <a:cs typeface="+mn-cs"/>
+                      </a:endParaRPr>
+                    </a:p>
+                  </a:txBody>
+                  <a:tcPr anchor="ctr">
+                    <a:solidFill>
+                      <a:srgbClr val="FFC000"/>
+                    </a:solidFill>
+                  </a:tcPr>
+                </a:tc>
+                <a:tc>
+                  <a:txBody>
+                    <a:bodyPr/>
+                    <a:lstStyle/>
+                    <a:p>
+                      <a:pPr marL="0" algn="l" defTabSz="914400" rtl="0" eaLnBrk="1" latinLnBrk="1" hangingPunct="1"/>
+                      <a:r>
+                        <a:rPr lang="en-US" altLang="ko-KR" sz="1100" b="1" kern="1200" dirty="0">
+                          <a:solidFill>
+                            <a:schemeClr val="tx1"/>
+                          </a:solidFill>
+                          <a:latin typeface="+mn-lt"/>
+                          <a:ea typeface="+mn-ea"/>
+                          <a:cs typeface="+mn-cs"/>
+                        </a:rPr>
+                        <a:t>0</a:t>
+                      </a:r>
+                      <a:endParaRPr lang="ko-KR" altLang="en-US" sz="1100" b="1" kern="1200" dirty="0">
+                        <a:solidFill>
+                          <a:schemeClr val="tx1"/>
+                        </a:solidFill>
+                        <a:latin typeface="+mn-lt"/>
+                        <a:ea typeface="+mn-ea"/>
+                        <a:cs typeface="+mn-cs"/>
+                      </a:endParaRPr>
+                    </a:p>
+                  </a:txBody>
+                  <a:tcPr anchor="ctr">
+                    <a:solidFill>
+                      <a:srgbClr val="FFC000"/>
+                    </a:solidFill>
+                  </a:tcPr>
+                </a:tc>
+                <a:extLst>
+                  <a:ext uri="{0D108BD9-81ED-4DB2-BD59-A6C34878D82A}">
+                    <a16:rowId xmlns:a16="http://schemas.microsoft.com/office/drawing/2014/main" val="547838226"/>
+                  </a:ext>
+                </a:extLst>
+              </a:tr>
+            </a:tbl>
+          </a:graphicData>
+        </a:graphic>
+      </p:graphicFrame>
+      <p:sp>
+        <p:nvSpPr>
+          <p:cNvPr id="85" name="TextBox 84">
+            <a:extLst>
+              <a:ext uri="{FF2B5EF4-FFF2-40B4-BE49-F238E27FC236}">
+                <a16:creationId xmlns:a16="http://schemas.microsoft.com/office/drawing/2014/main" id="{46334E1B-0EE1-45A8-A580-7FBBB352666F}"/>
+              </a:ext>
+            </a:extLst>
+          </p:cNvPr>
+          <p:cNvSpPr txBox="1"/>
+          <p:nvPr/>
+        </p:nvSpPr>
+        <p:spPr>
+          <a:xfrm>
+            <a:off x="1461078" y="4109889"/>
+            <a:ext cx="2640466" cy="307777"/>
+          </a:xfrm>
+          <a:prstGeom prst="rect">
+            <a:avLst/>
+          </a:prstGeom>
+          <a:noFill/>
+        </p:spPr>
+        <p:txBody>
+          <a:bodyPr wrap="none" rtlCol="0">
+            <a:spAutoFit/>
+          </a:bodyPr>
+          <a:lstStyle/>
+          <a:p>
+            <a:r>
+              <a:rPr lang="en-US" altLang="ko-KR" sz="1400" dirty="0" err="1"/>
+              <a:t>ch</a:t>
+            </a:r>
+            <a:r>
+              <a:rPr lang="en-US" altLang="ko-KR" sz="1400" dirty="0"/>
+              <a:t> </a:t>
+            </a:r>
+            <a:r>
+              <a:rPr lang="ko-KR" altLang="en-US" sz="1400" dirty="0"/>
+              <a:t> </a:t>
+            </a:r>
+            <a:r>
+              <a:rPr lang="en-US" altLang="ko-KR" sz="1400" dirty="0"/>
+              <a:t>0   1   2   3   4   5 (index)</a:t>
+            </a:r>
+            <a:endParaRPr lang="ko-KR" altLang="en-US" sz="1400" dirty="0"/>
+          </a:p>
+        </p:txBody>
+      </p:sp>
+      <p:cxnSp>
+        <p:nvCxnSpPr>
+          <p:cNvPr id="86" name="직선 화살표 연결선 85">
+            <a:extLst>
+              <a:ext uri="{FF2B5EF4-FFF2-40B4-BE49-F238E27FC236}">
+                <a16:creationId xmlns:a16="http://schemas.microsoft.com/office/drawing/2014/main" id="{E6B8D604-A93B-4CA9-BF59-7DC552B19F39}"/>
+              </a:ext>
+            </a:extLst>
+          </p:cNvPr>
+          <p:cNvCxnSpPr>
+            <a:cxnSpLocks/>
+          </p:cNvCxnSpPr>
+          <p:nvPr/>
+        </p:nvCxnSpPr>
+        <p:spPr>
+          <a:xfrm flipH="1">
+            <a:off x="2725503" y="3494782"/>
+            <a:ext cx="1" cy="643941"/>
+          </a:xfrm>
+          <a:prstGeom prst="straightConnector1">
+            <a:avLst/>
+          </a:prstGeom>
+          <a:ln w="15875">
+            <a:solidFill>
+              <a:srgbClr val="FF0000"/>
+            </a:solidFill>
+            <a:tailEnd type="triangle" w="lg" len="med"/>
+          </a:ln>
+        </p:spPr>
+        <p:style>
+          <a:lnRef idx="1">
+            <a:schemeClr val="accent1"/>
+          </a:lnRef>
+          <a:fillRef idx="0">
+            <a:schemeClr val="accent1"/>
+          </a:fillRef>
+          <a:effectRef idx="0">
+            <a:schemeClr val="accent1"/>
+          </a:effectRef>
+          <a:fontRef idx="minor">
+            <a:schemeClr val="tx1"/>
+          </a:fontRef>
+        </p:style>
+      </p:cxnSp>
+      <p:sp>
+        <p:nvSpPr>
+          <p:cNvPr id="87" name="타원 86">
+            <a:extLst>
+              <a:ext uri="{FF2B5EF4-FFF2-40B4-BE49-F238E27FC236}">
+                <a16:creationId xmlns:a16="http://schemas.microsoft.com/office/drawing/2014/main" id="{F5316357-9339-4C24-855B-C5D9298E3DB4}"/>
+              </a:ext>
+            </a:extLst>
+          </p:cNvPr>
+          <p:cNvSpPr/>
+          <p:nvPr/>
+        </p:nvSpPr>
+        <p:spPr>
+          <a:xfrm>
+            <a:off x="4669673" y="3182709"/>
+            <a:ext cx="780231" cy="451672"/>
+          </a:xfrm>
+          <a:prstGeom prst="ellipse">
+            <a:avLst/>
+          </a:prstGeom>
+          <a:noFill/>
+          <a:ln w="22225">
+            <a:solidFill>
+              <a:srgbClr val="FFC000"/>
+            </a:solidFill>
+          </a:ln>
+        </p:spPr>
+        <p:style>
+          <a:lnRef idx="2">
+            <a:schemeClr val="accent1">
+              <a:shade val="50000"/>
+            </a:schemeClr>
+          </a:lnRef>
+          <a:fillRef idx="1">
+            <a:schemeClr val="accent1"/>
+          </a:fillRef>
+          <a:effectRef idx="0">
+            <a:schemeClr val="accent1"/>
+          </a:effectRef>
+          <a:fontRef idx="minor">
+            <a:schemeClr val="lt1"/>
+          </a:fontRef>
+        </p:style>
+        <p:txBody>
+          <a:bodyPr rtlCol="0" anchor="ctr"/>
+          <a:lstStyle/>
+          <a:p>
+            <a:pPr algn="ctr"/>
+            <a:endParaRPr lang="ko-KR" altLang="en-US"/>
+          </a:p>
+        </p:txBody>
+      </p:sp>
+      <p:cxnSp>
+        <p:nvCxnSpPr>
+          <p:cNvPr id="88" name="직선 화살표 연결선 87">
+            <a:extLst>
+              <a:ext uri="{FF2B5EF4-FFF2-40B4-BE49-F238E27FC236}">
+                <a16:creationId xmlns:a16="http://schemas.microsoft.com/office/drawing/2014/main" id="{70DD3214-C8A8-4421-A18E-98EF38C27CE4}"/>
+              </a:ext>
+            </a:extLst>
+          </p:cNvPr>
+          <p:cNvCxnSpPr>
+            <a:cxnSpLocks/>
+            <a:stCxn id="87" idx="2"/>
+          </p:cNvCxnSpPr>
+          <p:nvPr/>
+        </p:nvCxnSpPr>
+        <p:spPr>
+          <a:xfrm flipH="1" flipV="1">
+            <a:off x="3621997" y="3387479"/>
+            <a:ext cx="1047676" cy="21066"/>
+          </a:xfrm>
+          <a:prstGeom prst="straightConnector1">
+            <a:avLst/>
+          </a:prstGeom>
+          <a:ln w="22225">
+            <a:solidFill>
+              <a:srgbClr val="FFC000"/>
+            </a:solidFill>
+            <a:tailEnd type="triangle" w="lg" len="med"/>
+          </a:ln>
+        </p:spPr>
+        <p:style>
+          <a:lnRef idx="1">
+            <a:schemeClr val="accent1"/>
+          </a:lnRef>
+          <a:fillRef idx="0">
+            <a:schemeClr val="accent1"/>
+          </a:fillRef>
+          <a:effectRef idx="0">
+            <a:schemeClr val="accent1"/>
+          </a:effectRef>
+          <a:fontRef idx="minor">
+            <a:schemeClr val="tx1"/>
+          </a:fontRef>
+        </p:style>
+      </p:cxnSp>
+      <p:sp>
+        <p:nvSpPr>
+          <p:cNvPr id="90" name="TextBox 89">
+            <a:extLst>
+              <a:ext uri="{FF2B5EF4-FFF2-40B4-BE49-F238E27FC236}">
+                <a16:creationId xmlns:a16="http://schemas.microsoft.com/office/drawing/2014/main" id="{D031EE85-471D-4185-81DE-9CFCD1FA37D4}"/>
+              </a:ext>
+            </a:extLst>
+          </p:cNvPr>
+          <p:cNvSpPr txBox="1"/>
+          <p:nvPr/>
+        </p:nvSpPr>
+        <p:spPr>
+          <a:xfrm>
+            <a:off x="1086629" y="3502237"/>
+            <a:ext cx="1628972" cy="523220"/>
+          </a:xfrm>
+          <a:prstGeom prst="rect">
+            <a:avLst/>
+          </a:prstGeom>
+          <a:noFill/>
+        </p:spPr>
+        <p:txBody>
+          <a:bodyPr wrap="none" rtlCol="0">
+            <a:spAutoFit/>
+          </a:bodyPr>
+          <a:lstStyle/>
+          <a:p>
+            <a:r>
+              <a:rPr lang="en-US" altLang="ko-KR" sz="1400" dirty="0"/>
+              <a:t>3</a:t>
+            </a:r>
+            <a:r>
+              <a:rPr lang="ko-KR" altLang="en-US" sz="1400" dirty="0"/>
+              <a:t>을 방문 했다가</a:t>
+            </a:r>
+            <a:endParaRPr lang="en-US" altLang="ko-KR" sz="1400" dirty="0"/>
+          </a:p>
+          <a:p>
+            <a:r>
+              <a:rPr lang="ko-KR" altLang="en-US" sz="1400" dirty="0"/>
+              <a:t>빠질 땐 체크 해제</a:t>
+            </a:r>
+          </a:p>
+        </p:txBody>
+      </p:sp>
     </p:spTree>
     <p:extLst>
       <p:ext uri="{BB962C8B-B14F-4D97-AF65-F5344CB8AC3E}">
-        <p14:creationId xmlns:p14="http://schemas.microsoft.com/office/powerpoint/2010/main" val="3450726087"/>
+        <p14:creationId xmlns:p14="http://schemas.microsoft.com/office/powerpoint/2010/main" val="2830737253"/>
       </p:ext>
     </p:extLst>
   </p:cSld>
@@ -12554,7 +14944,7 @@
     </p:spTree>
     <p:extLst>
       <p:ext uri="{BB962C8B-B14F-4D97-AF65-F5344CB8AC3E}">
-        <p14:creationId xmlns:p14="http://schemas.microsoft.com/office/powerpoint/2010/main" val="2944582328"/>
+        <p14:creationId xmlns:p14="http://schemas.microsoft.com/office/powerpoint/2010/main" val="3450726087"/>
       </p:ext>
     </p:extLst>
   </p:cSld>

</xml_diff>

<commit_message>
2023 07 14 lib 1
</commit_message>
<xml_diff>
--- a/inf-learn/section6/연습/인프런_코딩_section6.pptx
+++ b/inf-learn/section6/연습/인프런_코딩_section6.pptx
@@ -14,9 +14,6 @@
     <p:sldId id="266" r:id="rId8"/>
     <p:sldId id="267" r:id="rId9"/>
     <p:sldId id="259" r:id="rId10"/>
-    <p:sldId id="260" r:id="rId11"/>
-    <p:sldId id="261" r:id="rId12"/>
-    <p:sldId id="262" r:id="rId13"/>
   </p:sldIdLst>
   <p:sldSz cx="12192000" cy="6858000"/>
   <p:notesSz cx="6858000" cy="9144000"/>
@@ -270,7 +267,7 @@
           <a:p>
             <a:fld id="{CE8136C4-3EB1-4277-BE83-74E88DB1AA9E}" type="datetimeFigureOut">
               <a:rPr lang="ko-KR" altLang="en-US" smtClean="0"/>
-              <a:t>2023-07-11</a:t>
+              <a:t>2023-07-14</a:t>
             </a:fld>
             <a:endParaRPr lang="ko-KR" altLang="en-US"/>
           </a:p>
@@ -468,7 +465,7 @@
           <a:p>
             <a:fld id="{CE8136C4-3EB1-4277-BE83-74E88DB1AA9E}" type="datetimeFigureOut">
               <a:rPr lang="ko-KR" altLang="en-US" smtClean="0"/>
-              <a:t>2023-07-11</a:t>
+              <a:t>2023-07-14</a:t>
             </a:fld>
             <a:endParaRPr lang="ko-KR" altLang="en-US"/>
           </a:p>
@@ -676,7 +673,7 @@
           <a:p>
             <a:fld id="{CE8136C4-3EB1-4277-BE83-74E88DB1AA9E}" type="datetimeFigureOut">
               <a:rPr lang="ko-KR" altLang="en-US" smtClean="0"/>
-              <a:t>2023-07-11</a:t>
+              <a:t>2023-07-14</a:t>
             </a:fld>
             <a:endParaRPr lang="ko-KR" altLang="en-US"/>
           </a:p>
@@ -874,7 +871,7 @@
           <a:p>
             <a:fld id="{CE8136C4-3EB1-4277-BE83-74E88DB1AA9E}" type="datetimeFigureOut">
               <a:rPr lang="ko-KR" altLang="en-US" smtClean="0"/>
-              <a:t>2023-07-11</a:t>
+              <a:t>2023-07-14</a:t>
             </a:fld>
             <a:endParaRPr lang="ko-KR" altLang="en-US"/>
           </a:p>
@@ -1149,7 +1146,7 @@
           <a:p>
             <a:fld id="{CE8136C4-3EB1-4277-BE83-74E88DB1AA9E}" type="datetimeFigureOut">
               <a:rPr lang="ko-KR" altLang="en-US" smtClean="0"/>
-              <a:t>2023-07-11</a:t>
+              <a:t>2023-07-14</a:t>
             </a:fld>
             <a:endParaRPr lang="ko-KR" altLang="en-US"/>
           </a:p>
@@ -1414,7 +1411,7 @@
           <a:p>
             <a:fld id="{CE8136C4-3EB1-4277-BE83-74E88DB1AA9E}" type="datetimeFigureOut">
               <a:rPr lang="ko-KR" altLang="en-US" smtClean="0"/>
-              <a:t>2023-07-11</a:t>
+              <a:t>2023-07-14</a:t>
             </a:fld>
             <a:endParaRPr lang="ko-KR" altLang="en-US"/>
           </a:p>
@@ -1826,7 +1823,7 @@
           <a:p>
             <a:fld id="{CE8136C4-3EB1-4277-BE83-74E88DB1AA9E}" type="datetimeFigureOut">
               <a:rPr lang="ko-KR" altLang="en-US" smtClean="0"/>
-              <a:t>2023-07-11</a:t>
+              <a:t>2023-07-14</a:t>
             </a:fld>
             <a:endParaRPr lang="ko-KR" altLang="en-US"/>
           </a:p>
@@ -1967,7 +1964,7 @@
           <a:p>
             <a:fld id="{CE8136C4-3EB1-4277-BE83-74E88DB1AA9E}" type="datetimeFigureOut">
               <a:rPr lang="ko-KR" altLang="en-US" smtClean="0"/>
-              <a:t>2023-07-11</a:t>
+              <a:t>2023-07-14</a:t>
             </a:fld>
             <a:endParaRPr lang="ko-KR" altLang="en-US"/>
           </a:p>
@@ -2080,7 +2077,7 @@
           <a:p>
             <a:fld id="{CE8136C4-3EB1-4277-BE83-74E88DB1AA9E}" type="datetimeFigureOut">
               <a:rPr lang="ko-KR" altLang="en-US" smtClean="0"/>
-              <a:t>2023-07-11</a:t>
+              <a:t>2023-07-14</a:t>
             </a:fld>
             <a:endParaRPr lang="ko-KR" altLang="en-US"/>
           </a:p>
@@ -2391,7 +2388,7 @@
           <a:p>
             <a:fld id="{CE8136C4-3EB1-4277-BE83-74E88DB1AA9E}" type="datetimeFigureOut">
               <a:rPr lang="ko-KR" altLang="en-US" smtClean="0"/>
-              <a:t>2023-07-11</a:t>
+              <a:t>2023-07-14</a:t>
             </a:fld>
             <a:endParaRPr lang="ko-KR" altLang="en-US"/>
           </a:p>
@@ -2679,7 +2676,7 @@
           <a:p>
             <a:fld id="{CE8136C4-3EB1-4277-BE83-74E88DB1AA9E}" type="datetimeFigureOut">
               <a:rPr lang="ko-KR" altLang="en-US" smtClean="0"/>
-              <a:t>2023-07-11</a:t>
+              <a:t>2023-07-14</a:t>
             </a:fld>
             <a:endParaRPr lang="ko-KR" altLang="en-US"/>
           </a:p>
@@ -2920,7 +2917,7 @@
           <a:p>
             <a:fld id="{CE8136C4-3EB1-4277-BE83-74E88DB1AA9E}" type="datetimeFigureOut">
               <a:rPr lang="ko-KR" altLang="en-US" smtClean="0"/>
-              <a:t>2023-07-11</a:t>
+              <a:t>2023-07-14</a:t>
             </a:fld>
             <a:endParaRPr lang="ko-KR" altLang="en-US"/>
           </a:p>
@@ -4626,96 +4623,6 @@
     <p:extLst>
       <p:ext uri="{BB962C8B-B14F-4D97-AF65-F5344CB8AC3E}">
         <p14:creationId xmlns:p14="http://schemas.microsoft.com/office/powerpoint/2010/main" val="3280367667"/>
-      </p:ext>
-    </p:extLst>
-  </p:cSld>
-  <p:clrMapOvr>
-    <a:masterClrMapping/>
-  </p:clrMapOvr>
-</p:sld>
-</file>
-
-<file path=ppt/slides/slide10.xml><?xml version="1.0" encoding="utf-8"?>
-<p:sld xmlns:a="http://schemas.openxmlformats.org/drawingml/2006/main" xmlns:r="http://schemas.openxmlformats.org/officeDocument/2006/relationships" xmlns:p="http://schemas.openxmlformats.org/presentationml/2006/main">
-  <p:cSld>
-    <p:spTree>
-      <p:nvGrpSpPr>
-        <p:cNvPr id="1" name=""/>
-        <p:cNvGrpSpPr/>
-        <p:nvPr/>
-      </p:nvGrpSpPr>
-      <p:grpSpPr>
-        <a:xfrm>
-          <a:off x="0" y="0"/>
-          <a:ext cx="0" cy="0"/>
-          <a:chOff x="0" y="0"/>
-          <a:chExt cx="0" cy="0"/>
-        </a:xfrm>
-      </p:grpSpPr>
-    </p:spTree>
-    <p:extLst>
-      <p:ext uri="{BB962C8B-B14F-4D97-AF65-F5344CB8AC3E}">
-        <p14:creationId xmlns:p14="http://schemas.microsoft.com/office/powerpoint/2010/main" val="2944582328"/>
-      </p:ext>
-    </p:extLst>
-  </p:cSld>
-  <p:clrMapOvr>
-    <a:masterClrMapping/>
-  </p:clrMapOvr>
-</p:sld>
-</file>
-
-<file path=ppt/slides/slide11.xml><?xml version="1.0" encoding="utf-8"?>
-<p:sld xmlns:a="http://schemas.openxmlformats.org/drawingml/2006/main" xmlns:r="http://schemas.openxmlformats.org/officeDocument/2006/relationships" xmlns:p="http://schemas.openxmlformats.org/presentationml/2006/main">
-  <p:cSld>
-    <p:spTree>
-      <p:nvGrpSpPr>
-        <p:cNvPr id="1" name=""/>
-        <p:cNvGrpSpPr/>
-        <p:nvPr/>
-      </p:nvGrpSpPr>
-      <p:grpSpPr>
-        <a:xfrm>
-          <a:off x="0" y="0"/>
-          <a:ext cx="0" cy="0"/>
-          <a:chOff x="0" y="0"/>
-          <a:chExt cx="0" cy="0"/>
-        </a:xfrm>
-      </p:grpSpPr>
-    </p:spTree>
-    <p:extLst>
-      <p:ext uri="{BB962C8B-B14F-4D97-AF65-F5344CB8AC3E}">
-        <p14:creationId xmlns:p14="http://schemas.microsoft.com/office/powerpoint/2010/main" val="3249580640"/>
-      </p:ext>
-    </p:extLst>
-  </p:cSld>
-  <p:clrMapOvr>
-    <a:masterClrMapping/>
-  </p:clrMapOvr>
-</p:sld>
-</file>
-
-<file path=ppt/slides/slide12.xml><?xml version="1.0" encoding="utf-8"?>
-<p:sld xmlns:a="http://schemas.openxmlformats.org/drawingml/2006/main" xmlns:r="http://schemas.openxmlformats.org/officeDocument/2006/relationships" xmlns:p="http://schemas.openxmlformats.org/presentationml/2006/main">
-  <p:cSld>
-    <p:spTree>
-      <p:nvGrpSpPr>
-        <p:cNvPr id="1" name=""/>
-        <p:cNvGrpSpPr/>
-        <p:nvPr/>
-      </p:nvGrpSpPr>
-      <p:grpSpPr>
-        <a:xfrm>
-          <a:off x="0" y="0"/>
-          <a:ext cx="0" cy="0"/>
-          <a:chOff x="0" y="0"/>
-          <a:chExt cx="0" cy="0"/>
-        </a:xfrm>
-      </p:grpSpPr>
-    </p:spTree>
-    <p:extLst>
-      <p:ext uri="{BB962C8B-B14F-4D97-AF65-F5344CB8AC3E}">
-        <p14:creationId xmlns:p14="http://schemas.microsoft.com/office/powerpoint/2010/main" val="3468511111"/>
       </p:ext>
     </p:extLst>
   </p:cSld>

</xml_diff>